<commit_message>
updating slides with annotation
</commit_message>
<xml_diff>
--- a/Documentation/bounded_astar_documentation.pptx
+++ b/Documentation/bounded_astar_documentation.pptx
@@ -25,7 +25,7 @@
     <p:sldId id="343" r:id="rId16"/>
     <p:sldId id="261" r:id="rId17"/>
     <p:sldId id="262" r:id="rId18"/>
-    <p:sldId id="407" r:id="rId19"/>
+    <p:sldId id="408" r:id="rId19"/>
   </p:sldIdLst>
   <p:sldSz cx="12192000" cy="6858000"/>
   <p:notesSz cx="6858000" cy="9144000"/>
@@ -5577,10 +5577,16 @@
           <a:lstStyle/>
           <a:p>
             <a:r>
+              <a:rPr lang="en-US" sz="2000" b="1" dirty="0">
+                <a:latin typeface="Courier" pitchFamily="2" charset="0"/>
+              </a:rPr>
+              <a:t>Straight Through</a:t>
+            </a:r>
+            <a:r>
               <a:rPr lang="en-US" sz="2000" dirty="0">
                 <a:latin typeface="Courier" pitchFamily="2" charset="0"/>
               </a:rPr>
-              <a:t>Straight Through </a:t>
+              <a:t> </a:t>
             </a:r>
             <a:r>
               <a:rPr lang="en-US" sz="2000" dirty="0"/>
@@ -5765,30 +5771,54 @@
           <a:lstStyle/>
           <a:p>
             <a:r>
+              <a:rPr lang="en-US" sz="2000" b="1" dirty="0">
+                <a:latin typeface="Courier" pitchFamily="2" charset="0"/>
+              </a:rPr>
+              <a:t>Through or Around</a:t>
+            </a:r>
+            <a:r>
               <a:rPr lang="en-US" sz="2000" dirty="0">
                 <a:latin typeface="Courier" pitchFamily="2" charset="0"/>
               </a:rPr>
-              <a:t>Through or Around </a:t>
+              <a:t> </a:t>
             </a:r>
             <a:r>
               <a:rPr lang="en-US" sz="2000" dirty="0"/>
               <a:t>– this planner calls the </a:t>
             </a:r>
             <a:r>
+              <a:rPr lang="en-US" sz="2000" b="1" dirty="0">
+                <a:latin typeface="Courier" pitchFamily="2" charset="0"/>
+              </a:rPr>
+              <a:t>Legacy</a:t>
+            </a:r>
+            <a:r>
               <a:rPr lang="en-US" sz="2000" dirty="0">
                 <a:latin typeface="Courier" pitchFamily="2" charset="0"/>
               </a:rPr>
-              <a:t>Legacy </a:t>
+              <a:t> </a:t>
             </a:r>
             <a:r>
               <a:rPr lang="en-US" sz="2000" dirty="0"/>
               <a:t>planner and compares the result to the result from </a:t>
             </a:r>
             <a:r>
+              <a:rPr lang="en-US" sz="2000" b="1" dirty="0">
+                <a:latin typeface="Courier" pitchFamily="2" charset="0"/>
+              </a:rPr>
+              <a:t>Straight</a:t>
+            </a:r>
+            <a:r>
               <a:rPr lang="en-US" sz="2000" dirty="0">
                 <a:latin typeface="Courier" pitchFamily="2" charset="0"/>
               </a:rPr>
-              <a:t>Straight Through</a:t>
+              <a:t> </a:t>
+            </a:r>
+            <a:r>
+              <a:rPr lang="en-US" sz="2000" b="1" dirty="0">
+                <a:latin typeface="Courier" pitchFamily="2" charset="0"/>
+              </a:rPr>
+              <a:t>Through</a:t>
             </a:r>
             <a:r>
               <a:rPr lang="en-US" sz="2000" dirty="0"/>
@@ -5955,7 +5985,17 @@
           <a:p>
             <a:r>
               <a:rPr lang="en-US" sz="3200" dirty="0"/>
-              <a:t>Pseudo code for this bimodal planner that either always goes around or always through obstacles, as well as the </a:t>
+              <a:t>Pseudo code for this bimodal planner </a:t>
+            </a:r>
+            <a:r>
+              <a:rPr lang="en-US" sz="3200" b="1" dirty="0">
+                <a:latin typeface="Courier" pitchFamily="2" charset="0"/>
+              </a:rPr>
+              <a:t>Through or Around </a:t>
+            </a:r>
+            <a:r>
+              <a:rPr lang="en-US" sz="3200" dirty="0"/>
+              <a:t>planner as well as the </a:t>
             </a:r>
             <a:r>
               <a:rPr lang="en-US" sz="3200" dirty="0">
@@ -5967,7 +6007,17 @@
             </a:r>
             <a:r>
               <a:rPr lang="en-US" sz="3200" dirty="0"/>
-              <a:t> for the through-planner:</a:t>
+              <a:t> for the </a:t>
+            </a:r>
+            <a:r>
+              <a:rPr lang="en-US" sz="3200" dirty="0">
+                <a:latin typeface="Courier" pitchFamily="2" charset="0"/>
+              </a:rPr>
+              <a:t>straight through</a:t>
+            </a:r>
+            <a:r>
+              <a:rPr lang="en-US" sz="3200" dirty="0"/>
+              <a:t> planner is as follows:</a:t>
             </a:r>
           </a:p>
         </p:txBody>
@@ -5990,8 +6040,8 @@
         </p:nvSpPr>
         <p:spPr>
           <a:xfrm>
-            <a:off x="0" y="1690688"/>
-            <a:ext cx="12192000" cy="4486275"/>
+            <a:off x="1676400" y="1690688"/>
+            <a:ext cx="10515599" cy="4486275"/>
           </a:xfrm>
         </p:spPr>
         <p:txBody>
@@ -6680,10 +6730,99 @@
           </a:p>
         </p:txBody>
       </p:sp>
+      <p:sp>
+        <p:nvSpPr>
+          <p:cNvPr id="5" name="Right Brace 4">
+            <a:extLst>
+              <a:ext uri="{FF2B5EF4-FFF2-40B4-BE49-F238E27FC236}">
+                <a16:creationId xmlns:a16="http://schemas.microsoft.com/office/drawing/2014/main" id="{F0A2A4B7-F1A2-FF47-A6EC-F1C6950DCAF7}"/>
+              </a:ext>
+            </a:extLst>
+          </p:cNvPr>
+          <p:cNvSpPr/>
+          <p:nvPr/>
+        </p:nvSpPr>
+        <p:spPr>
+          <a:xfrm rot="10800000">
+            <a:off x="838199" y="2128482"/>
+            <a:ext cx="1324191" cy="4227867"/>
+          </a:xfrm>
+          <a:prstGeom prst="rightBrace">
+            <a:avLst>
+              <a:gd name="adj1" fmla="val 8333"/>
+              <a:gd name="adj2" fmla="val 49451"/>
+            </a:avLst>
+          </a:prstGeom>
+          <a:ln w="38100"/>
+        </p:spPr>
+        <p:style>
+          <a:lnRef idx="1">
+            <a:schemeClr val="accent1"/>
+          </a:lnRef>
+          <a:fillRef idx="0">
+            <a:schemeClr val="accent1"/>
+          </a:fillRef>
+          <a:effectRef idx="0">
+            <a:schemeClr val="accent1"/>
+          </a:effectRef>
+          <a:fontRef idx="minor">
+            <a:schemeClr val="tx1"/>
+          </a:fontRef>
+        </p:style>
+        <p:txBody>
+          <a:bodyPr rtlCol="0" anchor="ctr"/>
+          <a:lstStyle/>
+          <a:p>
+            <a:pPr algn="ctr"/>
+            <a:endParaRPr lang="en-US" dirty="0"/>
+          </a:p>
+        </p:txBody>
+      </p:sp>
+      <p:sp>
+        <p:nvSpPr>
+          <p:cNvPr id="7" name="TextBox 6">
+            <a:extLst>
+              <a:ext uri="{FF2B5EF4-FFF2-40B4-BE49-F238E27FC236}">
+                <a16:creationId xmlns:a16="http://schemas.microsoft.com/office/drawing/2014/main" id="{0BEA7140-4A8D-BE41-B2AC-9E675448DC94}"/>
+              </a:ext>
+            </a:extLst>
+          </p:cNvPr>
+          <p:cNvSpPr txBox="1"/>
+          <p:nvPr/>
+        </p:nvSpPr>
+        <p:spPr>
+          <a:xfrm rot="16200000">
+            <a:off x="-2504363" y="2865608"/>
+            <a:ext cx="6100548" cy="369332"/>
+          </a:xfrm>
+          <a:prstGeom prst="rect">
+            <a:avLst/>
+          </a:prstGeom>
+          <a:noFill/>
+        </p:spPr>
+        <p:txBody>
+          <a:bodyPr wrap="square">
+            <a:spAutoFit/>
+          </a:bodyPr>
+          <a:lstStyle/>
+          <a:p>
+            <a:r>
+              <a:rPr lang="en-US" dirty="0">
+                <a:hlinkClick r:id="rId2" tooltip="fcn_algorithm_straight_planner.m"/>
+              </a:rPr>
+              <a:t>fcn_algorithm_straight_planner.m</a:t>
+            </a:r>
+            <a:r>
+              <a:rPr lang="en-US" dirty="0"/>
+              <a:t> </a:t>
+            </a:r>
+          </a:p>
+        </p:txBody>
+      </p:sp>
     </p:spTree>
     <p:extLst>
       <p:ext uri="{BB962C8B-B14F-4D97-AF65-F5344CB8AC3E}">
-        <p14:creationId xmlns:p14="http://schemas.microsoft.com/office/powerpoint/2010/main" val="1559424129"/>
+        <p14:creationId xmlns:p14="http://schemas.microsoft.com/office/powerpoint/2010/main" val="2547698298"/>
       </p:ext>
     </p:extLst>
   </p:cSld>
@@ -7698,7 +7837,7 @@
           <a:lstStyle/>
           <a:p>
             <a:r>
-              <a:rPr lang="en-US" sz="2000" dirty="0">
+              <a:rPr lang="en-US" sz="2000" b="1" dirty="0">
                 <a:latin typeface="Courier" pitchFamily="2" charset="0"/>
               </a:rPr>
               <a:t>Through at Vertices</a:t>

</xml_diff>

<commit_message>
tidy dilation robustness codee
</commit_message>
<xml_diff>
--- a/Documentation/bounded_astar_documentation.pptx
+++ b/Documentation/bounded_astar_documentation.pptx
@@ -5,7 +5,7 @@
     <p:sldMasterId id="2147483648" r:id="rId1"/>
   </p:sldMasterIdLst>
   <p:notesMasterIdLst>
-    <p:notesMasterId r:id="rId20"/>
+    <p:notesMasterId r:id="rId28"/>
   </p:notesMasterIdLst>
   <p:sldIdLst>
     <p:sldId id="256" r:id="rId2"/>
@@ -26,6 +26,14 @@
     <p:sldId id="261" r:id="rId17"/>
     <p:sldId id="262" r:id="rId18"/>
     <p:sldId id="408" r:id="rId19"/>
+    <p:sldId id="263" r:id="rId20"/>
+    <p:sldId id="292" r:id="rId21"/>
+    <p:sldId id="293" r:id="rId22"/>
+    <p:sldId id="294" r:id="rId23"/>
+    <p:sldId id="295" r:id="rId24"/>
+    <p:sldId id="296" r:id="rId25"/>
+    <p:sldId id="297" r:id="rId26"/>
+    <p:sldId id="298" r:id="rId27"/>
   </p:sldIdLst>
   <p:sldSz cx="12192000" cy="6858000"/>
   <p:notesSz cx="6858000" cy="9144000"/>
@@ -125,6 +133,44 @@
     </a:lvl9pPr>
   </p:defaultTextStyle>
   <p:extLst>
+    <p:ext uri="{521415D9-36F7-43E2-AB2F-B90AF26B5E84}">
+      <p14:sectionLst xmlns:p14="http://schemas.microsoft.com/office/powerpoint/2010/main">
+        <p14:section name="Default Section" id="{17DE99DF-3777-416D-9993-850CF1FB0B79}">
+          <p14:sldIdLst>
+            <p14:sldId id="256"/>
+            <p14:sldId id="266"/>
+            <p14:sldId id="265"/>
+            <p14:sldId id="258"/>
+            <p14:sldId id="257"/>
+            <p14:sldId id="267"/>
+            <p14:sldId id="259"/>
+            <p14:sldId id="350"/>
+            <p14:sldId id="347"/>
+            <p14:sldId id="346"/>
+            <p14:sldId id="341"/>
+            <p14:sldId id="342"/>
+            <p14:sldId id="348"/>
+            <p14:sldId id="349"/>
+            <p14:sldId id="343"/>
+            <p14:sldId id="261"/>
+            <p14:sldId id="262"/>
+            <p14:sldId id="408"/>
+          </p14:sldIdLst>
+        </p14:section>
+        <p14:section name="dilation_robustness" id="{1B4CAD42-12F6-4E88-81FF-2B68E2A4F3E8}">
+          <p14:sldIdLst>
+            <p14:sldId id="263"/>
+            <p14:sldId id="292"/>
+            <p14:sldId id="293"/>
+            <p14:sldId id="294"/>
+            <p14:sldId id="295"/>
+            <p14:sldId id="296"/>
+            <p14:sldId id="297"/>
+            <p14:sldId id="298"/>
+          </p14:sldIdLst>
+        </p14:section>
+      </p14:sectionLst>
+    </p:ext>
     <p:ext uri="{EFAFB233-063F-42B5-8137-9DF3F51BA10A}">
       <p15:sldGuideLst xmlns:p15="http://schemas.microsoft.com/office/powerpoint/2012/main"/>
     </p:ext>
@@ -226,7 +272,7 @@
           <a:p>
             <a:fld id="{831DF825-5323-D349-BDF0-46DC36D46EC4}" type="datetimeFigureOut">
               <a:rPr lang="en-US" smtClean="0"/>
-              <a:t>7/6/22</a:t>
+              <a:t>01-May-24</a:t>
             </a:fld>
             <a:endParaRPr lang="en-US"/>
           </a:p>
@@ -735,7 +781,7 @@
           <a:p>
             <a:fld id="{41D168F9-4F14-CE4C-BEB0-4F7E570B9ED1}" type="datetime1">
               <a:rPr lang="en-US" smtClean="0"/>
-              <a:t>7/6/22</a:t>
+              <a:t>01-May-24</a:t>
             </a:fld>
             <a:endParaRPr lang="en-US"/>
           </a:p>
@@ -933,7 +979,7 @@
           <a:p>
             <a:fld id="{F0EC59B2-AA25-F347-A058-D90CD58835A2}" type="datetime1">
               <a:rPr lang="en-US" smtClean="0"/>
-              <a:t>7/6/22</a:t>
+              <a:t>01-May-24</a:t>
             </a:fld>
             <a:endParaRPr lang="en-US"/>
           </a:p>
@@ -1141,7 +1187,7 @@
           <a:p>
             <a:fld id="{E168C5F4-0489-B846-9C9B-E08E0BCA5646}" type="datetime1">
               <a:rPr lang="en-US" smtClean="0"/>
-              <a:t>7/6/22</a:t>
+              <a:t>01-May-24</a:t>
             </a:fld>
             <a:endParaRPr lang="en-US"/>
           </a:p>
@@ -1339,7 +1385,7 @@
           <a:p>
             <a:fld id="{89BFF4E7-4860-CD42-A957-6C2D83C5AFC0}" type="datetime1">
               <a:rPr lang="en-US" smtClean="0"/>
-              <a:t>7/6/22</a:t>
+              <a:t>01-May-24</a:t>
             </a:fld>
             <a:endParaRPr lang="en-US"/>
           </a:p>
@@ -1614,7 +1660,7 @@
           <a:p>
             <a:fld id="{4E226D8D-8E3F-2343-B4A2-4ACBC2AEDB3B}" type="datetime1">
               <a:rPr lang="en-US" smtClean="0"/>
-              <a:t>7/6/22</a:t>
+              <a:t>01-May-24</a:t>
             </a:fld>
             <a:endParaRPr lang="en-US"/>
           </a:p>
@@ -1879,7 +1925,7 @@
           <a:p>
             <a:fld id="{FE81521D-33D6-5644-B959-2910AA939011}" type="datetime1">
               <a:rPr lang="en-US" smtClean="0"/>
-              <a:t>7/6/22</a:t>
+              <a:t>01-May-24</a:t>
             </a:fld>
             <a:endParaRPr lang="en-US"/>
           </a:p>
@@ -2291,7 +2337,7 @@
           <a:p>
             <a:fld id="{6B1FC8DF-C494-3344-80DE-B169A4EADB38}" type="datetime1">
               <a:rPr lang="en-US" smtClean="0"/>
-              <a:t>7/6/22</a:t>
+              <a:t>01-May-24</a:t>
             </a:fld>
             <a:endParaRPr lang="en-US"/>
           </a:p>
@@ -2432,7 +2478,7 @@
           <a:p>
             <a:fld id="{AE5C01FF-F3B0-1441-85CD-806ABC705291}" type="datetime1">
               <a:rPr lang="en-US" smtClean="0"/>
-              <a:t>7/6/22</a:t>
+              <a:t>01-May-24</a:t>
             </a:fld>
             <a:endParaRPr lang="en-US"/>
           </a:p>
@@ -2545,7 +2591,7 @@
           <a:p>
             <a:fld id="{524985CE-5470-6448-91C8-601C5F35DE11}" type="datetime1">
               <a:rPr lang="en-US" smtClean="0"/>
-              <a:t>7/6/22</a:t>
+              <a:t>01-May-24</a:t>
             </a:fld>
             <a:endParaRPr lang="en-US"/>
           </a:p>
@@ -2856,7 +2902,7 @@
           <a:p>
             <a:fld id="{04B3276F-7557-174D-94DB-536A4580BD03}" type="datetime1">
               <a:rPr lang="en-US" smtClean="0"/>
-              <a:t>7/6/22</a:t>
+              <a:t>01-May-24</a:t>
             </a:fld>
             <a:endParaRPr lang="en-US"/>
           </a:p>
@@ -3144,7 +3190,7 @@
           <a:p>
             <a:fld id="{07D3284B-FD08-F245-8FCF-21004B70DE60}" type="datetime1">
               <a:rPr lang="en-US" smtClean="0"/>
-              <a:t>7/6/22</a:t>
+              <a:t>01-May-24</a:t>
             </a:fld>
             <a:endParaRPr lang="en-US"/>
           </a:p>
@@ -3385,7 +3431,7 @@
           <a:p>
             <a:fld id="{EDC4ED6A-0F36-C84E-A4D5-1473420B3DDE}" type="datetime1">
               <a:rPr lang="en-US" smtClean="0"/>
-              <a:t>7/6/22</a:t>
+              <a:t>01-May-24</a:t>
             </a:fld>
             <a:endParaRPr lang="en-US"/>
           </a:p>
@@ -6832,6 +6878,144 @@
 </p:sld>
 </file>
 
+<file path=ppt/slides/slide19.xml><?xml version="1.0" encoding="utf-8"?>
+<p:sld xmlns:a="http://schemas.openxmlformats.org/drawingml/2006/main" xmlns:r="http://schemas.openxmlformats.org/officeDocument/2006/relationships" xmlns:p="http://schemas.openxmlformats.org/presentationml/2006/main">
+  <p:cSld>
+    <p:spTree>
+      <p:nvGrpSpPr>
+        <p:cNvPr id="1" name=""/>
+        <p:cNvGrpSpPr/>
+        <p:nvPr/>
+      </p:nvGrpSpPr>
+      <p:grpSpPr>
+        <a:xfrm>
+          <a:off x="0" y="0"/>
+          <a:ext cx="0" cy="0"/>
+          <a:chOff x="0" y="0"/>
+          <a:chExt cx="0" cy="0"/>
+        </a:xfrm>
+      </p:grpSpPr>
+      <p:sp>
+        <p:nvSpPr>
+          <p:cNvPr id="2" name="Title 1"/>
+          <p:cNvSpPr>
+            <a:spLocks noGrp="1"/>
+          </p:cNvSpPr>
+          <p:nvPr>
+            <p:ph type="title"/>
+          </p:nvPr>
+        </p:nvSpPr>
+        <p:spPr>
+          <a:xfrm>
+            <a:off x="643612" y="83928"/>
+            <a:ext cx="11376107" cy="830472"/>
+          </a:xfrm>
+        </p:spPr>
+        <p:txBody>
+          <a:bodyPr>
+            <a:noAutofit/>
+          </a:bodyPr>
+          <a:lstStyle/>
+          <a:p>
+            <a:r>
+              <a:rPr lang="en-US" sz="2000" dirty="0"/>
+              <a:t>We have developed a way to quickly estimate the free space around each edge in the visibility graph (i.e., each possible path segment), using only the visibility graph, which we need to compute for planning in all cases.</a:t>
+            </a:r>
+          </a:p>
+        </p:txBody>
+      </p:sp>
+      <p:sp>
+        <p:nvSpPr>
+          <p:cNvPr id="3" name="Content Placeholder 2"/>
+          <p:cNvSpPr>
+            <a:spLocks noGrp="1"/>
+          </p:cNvSpPr>
+          <p:nvPr>
+            <p:ph idx="1"/>
+          </p:nvPr>
+        </p:nvSpPr>
+        <p:spPr/>
+        <p:txBody>
+          <a:bodyPr/>
+          <a:lstStyle/>
+          <a:p>
+            <a:endParaRPr lang="en-US"/>
+          </a:p>
+        </p:txBody>
+      </p:sp>
+      <p:pic>
+        <p:nvPicPr>
+          <p:cNvPr id="4" name="Picture 3">
+            <a:extLst>
+              <a:ext uri="{FF2B5EF4-FFF2-40B4-BE49-F238E27FC236}">
+                <a16:creationId xmlns:a16="http://schemas.microsoft.com/office/drawing/2014/main" id="{740A6BD2-0209-E4FE-75B0-E55985B41B61}"/>
+              </a:ext>
+            </a:extLst>
+          </p:cNvPr>
+          <p:cNvPicPr>
+            <a:picLocks noChangeAspect="1"/>
+          </p:cNvPicPr>
+          <p:nvPr/>
+        </p:nvPicPr>
+        <p:blipFill>
+          <a:blip r:embed="rId2"/>
+          <a:stretch>
+            <a:fillRect/>
+          </a:stretch>
+        </p:blipFill>
+        <p:spPr>
+          <a:xfrm>
+            <a:off x="997665" y="1748824"/>
+            <a:ext cx="5334000" cy="4000500"/>
+          </a:xfrm>
+          <a:prstGeom prst="rect">
+            <a:avLst/>
+          </a:prstGeom>
+        </p:spPr>
+      </p:pic>
+      <p:pic>
+        <p:nvPicPr>
+          <p:cNvPr id="5" name="Picture 4">
+            <a:extLst>
+              <a:ext uri="{FF2B5EF4-FFF2-40B4-BE49-F238E27FC236}">
+                <a16:creationId xmlns:a16="http://schemas.microsoft.com/office/drawing/2014/main" id="{721B0AC6-D726-8DF8-91C5-2B58BD19B2DC}"/>
+              </a:ext>
+            </a:extLst>
+          </p:cNvPr>
+          <p:cNvPicPr>
+            <a:picLocks noChangeAspect="1"/>
+          </p:cNvPicPr>
+          <p:nvPr/>
+        </p:nvPicPr>
+        <p:blipFill>
+          <a:blip r:embed="rId3"/>
+          <a:stretch>
+            <a:fillRect/>
+          </a:stretch>
+        </p:blipFill>
+        <p:spPr>
+          <a:xfrm>
+            <a:off x="6331665" y="1748824"/>
+            <a:ext cx="5334000" cy="4000500"/>
+          </a:xfrm>
+          <a:prstGeom prst="rect">
+            <a:avLst/>
+          </a:prstGeom>
+        </p:spPr>
+      </p:pic>
+    </p:spTree>
+    <p:extLst>
+      <p:ext uri="{BB962C8B-B14F-4D97-AF65-F5344CB8AC3E}">
+        <p14:creationId xmlns:p14="http://schemas.microsoft.com/office/powerpoint/2010/main" val="221313073"/>
+      </p:ext>
+    </p:extLst>
+  </p:cSld>
+  <p:clrMapOvr>
+    <a:masterClrMapping/>
+  </p:clrMapOvr>
+</p:sld>
+</file>
+
 <file path=ppt/slides/slide2.xml><?xml version="1.0" encoding="utf-8"?>
 <p:sld xmlns:a="http://schemas.openxmlformats.org/drawingml/2006/main" xmlns:r="http://schemas.openxmlformats.org/officeDocument/2006/relationships" xmlns:p="http://schemas.openxmlformats.org/presentationml/2006/main">
   <p:cSld>
@@ -6946,6 +7130,3067 @@
     <p:extLst>
       <p:ext uri="{BB962C8B-B14F-4D97-AF65-F5344CB8AC3E}">
         <p14:creationId xmlns:p14="http://schemas.microsoft.com/office/powerpoint/2010/main" val="22354730"/>
+      </p:ext>
+    </p:extLst>
+  </p:cSld>
+  <p:clrMapOvr>
+    <a:masterClrMapping/>
+  </p:clrMapOvr>
+</p:sld>
+</file>
+
+<file path=ppt/slides/slide20.xml><?xml version="1.0" encoding="utf-8"?>
+<p:sld xmlns:a="http://schemas.openxmlformats.org/drawingml/2006/main" xmlns:r="http://schemas.openxmlformats.org/officeDocument/2006/relationships" xmlns:p="http://schemas.openxmlformats.org/presentationml/2006/main">
+  <p:cSld>
+    <p:spTree>
+      <p:nvGrpSpPr>
+        <p:cNvPr id="1" name=""/>
+        <p:cNvGrpSpPr/>
+        <p:nvPr/>
+      </p:nvGrpSpPr>
+      <p:grpSpPr>
+        <a:xfrm>
+          <a:off x="0" y="0"/>
+          <a:ext cx="0" cy="0"/>
+          <a:chOff x="0" y="0"/>
+          <a:chExt cx="0" cy="0"/>
+        </a:xfrm>
+      </p:grpSpPr>
+      <p:sp>
+        <p:nvSpPr>
+          <p:cNvPr id="2" name="Slide Number Placeholder 1"/>
+          <p:cNvSpPr>
+            <a:spLocks noGrp="1"/>
+          </p:cNvSpPr>
+          <p:nvPr>
+            <p:ph type="sldNum" sz="quarter" idx="12"/>
+          </p:nvPr>
+        </p:nvSpPr>
+        <p:spPr/>
+        <p:txBody>
+          <a:bodyPr/>
+          <a:lstStyle/>
+          <a:p>
+            <a:fld id="{CB3FC469-CA8B-4EE5-AE73-966FC6A86920}" type="slidenum">
+              <a:rPr lang="en-US" smtClean="0"/>
+              <a:t>20</a:t>
+            </a:fld>
+            <a:endParaRPr lang="en-US"/>
+          </a:p>
+        </p:txBody>
+      </p:sp>
+      <mc:AlternateContent xmlns:mc="http://schemas.openxmlformats.org/markup-compatibility/2006">
+        <mc:Choice xmlns:a14="http://schemas.microsoft.com/office/drawing/2010/main" Requires="a14">
+          <p:sp>
+            <p:nvSpPr>
+              <p:cNvPr id="4" name="Title 3"/>
+              <p:cNvSpPr>
+                <a:spLocks noGrp="1"/>
+              </p:cNvSpPr>
+              <p:nvPr>
+                <p:ph type="title"/>
+              </p:nvPr>
+            </p:nvSpPr>
+            <p:spPr>
+              <a:xfrm>
+                <a:off x="643612" y="83927"/>
+                <a:ext cx="11376107" cy="846239"/>
+              </a:xfrm>
+            </p:spPr>
+            <p:txBody>
+              <a:bodyPr>
+                <a:noAutofit/>
+              </a:bodyPr>
+              <a:lstStyle/>
+              <a:p>
+                <a:r>
+                  <a:rPr lang="en-US" sz="1600" dirty="0"/>
+                  <a:t>To get a geometric cost, we will estimate the corridor width around each visibility graph edge.  This will be called the dilation robustness matrix and it can be derived from the visibility graph is approximately linear time, </a:t>
+                </a:r>
+                <a14:m>
+                  <m:oMath xmlns:m="http://schemas.openxmlformats.org/officeDocument/2006/math">
+                    <m:r>
+                      <a:rPr lang="en-US" sz="1600" i="1" smtClean="0">
+                        <a:latin typeface="Cambria Math" panose="02040503050406030204" pitchFamily="18" charset="0"/>
+                        <a:ea typeface="Cambria Math" panose="02040503050406030204" pitchFamily="18" charset="0"/>
+                      </a:rPr>
+                      <m:t>ℴ</m:t>
+                    </m:r>
+                    <m:r>
+                      <a:rPr lang="en-US" sz="1600" b="1" i="1" smtClean="0">
+                        <a:latin typeface="Cambria Math" panose="02040503050406030204" pitchFamily="18" charset="0"/>
+                        <a:ea typeface="Cambria Math" panose="02040503050406030204" pitchFamily="18" charset="0"/>
+                      </a:rPr>
+                      <m:t>(</m:t>
+                    </m:r>
+                    <m:r>
+                      <a:rPr lang="en-US" sz="1600" b="1" i="1" smtClean="0">
+                        <a:latin typeface="Cambria Math" panose="02040503050406030204" pitchFamily="18" charset="0"/>
+                        <a:ea typeface="Cambria Math" panose="02040503050406030204" pitchFamily="18" charset="0"/>
+                      </a:rPr>
+                      <m:t>𝒃</m:t>
+                    </m:r>
+                    <m:r>
+                      <a:rPr lang="en-US" sz="1600" b="1" i="1" smtClean="0">
+                        <a:latin typeface="Cambria Math" panose="02040503050406030204" pitchFamily="18" charset="0"/>
+                        <a:ea typeface="Cambria Math" panose="02040503050406030204" pitchFamily="18" charset="0"/>
+                      </a:rPr>
+                      <m:t>⋅</m:t>
+                    </m:r>
+                    <m:r>
+                      <a:rPr lang="en-US" sz="1600" b="1" i="1" smtClean="0">
+                        <a:latin typeface="Cambria Math" panose="02040503050406030204" pitchFamily="18" charset="0"/>
+                        <a:ea typeface="Cambria Math" panose="02040503050406030204" pitchFamily="18" charset="0"/>
+                      </a:rPr>
+                      <m:t>𝒏</m:t>
+                    </m:r>
+                    <m:r>
+                      <a:rPr lang="en-US" sz="1600" b="1" i="1" smtClean="0">
+                        <a:latin typeface="Cambria Math" panose="02040503050406030204" pitchFamily="18" charset="0"/>
+                        <a:ea typeface="Cambria Math" panose="02040503050406030204" pitchFamily="18" charset="0"/>
+                      </a:rPr>
+                      <m:t>)</m:t>
+                    </m:r>
+                  </m:oMath>
+                </a14:m>
+                <a:r>
+                  <a:rPr lang="en-US" sz="1600" dirty="0"/>
+                  <a:t>, where b is the branching factor or average number of edges leaving each node and n is the number of nodes.  Generally n&gt;&gt;b so this scales as </a:t>
+                </a:r>
+                <a14:m>
+                  <m:oMath xmlns:m="http://schemas.openxmlformats.org/officeDocument/2006/math">
+                    <m:r>
+                      <a:rPr lang="en-US" sz="1600" i="1">
+                        <a:latin typeface="Cambria Math" panose="02040503050406030204" pitchFamily="18" charset="0"/>
+                        <a:ea typeface="Cambria Math" panose="02040503050406030204" pitchFamily="18" charset="0"/>
+                      </a:rPr>
+                      <m:t>ℴ</m:t>
+                    </m:r>
+                    <m:d>
+                      <m:dPr>
+                        <m:ctrlPr>
+                          <a:rPr lang="en-US" sz="1600" i="1">
+                            <a:latin typeface="Cambria Math" panose="02040503050406030204" pitchFamily="18" charset="0"/>
+                            <a:ea typeface="Cambria Math" panose="02040503050406030204" pitchFamily="18" charset="0"/>
+                          </a:rPr>
+                        </m:ctrlPr>
+                      </m:dPr>
+                      <m:e>
+                        <m:r>
+                          <a:rPr lang="en-US" sz="1600" b="1" i="1" smtClean="0">
+                            <a:latin typeface="Cambria Math" panose="02040503050406030204" pitchFamily="18" charset="0"/>
+                            <a:ea typeface="Cambria Math" panose="02040503050406030204" pitchFamily="18" charset="0"/>
+                          </a:rPr>
+                          <m:t>𝒏</m:t>
+                        </m:r>
+                      </m:e>
+                    </m:d>
+                  </m:oMath>
+                </a14:m>
+                <a:r>
+                  <a:rPr lang="en-US" sz="1600" dirty="0"/>
+                  <a:t>. E.g. for one of our floodplain maps with n = 221, b = 11.1.</a:t>
+                </a:r>
+              </a:p>
+            </p:txBody>
+          </p:sp>
+        </mc:Choice>
+        <mc:Fallback>
+          <p:sp>
+            <p:nvSpPr>
+              <p:cNvPr id="4" name="Title 3"/>
+              <p:cNvSpPr>
+                <a:spLocks noGrp="1" noRot="1" noChangeAspect="1" noMove="1" noResize="1" noEditPoints="1" noAdjustHandles="1" noChangeArrowheads="1" noChangeShapeType="1" noTextEdit="1"/>
+              </p:cNvSpPr>
+              <p:nvPr>
+                <p:ph type="title"/>
+              </p:nvPr>
+            </p:nvSpPr>
+            <p:spPr>
+              <a:xfrm>
+                <a:off x="643612" y="83927"/>
+                <a:ext cx="11376107" cy="846239"/>
+              </a:xfrm>
+              <a:blipFill>
+                <a:blip r:embed="rId2"/>
+                <a:stretch>
+                  <a:fillRect l="-322" t="-12230" b="-16547"/>
+                </a:stretch>
+              </a:blipFill>
+            </p:spPr>
+            <p:txBody>
+              <a:bodyPr/>
+              <a:lstStyle/>
+              <a:p>
+                <a:r>
+                  <a:rPr lang="en-US">
+                    <a:noFill/>
+                  </a:rPr>
+                  <a:t> </a:t>
+                </a:r>
+              </a:p>
+            </p:txBody>
+          </p:sp>
+        </mc:Fallback>
+      </mc:AlternateContent>
+      <p:pic>
+        <p:nvPicPr>
+          <p:cNvPr id="3" name="Picture 2"/>
+          <p:cNvPicPr>
+            <a:picLocks noChangeAspect="1"/>
+          </p:cNvPicPr>
+          <p:nvPr/>
+        </p:nvPicPr>
+        <p:blipFill>
+          <a:blip r:embed="rId3"/>
+          <a:stretch>
+            <a:fillRect/>
+          </a:stretch>
+        </p:blipFill>
+        <p:spPr>
+          <a:xfrm>
+            <a:off x="3429000" y="1721358"/>
+            <a:ext cx="5334000" cy="4000500"/>
+          </a:xfrm>
+          <a:prstGeom prst="rect">
+            <a:avLst/>
+          </a:prstGeom>
+        </p:spPr>
+      </p:pic>
+      <p:cxnSp>
+        <p:nvCxnSpPr>
+          <p:cNvPr id="5" name="Straight Arrow Connector 4"/>
+          <p:cNvCxnSpPr/>
+          <p:nvPr/>
+        </p:nvCxnSpPr>
+        <p:spPr>
+          <a:xfrm flipH="1">
+            <a:off x="4673600" y="2950464"/>
+            <a:ext cx="2385568" cy="249936"/>
+          </a:xfrm>
+          <a:prstGeom prst="straightConnector1">
+            <a:avLst/>
+          </a:prstGeom>
+          <a:ln w="38100">
+            <a:solidFill>
+              <a:srgbClr val="FF0000"/>
+            </a:solidFill>
+            <a:tailEnd type="triangle"/>
+          </a:ln>
+        </p:spPr>
+        <p:style>
+          <a:lnRef idx="1">
+            <a:schemeClr val="accent1"/>
+          </a:lnRef>
+          <a:fillRef idx="0">
+            <a:schemeClr val="accent1"/>
+          </a:fillRef>
+          <a:effectRef idx="0">
+            <a:schemeClr val="accent1"/>
+          </a:effectRef>
+          <a:fontRef idx="minor">
+            <a:schemeClr val="tx1"/>
+          </a:fontRef>
+        </p:style>
+      </p:cxnSp>
+      <p:sp>
+        <p:nvSpPr>
+          <p:cNvPr id="6" name="Left Brace 5"/>
+          <p:cNvSpPr/>
+          <p:nvPr/>
+        </p:nvSpPr>
+        <p:spPr>
+          <a:xfrm>
+            <a:off x="4539344" y="2939143"/>
+            <a:ext cx="87086" cy="272143"/>
+          </a:xfrm>
+          <a:prstGeom prst="leftBrace">
+            <a:avLst/>
+          </a:prstGeom>
+          <a:ln w="28575">
+            <a:solidFill>
+              <a:srgbClr val="FF0000"/>
+            </a:solidFill>
+          </a:ln>
+        </p:spPr>
+        <p:style>
+          <a:lnRef idx="1">
+            <a:schemeClr val="accent1"/>
+          </a:lnRef>
+          <a:fillRef idx="0">
+            <a:schemeClr val="accent1"/>
+          </a:fillRef>
+          <a:effectRef idx="0">
+            <a:schemeClr val="accent1"/>
+          </a:effectRef>
+          <a:fontRef idx="minor">
+            <a:schemeClr val="tx1"/>
+          </a:fontRef>
+        </p:style>
+        <p:txBody>
+          <a:bodyPr rtlCol="0" anchor="ctr"/>
+          <a:lstStyle/>
+          <a:p>
+            <a:pPr algn="ctr"/>
+            <a:endParaRPr lang="en-US"/>
+          </a:p>
+        </p:txBody>
+      </p:sp>
+      <p:sp>
+        <p:nvSpPr>
+          <p:cNvPr id="7" name="TextBox 6"/>
+          <p:cNvSpPr txBox="1"/>
+          <p:nvPr/>
+        </p:nvSpPr>
+        <p:spPr>
+          <a:xfrm>
+            <a:off x="3254829" y="2752048"/>
+            <a:ext cx="1077685" cy="646331"/>
+          </a:xfrm>
+          <a:prstGeom prst="rect">
+            <a:avLst/>
+          </a:prstGeom>
+          <a:solidFill>
+            <a:schemeClr val="bg1"/>
+          </a:solidFill>
+          <a:ln>
+            <a:solidFill>
+              <a:srgbClr val="FF0000"/>
+            </a:solidFill>
+          </a:ln>
+        </p:spPr>
+        <p:txBody>
+          <a:bodyPr wrap="square" rtlCol="0">
+            <a:spAutoFit/>
+          </a:bodyPr>
+          <a:lstStyle/>
+          <a:p>
+            <a:r>
+              <a:rPr lang="en-US" dirty="0"/>
+              <a:t>Corridor width</a:t>
+            </a:r>
+          </a:p>
+        </p:txBody>
+      </p:sp>
+    </p:spTree>
+    <p:extLst>
+      <p:ext uri="{BB962C8B-B14F-4D97-AF65-F5344CB8AC3E}">
+        <p14:creationId xmlns:p14="http://schemas.microsoft.com/office/powerpoint/2010/main" val="2957232767"/>
+      </p:ext>
+    </p:extLst>
+  </p:cSld>
+  <p:clrMapOvr>
+    <a:masterClrMapping/>
+  </p:clrMapOvr>
+</p:sld>
+</file>
+
+<file path=ppt/slides/slide21.xml><?xml version="1.0" encoding="utf-8"?>
+<p:sld xmlns:a="http://schemas.openxmlformats.org/drawingml/2006/main" xmlns:r="http://schemas.openxmlformats.org/officeDocument/2006/relationships" xmlns:p="http://schemas.openxmlformats.org/presentationml/2006/main">
+  <p:cSld>
+    <p:spTree>
+      <p:nvGrpSpPr>
+        <p:cNvPr id="1" name=""/>
+        <p:cNvGrpSpPr/>
+        <p:nvPr/>
+      </p:nvGrpSpPr>
+      <p:grpSpPr>
+        <a:xfrm>
+          <a:off x="0" y="0"/>
+          <a:ext cx="0" cy="0"/>
+          <a:chOff x="0" y="0"/>
+          <a:chExt cx="0" cy="0"/>
+        </a:xfrm>
+      </p:grpSpPr>
+      <p:pic>
+        <p:nvPicPr>
+          <p:cNvPr id="7" name="Picture 6"/>
+          <p:cNvPicPr>
+            <a:picLocks noChangeAspect="1"/>
+          </p:cNvPicPr>
+          <p:nvPr/>
+        </p:nvPicPr>
+        <p:blipFill>
+          <a:blip r:embed="rId2"/>
+          <a:stretch>
+            <a:fillRect/>
+          </a:stretch>
+        </p:blipFill>
+        <p:spPr>
+          <a:xfrm>
+            <a:off x="8314653" y="2024063"/>
+            <a:ext cx="4099886" cy="3547491"/>
+          </a:xfrm>
+          <a:prstGeom prst="rect">
+            <a:avLst/>
+          </a:prstGeom>
+        </p:spPr>
+      </p:pic>
+      <p:sp>
+        <p:nvSpPr>
+          <p:cNvPr id="2" name="Slide Number Placeholder 1"/>
+          <p:cNvSpPr>
+            <a:spLocks noGrp="1"/>
+          </p:cNvSpPr>
+          <p:nvPr>
+            <p:ph type="sldNum" sz="quarter" idx="12"/>
+          </p:nvPr>
+        </p:nvSpPr>
+        <p:spPr/>
+        <p:txBody>
+          <a:bodyPr/>
+          <a:lstStyle/>
+          <a:p>
+            <a:fld id="{CB3FC469-CA8B-4EE5-AE73-966FC6A86920}" type="slidenum">
+              <a:rPr lang="en-US" smtClean="0"/>
+              <a:t>21</a:t>
+            </a:fld>
+            <a:endParaRPr lang="en-US"/>
+          </a:p>
+        </p:txBody>
+      </p:sp>
+      <mc:AlternateContent xmlns:mc="http://schemas.openxmlformats.org/markup-compatibility/2006">
+        <mc:Choice xmlns:a14="http://schemas.microsoft.com/office/drawing/2010/main" Requires="a14">
+          <p:sp>
+            <p:nvSpPr>
+              <p:cNvPr id="4" name="Title 3"/>
+              <p:cNvSpPr>
+                <a:spLocks noGrp="1"/>
+              </p:cNvSpPr>
+              <p:nvPr>
+                <p:ph type="title"/>
+              </p:nvPr>
+            </p:nvSpPr>
+            <p:spPr>
+              <a:xfrm>
+                <a:off x="643612" y="83927"/>
+                <a:ext cx="11376107" cy="751645"/>
+              </a:xfrm>
+            </p:spPr>
+            <p:txBody>
+              <a:bodyPr>
+                <a:noAutofit/>
+              </a:bodyPr>
+              <a:lstStyle/>
+              <a:p>
+                <a:r>
+                  <a:rPr lang="en-US" sz="1600" dirty="0"/>
+                  <a:t>The algorithm seeks to come up with a cost matrix based on the expected lateral free space the vehicle would have when routing along a </a:t>
+                </a:r>
+                <a:r>
+                  <a:rPr lang="en-US" sz="1600" dirty="0" err="1"/>
+                  <a:t>vgraph</a:t>
+                </a:r>
+                <a:r>
+                  <a:rPr lang="en-US" sz="1600" dirty="0"/>
+                  <a:t> edge.  For some edge, the</a:t>
+                </a:r>
+                <a:r>
+                  <a:rPr lang="en-US" sz="1600" dirty="0">
+                    <a:solidFill>
+                      <a:srgbClr val="FF0000"/>
+                    </a:solidFill>
+                  </a:rPr>
+                  <a:t> primary edge</a:t>
+                </a:r>
+                <a:r>
+                  <a:rPr lang="en-US" sz="1600" dirty="0"/>
+                  <a:t>, </a:t>
+                </a:r>
+                <a14:m>
+                  <m:oMath xmlns:m="http://schemas.openxmlformats.org/officeDocument/2006/math">
+                    <m:acc>
+                      <m:accPr>
+                        <m:chr m:val="⃑"/>
+                        <m:ctrlPr>
+                          <a:rPr lang="en-US" sz="1600" i="1" smtClean="0">
+                            <a:latin typeface="Cambria Math" panose="02040503050406030204" pitchFamily="18" charset="0"/>
+                          </a:rPr>
+                        </m:ctrlPr>
+                      </m:accPr>
+                      <m:e>
+                        <m:sSub>
+                          <m:sSubPr>
+                            <m:ctrlPr>
+                              <a:rPr lang="en-US" sz="1600" i="1" smtClean="0">
+                                <a:latin typeface="Cambria Math" panose="02040503050406030204" pitchFamily="18" charset="0"/>
+                              </a:rPr>
+                            </m:ctrlPr>
+                          </m:sSubPr>
+                          <m:e>
+                            <m:r>
+                              <a:rPr lang="en-US" sz="1600" b="1" i="1" smtClean="0">
+                                <a:latin typeface="Cambria Math" panose="02040503050406030204" pitchFamily="18" charset="0"/>
+                              </a:rPr>
+                              <m:t>𝑽</m:t>
+                            </m:r>
+                          </m:e>
+                          <m:sub>
+                            <m:r>
+                              <a:rPr lang="en-US" sz="1600" b="1" i="1" smtClean="0">
+                                <a:latin typeface="Cambria Math" panose="02040503050406030204" pitchFamily="18" charset="0"/>
+                              </a:rPr>
+                              <m:t>𝒊𝒋</m:t>
+                            </m:r>
+                          </m:sub>
+                        </m:sSub>
+                      </m:e>
+                    </m:acc>
+                  </m:oMath>
+                </a14:m>
+                <a:r>
+                  <a:rPr lang="en-US" sz="1600" dirty="0"/>
+                  <a:t>, we look at each visibility graph edges extending from the same start (all possible </a:t>
+                </a:r>
+                <a:r>
+                  <a:rPr lang="en-US" sz="1600" dirty="0">
+                    <a:solidFill>
+                      <a:srgbClr val="8E2DA9"/>
+                    </a:solidFill>
+                  </a:rPr>
+                  <a:t>secondary edges</a:t>
+                </a:r>
+                <a:r>
+                  <a:rPr lang="en-US" sz="1600" dirty="0"/>
+                  <a:t>) , </a:t>
+                </a:r>
+                <a14:m>
+                  <m:oMath xmlns:m="http://schemas.openxmlformats.org/officeDocument/2006/math">
+                    <m:acc>
+                      <m:accPr>
+                        <m:chr m:val="⃑"/>
+                        <m:ctrlPr>
+                          <a:rPr lang="en-US" sz="1600" i="1">
+                            <a:latin typeface="Cambria Math" panose="02040503050406030204" pitchFamily="18" charset="0"/>
+                          </a:rPr>
+                        </m:ctrlPr>
+                      </m:accPr>
+                      <m:e>
+                        <m:sSub>
+                          <m:sSubPr>
+                            <m:ctrlPr>
+                              <a:rPr lang="en-US" sz="1600" i="1">
+                                <a:latin typeface="Cambria Math" panose="02040503050406030204" pitchFamily="18" charset="0"/>
+                              </a:rPr>
+                            </m:ctrlPr>
+                          </m:sSubPr>
+                          <m:e>
+                            <m:r>
+                              <a:rPr lang="en-US" sz="1600" b="1" i="1" smtClean="0">
+                                <a:latin typeface="Cambria Math" panose="02040503050406030204" pitchFamily="18" charset="0"/>
+                              </a:rPr>
+                              <m:t>{</m:t>
+                            </m:r>
+                            <m:r>
+                              <a:rPr lang="en-US" sz="1600" i="1">
+                                <a:latin typeface="Cambria Math" panose="02040503050406030204" pitchFamily="18" charset="0"/>
+                              </a:rPr>
+                              <m:t>𝑽</m:t>
+                            </m:r>
+                          </m:e>
+                          <m:sub>
+                            <m:r>
+                              <a:rPr lang="en-US" sz="1600" i="1">
+                                <a:latin typeface="Cambria Math" panose="02040503050406030204" pitchFamily="18" charset="0"/>
+                              </a:rPr>
+                              <m:t>𝒊</m:t>
+                            </m:r>
+                            <m:r>
+                              <a:rPr lang="en-US" sz="1600" b="1" i="1" smtClean="0">
+                                <a:latin typeface="Cambria Math" panose="02040503050406030204" pitchFamily="18" charset="0"/>
+                              </a:rPr>
+                              <m:t>𝒌</m:t>
+                            </m:r>
+                          </m:sub>
+                        </m:sSub>
+                      </m:e>
+                    </m:acc>
+                    <m:r>
+                      <a:rPr lang="en-US" sz="1600" b="1" i="1" smtClean="0">
+                        <a:latin typeface="Cambria Math" panose="02040503050406030204" pitchFamily="18" charset="0"/>
+                      </a:rPr>
+                      <m:t>|</m:t>
+                    </m:r>
+                    <m:r>
+                      <a:rPr lang="en-US" sz="1600" b="1" i="1" smtClean="0">
+                        <a:latin typeface="Cambria Math" panose="02040503050406030204" pitchFamily="18" charset="0"/>
+                      </a:rPr>
+                      <m:t>𝒌</m:t>
+                    </m:r>
+                    <m:r>
+                      <a:rPr lang="en-US" sz="1600" b="1" i="1" smtClean="0">
+                        <a:latin typeface="Cambria Math" panose="02040503050406030204" pitchFamily="18" charset="0"/>
+                      </a:rPr>
+                      <m:t>={</m:t>
+                    </m:r>
+                    <m:r>
+                      <a:rPr lang="en-US" sz="1600" b="1" i="1" smtClean="0">
+                        <a:latin typeface="Cambria Math" panose="02040503050406030204" pitchFamily="18" charset="0"/>
+                      </a:rPr>
+                      <m:t>𝟏</m:t>
+                    </m:r>
+                    <m:r>
+                      <a:rPr lang="en-US" sz="1600" b="1" i="1" smtClean="0">
+                        <a:latin typeface="Cambria Math" panose="02040503050406030204" pitchFamily="18" charset="0"/>
+                      </a:rPr>
+                      <m:t>,…,</m:t>
+                    </m:r>
+                    <m:r>
+                      <a:rPr lang="en-US" sz="1600" b="1" i="1" smtClean="0">
+                        <a:latin typeface="Cambria Math" panose="02040503050406030204" pitchFamily="18" charset="0"/>
+                      </a:rPr>
+                      <m:t>𝒏</m:t>
+                    </m:r>
+                    <m:r>
+                      <a:rPr lang="en-US" sz="1600" b="1" i="1" smtClean="0">
+                        <a:latin typeface="Cambria Math" panose="02040503050406030204" pitchFamily="18" charset="0"/>
+                      </a:rPr>
+                      <m:t>}}</m:t>
+                    </m:r>
+                  </m:oMath>
+                </a14:m>
+                <a:r>
+                  <a:rPr lang="en-US" sz="1600" dirty="0"/>
+                  <a:t>.</a:t>
+                </a:r>
+              </a:p>
+            </p:txBody>
+          </p:sp>
+        </mc:Choice>
+        <mc:Fallback>
+          <p:sp>
+            <p:nvSpPr>
+              <p:cNvPr id="4" name="Title 3"/>
+              <p:cNvSpPr>
+                <a:spLocks noGrp="1" noRot="1" noChangeAspect="1" noMove="1" noResize="1" noEditPoints="1" noAdjustHandles="1" noChangeArrowheads="1" noChangeShapeType="1" noTextEdit="1"/>
+              </p:cNvSpPr>
+              <p:nvPr>
+                <p:ph type="title"/>
+              </p:nvPr>
+            </p:nvSpPr>
+            <p:spPr>
+              <a:xfrm>
+                <a:off x="643612" y="83927"/>
+                <a:ext cx="11376107" cy="751645"/>
+              </a:xfrm>
+              <a:blipFill>
+                <a:blip r:embed="rId3"/>
+                <a:stretch>
+                  <a:fillRect l="-322" t="-11382" r="-54" b="-17073"/>
+                </a:stretch>
+              </a:blipFill>
+            </p:spPr>
+            <p:txBody>
+              <a:bodyPr/>
+              <a:lstStyle/>
+              <a:p>
+                <a:r>
+                  <a:rPr lang="en-US">
+                    <a:noFill/>
+                  </a:rPr>
+                  <a:t> </a:t>
+                </a:r>
+              </a:p>
+            </p:txBody>
+          </p:sp>
+        </mc:Fallback>
+      </mc:AlternateContent>
+      <p:pic>
+        <p:nvPicPr>
+          <p:cNvPr id="3" name="Picture 2"/>
+          <p:cNvPicPr>
+            <a:picLocks noChangeAspect="1"/>
+          </p:cNvPicPr>
+          <p:nvPr/>
+        </p:nvPicPr>
+        <p:blipFill>
+          <a:blip r:embed="rId4"/>
+          <a:stretch>
+            <a:fillRect/>
+          </a:stretch>
+        </p:blipFill>
+        <p:spPr>
+          <a:xfrm>
+            <a:off x="3429000" y="1721358"/>
+            <a:ext cx="5334000" cy="4000500"/>
+          </a:xfrm>
+          <a:prstGeom prst="rect">
+            <a:avLst/>
+          </a:prstGeom>
+        </p:spPr>
+      </p:pic>
+      <p:cxnSp>
+        <p:nvCxnSpPr>
+          <p:cNvPr id="5" name="Straight Arrow Connector 4"/>
+          <p:cNvCxnSpPr/>
+          <p:nvPr/>
+        </p:nvCxnSpPr>
+        <p:spPr>
+          <a:xfrm flipH="1">
+            <a:off x="4673600" y="2950464"/>
+            <a:ext cx="2385568" cy="249936"/>
+          </a:xfrm>
+          <a:prstGeom prst="straightConnector1">
+            <a:avLst/>
+          </a:prstGeom>
+          <a:ln w="38100">
+            <a:solidFill>
+              <a:srgbClr val="FF0000"/>
+            </a:solidFill>
+            <a:tailEnd type="triangle"/>
+          </a:ln>
+        </p:spPr>
+        <p:style>
+          <a:lnRef idx="1">
+            <a:schemeClr val="accent1"/>
+          </a:lnRef>
+          <a:fillRef idx="0">
+            <a:schemeClr val="accent1"/>
+          </a:fillRef>
+          <a:effectRef idx="0">
+            <a:schemeClr val="accent1"/>
+          </a:effectRef>
+          <a:fontRef idx="minor">
+            <a:schemeClr val="tx1"/>
+          </a:fontRef>
+        </p:style>
+      </p:cxnSp>
+      <p:cxnSp>
+        <p:nvCxnSpPr>
+          <p:cNvPr id="9" name="Straight Arrow Connector 8"/>
+          <p:cNvCxnSpPr/>
+          <p:nvPr/>
+        </p:nvCxnSpPr>
+        <p:spPr>
+          <a:xfrm flipH="1">
+            <a:off x="4673600" y="2950464"/>
+            <a:ext cx="2385568" cy="0"/>
+          </a:xfrm>
+          <a:prstGeom prst="straightConnector1">
+            <a:avLst/>
+          </a:prstGeom>
+          <a:ln w="38100">
+            <a:solidFill>
+              <a:srgbClr val="8E2DA9"/>
+            </a:solidFill>
+            <a:tailEnd type="triangle"/>
+          </a:ln>
+        </p:spPr>
+        <p:style>
+          <a:lnRef idx="1">
+            <a:schemeClr val="accent1"/>
+          </a:lnRef>
+          <a:fillRef idx="0">
+            <a:schemeClr val="accent1"/>
+          </a:fillRef>
+          <a:effectRef idx="0">
+            <a:schemeClr val="accent1"/>
+          </a:effectRef>
+          <a:fontRef idx="minor">
+            <a:schemeClr val="tx1"/>
+          </a:fontRef>
+        </p:style>
+      </p:cxnSp>
+      <p:cxnSp>
+        <p:nvCxnSpPr>
+          <p:cNvPr id="12" name="Straight Arrow Connector 11"/>
+          <p:cNvCxnSpPr/>
+          <p:nvPr/>
+        </p:nvCxnSpPr>
+        <p:spPr>
+          <a:xfrm>
+            <a:off x="7059168" y="2950464"/>
+            <a:ext cx="0" cy="249936"/>
+          </a:xfrm>
+          <a:prstGeom prst="straightConnector1">
+            <a:avLst/>
+          </a:prstGeom>
+          <a:ln w="38100">
+            <a:solidFill>
+              <a:srgbClr val="8E2DA9"/>
+            </a:solidFill>
+            <a:tailEnd type="triangle"/>
+          </a:ln>
+        </p:spPr>
+        <p:style>
+          <a:lnRef idx="1">
+            <a:schemeClr val="accent1"/>
+          </a:lnRef>
+          <a:fillRef idx="0">
+            <a:schemeClr val="accent1"/>
+          </a:fillRef>
+          <a:effectRef idx="0">
+            <a:schemeClr val="accent1"/>
+          </a:effectRef>
+          <a:fontRef idx="minor">
+            <a:schemeClr val="tx1"/>
+          </a:fontRef>
+        </p:style>
+      </p:cxnSp>
+      <p:cxnSp>
+        <p:nvCxnSpPr>
+          <p:cNvPr id="15" name="Straight Arrow Connector 14"/>
+          <p:cNvCxnSpPr/>
+          <p:nvPr/>
+        </p:nvCxnSpPr>
+        <p:spPr>
+          <a:xfrm>
+            <a:off x="7059168" y="2950464"/>
+            <a:ext cx="598932" cy="478536"/>
+          </a:xfrm>
+          <a:prstGeom prst="straightConnector1">
+            <a:avLst/>
+          </a:prstGeom>
+          <a:ln w="38100">
+            <a:solidFill>
+              <a:srgbClr val="8E2DA9"/>
+            </a:solidFill>
+            <a:tailEnd type="triangle"/>
+          </a:ln>
+        </p:spPr>
+        <p:style>
+          <a:lnRef idx="1">
+            <a:schemeClr val="accent1"/>
+          </a:lnRef>
+          <a:fillRef idx="0">
+            <a:schemeClr val="accent1"/>
+          </a:fillRef>
+          <a:effectRef idx="0">
+            <a:schemeClr val="accent1"/>
+          </a:effectRef>
+          <a:fontRef idx="minor">
+            <a:schemeClr val="tx1"/>
+          </a:fontRef>
+        </p:style>
+      </p:cxnSp>
+      <p:cxnSp>
+        <p:nvCxnSpPr>
+          <p:cNvPr id="18" name="Straight Arrow Connector 17"/>
+          <p:cNvCxnSpPr/>
+          <p:nvPr/>
+        </p:nvCxnSpPr>
+        <p:spPr>
+          <a:xfrm flipV="1">
+            <a:off x="7059167" y="2481453"/>
+            <a:ext cx="0" cy="469010"/>
+          </a:xfrm>
+          <a:prstGeom prst="straightConnector1">
+            <a:avLst/>
+          </a:prstGeom>
+          <a:ln w="38100">
+            <a:solidFill>
+              <a:srgbClr val="8E2DA9"/>
+            </a:solidFill>
+            <a:tailEnd type="triangle"/>
+          </a:ln>
+        </p:spPr>
+        <p:style>
+          <a:lnRef idx="1">
+            <a:schemeClr val="accent1"/>
+          </a:lnRef>
+          <a:fillRef idx="0">
+            <a:schemeClr val="accent1"/>
+          </a:fillRef>
+          <a:effectRef idx="0">
+            <a:schemeClr val="accent1"/>
+          </a:effectRef>
+          <a:fontRef idx="minor">
+            <a:schemeClr val="tx1"/>
+          </a:fontRef>
+        </p:style>
+      </p:cxnSp>
+      <p:cxnSp>
+        <p:nvCxnSpPr>
+          <p:cNvPr id="21" name="Straight Arrow Connector 20"/>
+          <p:cNvCxnSpPr/>
+          <p:nvPr/>
+        </p:nvCxnSpPr>
+        <p:spPr>
+          <a:xfrm>
+            <a:off x="7059167" y="2950463"/>
+            <a:ext cx="1244601" cy="124969"/>
+          </a:xfrm>
+          <a:prstGeom prst="straightConnector1">
+            <a:avLst/>
+          </a:prstGeom>
+          <a:ln w="38100">
+            <a:solidFill>
+              <a:srgbClr val="8E2DA9"/>
+            </a:solidFill>
+            <a:tailEnd type="triangle"/>
+          </a:ln>
+        </p:spPr>
+        <p:style>
+          <a:lnRef idx="1">
+            <a:schemeClr val="accent1"/>
+          </a:lnRef>
+          <a:fillRef idx="0">
+            <a:schemeClr val="accent1"/>
+          </a:fillRef>
+          <a:effectRef idx="0">
+            <a:schemeClr val="accent1"/>
+          </a:effectRef>
+          <a:fontRef idx="minor">
+            <a:schemeClr val="tx1"/>
+          </a:fontRef>
+        </p:style>
+      </p:cxnSp>
+      <p:cxnSp>
+        <p:nvCxnSpPr>
+          <p:cNvPr id="24" name="Straight Arrow Connector 23"/>
+          <p:cNvCxnSpPr/>
+          <p:nvPr/>
+        </p:nvCxnSpPr>
+        <p:spPr>
+          <a:xfrm flipH="1">
+            <a:off x="4368800" y="2950462"/>
+            <a:ext cx="2690367" cy="124970"/>
+          </a:xfrm>
+          <a:prstGeom prst="straightConnector1">
+            <a:avLst/>
+          </a:prstGeom>
+          <a:ln w="38100">
+            <a:solidFill>
+              <a:srgbClr val="8E2DA9"/>
+            </a:solidFill>
+            <a:tailEnd type="triangle"/>
+          </a:ln>
+        </p:spPr>
+        <p:style>
+          <a:lnRef idx="1">
+            <a:schemeClr val="accent1"/>
+          </a:lnRef>
+          <a:fillRef idx="0">
+            <a:schemeClr val="accent1"/>
+          </a:fillRef>
+          <a:effectRef idx="0">
+            <a:schemeClr val="accent1"/>
+          </a:effectRef>
+          <a:fontRef idx="minor">
+            <a:schemeClr val="tx1"/>
+          </a:fontRef>
+        </p:style>
+      </p:cxnSp>
+      <p:pic>
+        <p:nvPicPr>
+          <p:cNvPr id="6" name="Picture 5"/>
+          <p:cNvPicPr>
+            <a:picLocks noChangeAspect="1"/>
+          </p:cNvPicPr>
+          <p:nvPr/>
+        </p:nvPicPr>
+        <p:blipFill>
+          <a:blip r:embed="rId5"/>
+          <a:stretch>
+            <a:fillRect/>
+          </a:stretch>
+        </p:blipFill>
+        <p:spPr>
+          <a:xfrm>
+            <a:off x="8303768" y="3200400"/>
+            <a:ext cx="4073697" cy="2993313"/>
+          </a:xfrm>
+          <a:prstGeom prst="rect">
+            <a:avLst/>
+          </a:prstGeom>
+        </p:spPr>
+      </p:pic>
+      <p:sp>
+        <p:nvSpPr>
+          <p:cNvPr id="8" name="Rectangle 7"/>
+          <p:cNvSpPr/>
+          <p:nvPr/>
+        </p:nvSpPr>
+        <p:spPr>
+          <a:xfrm>
+            <a:off x="9056913" y="2416629"/>
+            <a:ext cx="130630" cy="228260"/>
+          </a:xfrm>
+          <a:prstGeom prst="rect">
+            <a:avLst/>
+          </a:prstGeom>
+          <a:solidFill>
+            <a:srgbClr val="FF0000">
+              <a:alpha val="50196"/>
+            </a:srgbClr>
+          </a:solidFill>
+          <a:ln>
+            <a:solidFill>
+              <a:schemeClr val="tx1"/>
+            </a:solidFill>
+          </a:ln>
+        </p:spPr>
+        <p:style>
+          <a:lnRef idx="2">
+            <a:schemeClr val="accent1">
+              <a:shade val="50000"/>
+            </a:schemeClr>
+          </a:lnRef>
+          <a:fillRef idx="1">
+            <a:schemeClr val="accent1"/>
+          </a:fillRef>
+          <a:effectRef idx="0">
+            <a:schemeClr val="accent1"/>
+          </a:effectRef>
+          <a:fontRef idx="minor">
+            <a:schemeClr val="lt1"/>
+          </a:fontRef>
+        </p:style>
+        <p:txBody>
+          <a:bodyPr rtlCol="0" anchor="ctr"/>
+          <a:lstStyle/>
+          <a:p>
+            <a:pPr algn="ctr"/>
+            <a:endParaRPr lang="en-US"/>
+          </a:p>
+        </p:txBody>
+      </p:sp>
+      <p:sp>
+        <p:nvSpPr>
+          <p:cNvPr id="16" name="Rectangle 15"/>
+          <p:cNvSpPr/>
+          <p:nvPr/>
+        </p:nvSpPr>
+        <p:spPr>
+          <a:xfrm>
+            <a:off x="9287328" y="2950122"/>
+            <a:ext cx="130630" cy="228260"/>
+          </a:xfrm>
+          <a:prstGeom prst="rect">
+            <a:avLst/>
+          </a:prstGeom>
+          <a:solidFill>
+            <a:srgbClr val="8E2DA9">
+              <a:alpha val="50196"/>
+            </a:srgbClr>
+          </a:solidFill>
+          <a:ln>
+            <a:solidFill>
+              <a:schemeClr val="tx1"/>
+            </a:solidFill>
+          </a:ln>
+        </p:spPr>
+        <p:style>
+          <a:lnRef idx="2">
+            <a:schemeClr val="accent1">
+              <a:shade val="50000"/>
+            </a:schemeClr>
+          </a:lnRef>
+          <a:fillRef idx="1">
+            <a:schemeClr val="accent1"/>
+          </a:fillRef>
+          <a:effectRef idx="0">
+            <a:schemeClr val="accent1"/>
+          </a:effectRef>
+          <a:fontRef idx="minor">
+            <a:schemeClr val="lt1"/>
+          </a:fontRef>
+        </p:style>
+        <p:txBody>
+          <a:bodyPr rtlCol="0" anchor="ctr"/>
+          <a:lstStyle/>
+          <a:p>
+            <a:pPr algn="ctr"/>
+            <a:endParaRPr lang="en-US"/>
+          </a:p>
+        </p:txBody>
+      </p:sp>
+    </p:spTree>
+    <p:extLst>
+      <p:ext uri="{BB962C8B-B14F-4D97-AF65-F5344CB8AC3E}">
+        <p14:creationId xmlns:p14="http://schemas.microsoft.com/office/powerpoint/2010/main" val="2974789096"/>
+      </p:ext>
+    </p:extLst>
+  </p:cSld>
+  <p:clrMapOvr>
+    <a:masterClrMapping/>
+  </p:clrMapOvr>
+</p:sld>
+</file>
+
+<file path=ppt/slides/slide22.xml><?xml version="1.0" encoding="utf-8"?>
+<p:sld xmlns:a="http://schemas.openxmlformats.org/drawingml/2006/main" xmlns:r="http://schemas.openxmlformats.org/officeDocument/2006/relationships" xmlns:p="http://schemas.openxmlformats.org/presentationml/2006/main">
+  <p:cSld>
+    <p:spTree>
+      <p:nvGrpSpPr>
+        <p:cNvPr id="1" name=""/>
+        <p:cNvGrpSpPr/>
+        <p:nvPr/>
+      </p:nvGrpSpPr>
+      <p:grpSpPr>
+        <a:xfrm>
+          <a:off x="0" y="0"/>
+          <a:ext cx="0" cy="0"/>
+          <a:chOff x="0" y="0"/>
+          <a:chExt cx="0" cy="0"/>
+        </a:xfrm>
+      </p:grpSpPr>
+      <p:sp>
+        <p:nvSpPr>
+          <p:cNvPr id="2" name="Slide Number Placeholder 1"/>
+          <p:cNvSpPr>
+            <a:spLocks noGrp="1"/>
+          </p:cNvSpPr>
+          <p:nvPr>
+            <p:ph type="sldNum" sz="quarter" idx="12"/>
+          </p:nvPr>
+        </p:nvSpPr>
+        <p:spPr/>
+        <p:txBody>
+          <a:bodyPr/>
+          <a:lstStyle/>
+          <a:p>
+            <a:fld id="{CB3FC469-CA8B-4EE5-AE73-966FC6A86920}" type="slidenum">
+              <a:rPr lang="en-US" smtClean="0"/>
+              <a:t>22</a:t>
+            </a:fld>
+            <a:endParaRPr lang="en-US"/>
+          </a:p>
+        </p:txBody>
+      </p:sp>
+      <p:sp>
+        <p:nvSpPr>
+          <p:cNvPr id="4" name="Title 3"/>
+          <p:cNvSpPr>
+            <a:spLocks noGrp="1"/>
+          </p:cNvSpPr>
+          <p:nvPr>
+            <p:ph type="title"/>
+          </p:nvPr>
+        </p:nvSpPr>
+        <p:spPr>
+          <a:xfrm>
+            <a:off x="643612" y="83927"/>
+            <a:ext cx="11376107" cy="715711"/>
+          </a:xfrm>
+        </p:spPr>
+        <p:txBody>
+          <a:bodyPr>
+            <a:noAutofit/>
+          </a:bodyPr>
+          <a:lstStyle/>
+          <a:p>
+            <a:r>
+              <a:rPr lang="en-US" sz="1600" dirty="0"/>
+              <a:t>We only consider secondary edges that are </a:t>
+            </a:r>
+            <a:r>
+              <a:rPr lang="en-US" sz="1600" dirty="0">
+                <a:solidFill>
+                  <a:schemeClr val="accent2"/>
+                </a:solidFill>
+              </a:rPr>
+              <a:t>(1) are not behind the primary edge, i.e., they don’t have a negative dot product with the primary edge </a:t>
+            </a:r>
+            <a:r>
+              <a:rPr lang="en-US" sz="1600" dirty="0"/>
+              <a:t>and </a:t>
+            </a:r>
+            <a:r>
+              <a:rPr lang="en-US" sz="1600" dirty="0">
+                <a:solidFill>
+                  <a:srgbClr val="D533A7"/>
+                </a:solidFill>
+              </a:rPr>
+              <a:t>(2) they do not end beyond the end of the primary edge, i.e., their component in the direction of the primary vector that is less than or equal to the magnitude of the primary vector.</a:t>
+            </a:r>
+          </a:p>
+        </p:txBody>
+      </p:sp>
+      <p:pic>
+        <p:nvPicPr>
+          <p:cNvPr id="3" name="Picture 2"/>
+          <p:cNvPicPr>
+            <a:picLocks noChangeAspect="1"/>
+          </p:cNvPicPr>
+          <p:nvPr/>
+        </p:nvPicPr>
+        <p:blipFill>
+          <a:blip r:embed="rId2"/>
+          <a:stretch>
+            <a:fillRect/>
+          </a:stretch>
+        </p:blipFill>
+        <p:spPr>
+          <a:xfrm>
+            <a:off x="3429000" y="1721358"/>
+            <a:ext cx="5334000" cy="4000500"/>
+          </a:xfrm>
+          <a:prstGeom prst="rect">
+            <a:avLst/>
+          </a:prstGeom>
+        </p:spPr>
+      </p:pic>
+      <p:cxnSp>
+        <p:nvCxnSpPr>
+          <p:cNvPr id="5" name="Straight Arrow Connector 4"/>
+          <p:cNvCxnSpPr/>
+          <p:nvPr/>
+        </p:nvCxnSpPr>
+        <p:spPr>
+          <a:xfrm flipH="1">
+            <a:off x="4673600" y="2950464"/>
+            <a:ext cx="2385568" cy="249936"/>
+          </a:xfrm>
+          <a:prstGeom prst="straightConnector1">
+            <a:avLst/>
+          </a:prstGeom>
+          <a:ln w="38100">
+            <a:solidFill>
+              <a:srgbClr val="FF0000"/>
+            </a:solidFill>
+            <a:tailEnd type="triangle"/>
+          </a:ln>
+        </p:spPr>
+        <p:style>
+          <a:lnRef idx="1">
+            <a:schemeClr val="accent1"/>
+          </a:lnRef>
+          <a:fillRef idx="0">
+            <a:schemeClr val="accent1"/>
+          </a:fillRef>
+          <a:effectRef idx="0">
+            <a:schemeClr val="accent1"/>
+          </a:effectRef>
+          <a:fontRef idx="minor">
+            <a:schemeClr val="tx1"/>
+          </a:fontRef>
+        </p:style>
+      </p:cxnSp>
+      <p:cxnSp>
+        <p:nvCxnSpPr>
+          <p:cNvPr id="9" name="Straight Arrow Connector 8"/>
+          <p:cNvCxnSpPr/>
+          <p:nvPr/>
+        </p:nvCxnSpPr>
+        <p:spPr>
+          <a:xfrm flipH="1">
+            <a:off x="4673600" y="2950464"/>
+            <a:ext cx="2385568" cy="0"/>
+          </a:xfrm>
+          <a:prstGeom prst="straightConnector1">
+            <a:avLst/>
+          </a:prstGeom>
+          <a:ln w="38100">
+            <a:solidFill>
+              <a:srgbClr val="8E2DA9"/>
+            </a:solidFill>
+            <a:tailEnd type="triangle"/>
+          </a:ln>
+        </p:spPr>
+        <p:style>
+          <a:lnRef idx="1">
+            <a:schemeClr val="accent1"/>
+          </a:lnRef>
+          <a:fillRef idx="0">
+            <a:schemeClr val="accent1"/>
+          </a:fillRef>
+          <a:effectRef idx="0">
+            <a:schemeClr val="accent1"/>
+          </a:effectRef>
+          <a:fontRef idx="minor">
+            <a:schemeClr val="tx1"/>
+          </a:fontRef>
+        </p:style>
+      </p:cxnSp>
+      <p:cxnSp>
+        <p:nvCxnSpPr>
+          <p:cNvPr id="12" name="Straight Arrow Connector 11"/>
+          <p:cNvCxnSpPr/>
+          <p:nvPr/>
+        </p:nvCxnSpPr>
+        <p:spPr>
+          <a:xfrm>
+            <a:off x="7059168" y="2950464"/>
+            <a:ext cx="0" cy="249936"/>
+          </a:xfrm>
+          <a:prstGeom prst="straightConnector1">
+            <a:avLst/>
+          </a:prstGeom>
+          <a:ln w="38100">
+            <a:solidFill>
+              <a:srgbClr val="8E2DA9"/>
+            </a:solidFill>
+            <a:tailEnd type="triangle"/>
+          </a:ln>
+        </p:spPr>
+        <p:style>
+          <a:lnRef idx="1">
+            <a:schemeClr val="accent1"/>
+          </a:lnRef>
+          <a:fillRef idx="0">
+            <a:schemeClr val="accent1"/>
+          </a:fillRef>
+          <a:effectRef idx="0">
+            <a:schemeClr val="accent1"/>
+          </a:effectRef>
+          <a:fontRef idx="minor">
+            <a:schemeClr val="tx1"/>
+          </a:fontRef>
+        </p:style>
+      </p:cxnSp>
+      <p:cxnSp>
+        <p:nvCxnSpPr>
+          <p:cNvPr id="15" name="Straight Arrow Connector 14"/>
+          <p:cNvCxnSpPr/>
+          <p:nvPr/>
+        </p:nvCxnSpPr>
+        <p:spPr>
+          <a:xfrm>
+            <a:off x="7059168" y="2950464"/>
+            <a:ext cx="598932" cy="478536"/>
+          </a:xfrm>
+          <a:prstGeom prst="straightConnector1">
+            <a:avLst/>
+          </a:prstGeom>
+          <a:ln w="38100">
+            <a:solidFill>
+              <a:srgbClr val="D533A7"/>
+            </a:solidFill>
+            <a:tailEnd type="triangle"/>
+          </a:ln>
+        </p:spPr>
+        <p:style>
+          <a:lnRef idx="1">
+            <a:schemeClr val="accent1"/>
+          </a:lnRef>
+          <a:fillRef idx="0">
+            <a:schemeClr val="accent1"/>
+          </a:fillRef>
+          <a:effectRef idx="0">
+            <a:schemeClr val="accent1"/>
+          </a:effectRef>
+          <a:fontRef idx="minor">
+            <a:schemeClr val="tx1"/>
+          </a:fontRef>
+        </p:style>
+      </p:cxnSp>
+      <p:cxnSp>
+        <p:nvCxnSpPr>
+          <p:cNvPr id="18" name="Straight Arrow Connector 17"/>
+          <p:cNvCxnSpPr/>
+          <p:nvPr/>
+        </p:nvCxnSpPr>
+        <p:spPr>
+          <a:xfrm flipV="1">
+            <a:off x="7059167" y="2481453"/>
+            <a:ext cx="0" cy="469010"/>
+          </a:xfrm>
+          <a:prstGeom prst="straightConnector1">
+            <a:avLst/>
+          </a:prstGeom>
+          <a:ln w="38100">
+            <a:solidFill>
+              <a:schemeClr val="accent2"/>
+            </a:solidFill>
+            <a:tailEnd type="triangle"/>
+          </a:ln>
+        </p:spPr>
+        <p:style>
+          <a:lnRef idx="1">
+            <a:schemeClr val="accent1"/>
+          </a:lnRef>
+          <a:fillRef idx="0">
+            <a:schemeClr val="accent1"/>
+          </a:fillRef>
+          <a:effectRef idx="0">
+            <a:schemeClr val="accent1"/>
+          </a:effectRef>
+          <a:fontRef idx="minor">
+            <a:schemeClr val="tx1"/>
+          </a:fontRef>
+        </p:style>
+      </p:cxnSp>
+      <p:cxnSp>
+        <p:nvCxnSpPr>
+          <p:cNvPr id="21" name="Straight Arrow Connector 20"/>
+          <p:cNvCxnSpPr/>
+          <p:nvPr/>
+        </p:nvCxnSpPr>
+        <p:spPr>
+          <a:xfrm>
+            <a:off x="7059167" y="2950463"/>
+            <a:ext cx="1244601" cy="124969"/>
+          </a:xfrm>
+          <a:prstGeom prst="straightConnector1">
+            <a:avLst/>
+          </a:prstGeom>
+          <a:ln w="38100">
+            <a:solidFill>
+              <a:schemeClr val="accent2"/>
+            </a:solidFill>
+            <a:tailEnd type="triangle"/>
+          </a:ln>
+        </p:spPr>
+        <p:style>
+          <a:lnRef idx="1">
+            <a:schemeClr val="accent1"/>
+          </a:lnRef>
+          <a:fillRef idx="0">
+            <a:schemeClr val="accent1"/>
+          </a:fillRef>
+          <a:effectRef idx="0">
+            <a:schemeClr val="accent1"/>
+          </a:effectRef>
+          <a:fontRef idx="minor">
+            <a:schemeClr val="tx1"/>
+          </a:fontRef>
+        </p:style>
+      </p:cxnSp>
+      <p:cxnSp>
+        <p:nvCxnSpPr>
+          <p:cNvPr id="24" name="Straight Arrow Connector 23"/>
+          <p:cNvCxnSpPr/>
+          <p:nvPr/>
+        </p:nvCxnSpPr>
+        <p:spPr>
+          <a:xfrm flipH="1">
+            <a:off x="4368800" y="2950462"/>
+            <a:ext cx="2690367" cy="124970"/>
+          </a:xfrm>
+          <a:prstGeom prst="straightConnector1">
+            <a:avLst/>
+          </a:prstGeom>
+          <a:ln w="38100">
+            <a:solidFill>
+              <a:srgbClr val="D533A7"/>
+            </a:solidFill>
+            <a:tailEnd type="triangle"/>
+          </a:ln>
+        </p:spPr>
+        <p:style>
+          <a:lnRef idx="1">
+            <a:schemeClr val="accent1"/>
+          </a:lnRef>
+          <a:fillRef idx="0">
+            <a:schemeClr val="accent1"/>
+          </a:fillRef>
+          <a:effectRef idx="0">
+            <a:schemeClr val="accent1"/>
+          </a:effectRef>
+          <a:fontRef idx="minor">
+            <a:schemeClr val="tx1"/>
+          </a:fontRef>
+        </p:style>
+      </p:cxnSp>
+      <p:sp>
+        <p:nvSpPr>
+          <p:cNvPr id="13" name="TextBox 12"/>
+          <p:cNvSpPr txBox="1"/>
+          <p:nvPr/>
+        </p:nvSpPr>
+        <p:spPr>
+          <a:xfrm>
+            <a:off x="3096742" y="2615072"/>
+            <a:ext cx="1272057" cy="923330"/>
+          </a:xfrm>
+          <a:prstGeom prst="rect">
+            <a:avLst/>
+          </a:prstGeom>
+          <a:solidFill>
+            <a:schemeClr val="bg1"/>
+          </a:solidFill>
+          <a:ln>
+            <a:solidFill>
+              <a:schemeClr val="tx1"/>
+            </a:solidFill>
+          </a:ln>
+        </p:spPr>
+        <p:txBody>
+          <a:bodyPr wrap="square" rtlCol="0">
+            <a:spAutoFit/>
+          </a:bodyPr>
+          <a:lstStyle/>
+          <a:p>
+            <a:r>
+              <a:rPr lang="en-US" dirty="0">
+                <a:solidFill>
+                  <a:srgbClr val="D533A7"/>
+                </a:solidFill>
+              </a:rPr>
+              <a:t>Violates condition (2)</a:t>
+            </a:r>
+          </a:p>
+        </p:txBody>
+      </p:sp>
+      <p:pic>
+        <p:nvPicPr>
+          <p:cNvPr id="19" name="Picture 18"/>
+          <p:cNvPicPr>
+            <a:picLocks noChangeAspect="1"/>
+          </p:cNvPicPr>
+          <p:nvPr/>
+        </p:nvPicPr>
+        <p:blipFill>
+          <a:blip r:embed="rId3"/>
+          <a:stretch>
+            <a:fillRect/>
+          </a:stretch>
+        </p:blipFill>
+        <p:spPr>
+          <a:xfrm>
+            <a:off x="8314653" y="2024063"/>
+            <a:ext cx="4099886" cy="3547491"/>
+          </a:xfrm>
+          <a:prstGeom prst="rect">
+            <a:avLst/>
+          </a:prstGeom>
+        </p:spPr>
+      </p:pic>
+      <p:pic>
+        <p:nvPicPr>
+          <p:cNvPr id="20" name="Picture 19"/>
+          <p:cNvPicPr>
+            <a:picLocks noChangeAspect="1"/>
+          </p:cNvPicPr>
+          <p:nvPr/>
+        </p:nvPicPr>
+        <p:blipFill>
+          <a:blip r:embed="rId4"/>
+          <a:stretch>
+            <a:fillRect/>
+          </a:stretch>
+        </p:blipFill>
+        <p:spPr>
+          <a:xfrm>
+            <a:off x="8303768" y="4299857"/>
+            <a:ext cx="4073697" cy="1893856"/>
+          </a:xfrm>
+          <a:prstGeom prst="rect">
+            <a:avLst/>
+          </a:prstGeom>
+        </p:spPr>
+      </p:pic>
+      <p:sp>
+        <p:nvSpPr>
+          <p:cNvPr id="14" name="TextBox 13"/>
+          <p:cNvSpPr txBox="1"/>
+          <p:nvPr/>
+        </p:nvSpPr>
+        <p:spPr>
+          <a:xfrm>
+            <a:off x="7338543" y="1997008"/>
+            <a:ext cx="1272057" cy="923330"/>
+          </a:xfrm>
+          <a:prstGeom prst="rect">
+            <a:avLst/>
+          </a:prstGeom>
+          <a:solidFill>
+            <a:schemeClr val="bg1"/>
+          </a:solidFill>
+          <a:ln>
+            <a:solidFill>
+              <a:schemeClr val="tx1"/>
+            </a:solidFill>
+          </a:ln>
+        </p:spPr>
+        <p:txBody>
+          <a:bodyPr wrap="square" rtlCol="0">
+            <a:spAutoFit/>
+          </a:bodyPr>
+          <a:lstStyle/>
+          <a:p>
+            <a:r>
+              <a:rPr lang="en-US" dirty="0">
+                <a:solidFill>
+                  <a:schemeClr val="accent2"/>
+                </a:solidFill>
+              </a:rPr>
+              <a:t>Violates condition (1)</a:t>
+            </a:r>
+          </a:p>
+        </p:txBody>
+      </p:sp>
+      <p:sp>
+        <p:nvSpPr>
+          <p:cNvPr id="16" name="Rectangle 15"/>
+          <p:cNvSpPr/>
+          <p:nvPr/>
+        </p:nvSpPr>
+        <p:spPr>
+          <a:xfrm>
+            <a:off x="9056913" y="2416629"/>
+            <a:ext cx="130630" cy="228260"/>
+          </a:xfrm>
+          <a:prstGeom prst="rect">
+            <a:avLst/>
+          </a:prstGeom>
+          <a:solidFill>
+            <a:srgbClr val="FF0000">
+              <a:alpha val="50196"/>
+            </a:srgbClr>
+          </a:solidFill>
+          <a:ln>
+            <a:solidFill>
+              <a:schemeClr val="tx1"/>
+            </a:solidFill>
+          </a:ln>
+        </p:spPr>
+        <p:style>
+          <a:lnRef idx="2">
+            <a:schemeClr val="accent1">
+              <a:shade val="50000"/>
+            </a:schemeClr>
+          </a:lnRef>
+          <a:fillRef idx="1">
+            <a:schemeClr val="accent1"/>
+          </a:fillRef>
+          <a:effectRef idx="0">
+            <a:schemeClr val="accent1"/>
+          </a:effectRef>
+          <a:fontRef idx="minor">
+            <a:schemeClr val="lt1"/>
+          </a:fontRef>
+        </p:style>
+        <p:txBody>
+          <a:bodyPr rtlCol="0" anchor="ctr"/>
+          <a:lstStyle/>
+          <a:p>
+            <a:pPr algn="ctr"/>
+            <a:endParaRPr lang="en-US"/>
+          </a:p>
+        </p:txBody>
+      </p:sp>
+      <p:sp>
+        <p:nvSpPr>
+          <p:cNvPr id="17" name="Rectangle 16"/>
+          <p:cNvSpPr/>
+          <p:nvPr/>
+        </p:nvSpPr>
+        <p:spPr>
+          <a:xfrm>
+            <a:off x="9287328" y="2950122"/>
+            <a:ext cx="130630" cy="228260"/>
+          </a:xfrm>
+          <a:prstGeom prst="rect">
+            <a:avLst/>
+          </a:prstGeom>
+          <a:solidFill>
+            <a:srgbClr val="8E2DA9">
+              <a:alpha val="50196"/>
+            </a:srgbClr>
+          </a:solidFill>
+          <a:ln>
+            <a:solidFill>
+              <a:schemeClr val="tx1"/>
+            </a:solidFill>
+          </a:ln>
+        </p:spPr>
+        <p:style>
+          <a:lnRef idx="2">
+            <a:schemeClr val="accent1">
+              <a:shade val="50000"/>
+            </a:schemeClr>
+          </a:lnRef>
+          <a:fillRef idx="1">
+            <a:schemeClr val="accent1"/>
+          </a:fillRef>
+          <a:effectRef idx="0">
+            <a:schemeClr val="accent1"/>
+          </a:effectRef>
+          <a:fontRef idx="minor">
+            <a:schemeClr val="lt1"/>
+          </a:fontRef>
+        </p:style>
+        <p:txBody>
+          <a:bodyPr rtlCol="0" anchor="ctr"/>
+          <a:lstStyle/>
+          <a:p>
+            <a:pPr algn="ctr"/>
+            <a:endParaRPr lang="en-US"/>
+          </a:p>
+        </p:txBody>
+      </p:sp>
+      <p:sp>
+        <p:nvSpPr>
+          <p:cNvPr id="22" name="Rectangle 21"/>
+          <p:cNvSpPr/>
+          <p:nvPr/>
+        </p:nvSpPr>
+        <p:spPr>
+          <a:xfrm>
+            <a:off x="9287328" y="3720525"/>
+            <a:ext cx="2904672" cy="429028"/>
+          </a:xfrm>
+          <a:prstGeom prst="rect">
+            <a:avLst/>
+          </a:prstGeom>
+          <a:solidFill>
+            <a:srgbClr val="D533A7">
+              <a:alpha val="50196"/>
+            </a:srgbClr>
+          </a:solidFill>
+          <a:ln>
+            <a:solidFill>
+              <a:schemeClr val="tx1"/>
+            </a:solidFill>
+          </a:ln>
+        </p:spPr>
+        <p:style>
+          <a:lnRef idx="2">
+            <a:schemeClr val="accent1">
+              <a:shade val="50000"/>
+            </a:schemeClr>
+          </a:lnRef>
+          <a:fillRef idx="1">
+            <a:schemeClr val="accent1"/>
+          </a:fillRef>
+          <a:effectRef idx="0">
+            <a:schemeClr val="accent1"/>
+          </a:effectRef>
+          <a:fontRef idx="minor">
+            <a:schemeClr val="lt1"/>
+          </a:fontRef>
+        </p:style>
+        <p:txBody>
+          <a:bodyPr rtlCol="0" anchor="ctr"/>
+          <a:lstStyle/>
+          <a:p>
+            <a:pPr algn="ctr"/>
+            <a:endParaRPr lang="en-US"/>
+          </a:p>
+        </p:txBody>
+      </p:sp>
+      <p:sp>
+        <p:nvSpPr>
+          <p:cNvPr id="23" name="Rectangle 22"/>
+          <p:cNvSpPr/>
+          <p:nvPr/>
+        </p:nvSpPr>
+        <p:spPr>
+          <a:xfrm>
+            <a:off x="9287328" y="3187986"/>
+            <a:ext cx="2904672" cy="429028"/>
+          </a:xfrm>
+          <a:prstGeom prst="rect">
+            <a:avLst/>
+          </a:prstGeom>
+          <a:solidFill>
+            <a:schemeClr val="accent2">
+              <a:alpha val="50196"/>
+            </a:schemeClr>
+          </a:solidFill>
+          <a:ln>
+            <a:solidFill>
+              <a:schemeClr val="tx1"/>
+            </a:solidFill>
+          </a:ln>
+        </p:spPr>
+        <p:style>
+          <a:lnRef idx="2">
+            <a:schemeClr val="accent1">
+              <a:shade val="50000"/>
+            </a:schemeClr>
+          </a:lnRef>
+          <a:fillRef idx="1">
+            <a:schemeClr val="accent1"/>
+          </a:fillRef>
+          <a:effectRef idx="0">
+            <a:schemeClr val="accent1"/>
+          </a:effectRef>
+          <a:fontRef idx="minor">
+            <a:schemeClr val="lt1"/>
+          </a:fontRef>
+        </p:style>
+        <p:txBody>
+          <a:bodyPr rtlCol="0" anchor="ctr"/>
+          <a:lstStyle/>
+          <a:p>
+            <a:pPr algn="ctr"/>
+            <a:endParaRPr lang="en-US"/>
+          </a:p>
+        </p:txBody>
+      </p:sp>
+    </p:spTree>
+    <p:extLst>
+      <p:ext uri="{BB962C8B-B14F-4D97-AF65-F5344CB8AC3E}">
+        <p14:creationId xmlns:p14="http://schemas.microsoft.com/office/powerpoint/2010/main" val="2827236109"/>
+      </p:ext>
+    </p:extLst>
+  </p:cSld>
+  <p:clrMapOvr>
+    <a:masterClrMapping/>
+  </p:clrMapOvr>
+</p:sld>
+</file>
+
+<file path=ppt/slides/slide23.xml><?xml version="1.0" encoding="utf-8"?>
+<p:sld xmlns:a="http://schemas.openxmlformats.org/drawingml/2006/main" xmlns:r="http://schemas.openxmlformats.org/officeDocument/2006/relationships" xmlns:p="http://schemas.openxmlformats.org/presentationml/2006/main">
+  <p:cSld>
+    <p:spTree>
+      <p:nvGrpSpPr>
+        <p:cNvPr id="1" name=""/>
+        <p:cNvGrpSpPr/>
+        <p:nvPr/>
+      </p:nvGrpSpPr>
+      <p:grpSpPr>
+        <a:xfrm>
+          <a:off x="0" y="0"/>
+          <a:ext cx="0" cy="0"/>
+          <a:chOff x="0" y="0"/>
+          <a:chExt cx="0" cy="0"/>
+        </a:xfrm>
+      </p:grpSpPr>
+      <p:sp>
+        <p:nvSpPr>
+          <p:cNvPr id="2" name="Slide Number Placeholder 1"/>
+          <p:cNvSpPr>
+            <a:spLocks noGrp="1"/>
+          </p:cNvSpPr>
+          <p:nvPr>
+            <p:ph type="sldNum" sz="quarter" idx="12"/>
+          </p:nvPr>
+        </p:nvSpPr>
+        <p:spPr/>
+        <p:txBody>
+          <a:bodyPr/>
+          <a:lstStyle/>
+          <a:p>
+            <a:fld id="{CB3FC469-CA8B-4EE5-AE73-966FC6A86920}" type="slidenum">
+              <a:rPr lang="en-US" smtClean="0"/>
+              <a:t>23</a:t>
+            </a:fld>
+            <a:endParaRPr lang="en-US"/>
+          </a:p>
+        </p:txBody>
+      </p:sp>
+      <p:sp>
+        <p:nvSpPr>
+          <p:cNvPr id="4" name="Title 3"/>
+          <p:cNvSpPr>
+            <a:spLocks noGrp="1"/>
+          </p:cNvSpPr>
+          <p:nvPr>
+            <p:ph type="title"/>
+          </p:nvPr>
+        </p:nvSpPr>
+        <p:spPr>
+          <a:xfrm>
+            <a:off x="643612" y="83928"/>
+            <a:ext cx="11376107" cy="856314"/>
+          </a:xfrm>
+        </p:spPr>
+        <p:txBody>
+          <a:bodyPr>
+            <a:noAutofit/>
+          </a:bodyPr>
+          <a:lstStyle/>
+          <a:p>
+            <a:r>
+              <a:rPr lang="en-US" sz="1600" dirty="0"/>
+              <a:t>Finally the </a:t>
+            </a:r>
+            <a:r>
+              <a:rPr lang="en-US" sz="1600" dirty="0">
+                <a:solidFill>
+                  <a:srgbClr val="00B050"/>
+                </a:solidFill>
+              </a:rPr>
+              <a:t>unit normal </a:t>
+            </a:r>
+            <a:r>
+              <a:rPr lang="en-US" sz="1600" dirty="0"/>
+              <a:t>of the primary edge is dotted with the secondary edges to get the lateral distance from the primary edge to the secondary edge.  The minimum across all possible secondary edges is how far the destination of the secondary edge would have to move to cut off the primary edge.  I.e., an approximation of corridor width.</a:t>
+            </a:r>
+          </a:p>
+        </p:txBody>
+      </p:sp>
+      <p:pic>
+        <p:nvPicPr>
+          <p:cNvPr id="3" name="Picture 2"/>
+          <p:cNvPicPr>
+            <a:picLocks noChangeAspect="1"/>
+          </p:cNvPicPr>
+          <p:nvPr/>
+        </p:nvPicPr>
+        <p:blipFill>
+          <a:blip r:embed="rId2"/>
+          <a:stretch>
+            <a:fillRect/>
+          </a:stretch>
+        </p:blipFill>
+        <p:spPr>
+          <a:xfrm>
+            <a:off x="3429000" y="1721358"/>
+            <a:ext cx="5334000" cy="4000500"/>
+          </a:xfrm>
+          <a:prstGeom prst="rect">
+            <a:avLst/>
+          </a:prstGeom>
+        </p:spPr>
+      </p:pic>
+      <p:cxnSp>
+        <p:nvCxnSpPr>
+          <p:cNvPr id="5" name="Straight Arrow Connector 4"/>
+          <p:cNvCxnSpPr/>
+          <p:nvPr/>
+        </p:nvCxnSpPr>
+        <p:spPr>
+          <a:xfrm flipH="1">
+            <a:off x="4673600" y="2950464"/>
+            <a:ext cx="2385568" cy="249936"/>
+          </a:xfrm>
+          <a:prstGeom prst="straightConnector1">
+            <a:avLst/>
+          </a:prstGeom>
+          <a:ln w="38100">
+            <a:solidFill>
+              <a:srgbClr val="FF0000"/>
+            </a:solidFill>
+            <a:tailEnd type="triangle"/>
+          </a:ln>
+        </p:spPr>
+        <p:style>
+          <a:lnRef idx="1">
+            <a:schemeClr val="accent1"/>
+          </a:lnRef>
+          <a:fillRef idx="0">
+            <a:schemeClr val="accent1"/>
+          </a:fillRef>
+          <a:effectRef idx="0">
+            <a:schemeClr val="accent1"/>
+          </a:effectRef>
+          <a:fontRef idx="minor">
+            <a:schemeClr val="tx1"/>
+          </a:fontRef>
+        </p:style>
+      </p:cxnSp>
+      <p:cxnSp>
+        <p:nvCxnSpPr>
+          <p:cNvPr id="9" name="Straight Arrow Connector 8"/>
+          <p:cNvCxnSpPr/>
+          <p:nvPr/>
+        </p:nvCxnSpPr>
+        <p:spPr>
+          <a:xfrm flipH="1">
+            <a:off x="4673600" y="2950464"/>
+            <a:ext cx="2385568" cy="0"/>
+          </a:xfrm>
+          <a:prstGeom prst="straightConnector1">
+            <a:avLst/>
+          </a:prstGeom>
+          <a:ln w="38100">
+            <a:solidFill>
+              <a:srgbClr val="8E2DA9"/>
+            </a:solidFill>
+            <a:tailEnd type="triangle"/>
+          </a:ln>
+        </p:spPr>
+        <p:style>
+          <a:lnRef idx="1">
+            <a:schemeClr val="accent1"/>
+          </a:lnRef>
+          <a:fillRef idx="0">
+            <a:schemeClr val="accent1"/>
+          </a:fillRef>
+          <a:effectRef idx="0">
+            <a:schemeClr val="accent1"/>
+          </a:effectRef>
+          <a:fontRef idx="minor">
+            <a:schemeClr val="tx1"/>
+          </a:fontRef>
+        </p:style>
+      </p:cxnSp>
+      <p:cxnSp>
+        <p:nvCxnSpPr>
+          <p:cNvPr id="12" name="Straight Arrow Connector 11"/>
+          <p:cNvCxnSpPr/>
+          <p:nvPr/>
+        </p:nvCxnSpPr>
+        <p:spPr>
+          <a:xfrm>
+            <a:off x="7059168" y="2950464"/>
+            <a:ext cx="0" cy="249936"/>
+          </a:xfrm>
+          <a:prstGeom prst="straightConnector1">
+            <a:avLst/>
+          </a:prstGeom>
+          <a:ln w="38100">
+            <a:solidFill>
+              <a:srgbClr val="8E2DA9"/>
+            </a:solidFill>
+            <a:tailEnd type="triangle"/>
+          </a:ln>
+        </p:spPr>
+        <p:style>
+          <a:lnRef idx="1">
+            <a:schemeClr val="accent1"/>
+          </a:lnRef>
+          <a:fillRef idx="0">
+            <a:schemeClr val="accent1"/>
+          </a:fillRef>
+          <a:effectRef idx="0">
+            <a:schemeClr val="accent1"/>
+          </a:effectRef>
+          <a:fontRef idx="minor">
+            <a:schemeClr val="tx1"/>
+          </a:fontRef>
+        </p:style>
+      </p:cxnSp>
+      <p:cxnSp>
+        <p:nvCxnSpPr>
+          <p:cNvPr id="16" name="Straight Arrow Connector 15"/>
+          <p:cNvCxnSpPr/>
+          <p:nvPr/>
+        </p:nvCxnSpPr>
+        <p:spPr>
+          <a:xfrm flipH="1" flipV="1">
+            <a:off x="6988303" y="2610612"/>
+            <a:ext cx="70865" cy="339851"/>
+          </a:xfrm>
+          <a:prstGeom prst="straightConnector1">
+            <a:avLst/>
+          </a:prstGeom>
+          <a:ln w="38100">
+            <a:solidFill>
+              <a:srgbClr val="00B050"/>
+            </a:solidFill>
+            <a:tailEnd type="triangle"/>
+          </a:ln>
+        </p:spPr>
+        <p:style>
+          <a:lnRef idx="1">
+            <a:schemeClr val="accent1"/>
+          </a:lnRef>
+          <a:fillRef idx="0">
+            <a:schemeClr val="accent1"/>
+          </a:fillRef>
+          <a:effectRef idx="0">
+            <a:schemeClr val="accent1"/>
+          </a:effectRef>
+          <a:fontRef idx="minor">
+            <a:schemeClr val="tx1"/>
+          </a:fontRef>
+        </p:style>
+      </p:cxnSp>
+      <p:pic>
+        <p:nvPicPr>
+          <p:cNvPr id="10" name="Picture 9"/>
+          <p:cNvPicPr>
+            <a:picLocks noChangeAspect="1"/>
+          </p:cNvPicPr>
+          <p:nvPr/>
+        </p:nvPicPr>
+        <p:blipFill>
+          <a:blip r:embed="rId3"/>
+          <a:stretch>
+            <a:fillRect/>
+          </a:stretch>
+        </p:blipFill>
+        <p:spPr>
+          <a:xfrm>
+            <a:off x="8610600" y="5374426"/>
+            <a:ext cx="3766865" cy="1048432"/>
+          </a:xfrm>
+          <a:prstGeom prst="rect">
+            <a:avLst/>
+          </a:prstGeom>
+        </p:spPr>
+      </p:pic>
+      <p:pic>
+        <p:nvPicPr>
+          <p:cNvPr id="11" name="Picture 10"/>
+          <p:cNvPicPr>
+            <a:picLocks noChangeAspect="1"/>
+          </p:cNvPicPr>
+          <p:nvPr/>
+        </p:nvPicPr>
+        <p:blipFill>
+          <a:blip r:embed="rId4"/>
+          <a:stretch>
+            <a:fillRect/>
+          </a:stretch>
+        </p:blipFill>
+        <p:spPr>
+          <a:xfrm>
+            <a:off x="8314653" y="2024063"/>
+            <a:ext cx="4099886" cy="3547491"/>
+          </a:xfrm>
+          <a:prstGeom prst="rect">
+            <a:avLst/>
+          </a:prstGeom>
+        </p:spPr>
+      </p:pic>
+      <p:sp>
+        <p:nvSpPr>
+          <p:cNvPr id="13" name="Rectangle 12"/>
+          <p:cNvSpPr/>
+          <p:nvPr/>
+        </p:nvSpPr>
+        <p:spPr>
+          <a:xfrm>
+            <a:off x="9056913" y="2416629"/>
+            <a:ext cx="130630" cy="228260"/>
+          </a:xfrm>
+          <a:prstGeom prst="rect">
+            <a:avLst/>
+          </a:prstGeom>
+          <a:solidFill>
+            <a:srgbClr val="FF0000">
+              <a:alpha val="50196"/>
+            </a:srgbClr>
+          </a:solidFill>
+          <a:ln>
+            <a:solidFill>
+              <a:schemeClr val="tx1"/>
+            </a:solidFill>
+          </a:ln>
+        </p:spPr>
+        <p:style>
+          <a:lnRef idx="2">
+            <a:schemeClr val="accent1">
+              <a:shade val="50000"/>
+            </a:schemeClr>
+          </a:lnRef>
+          <a:fillRef idx="1">
+            <a:schemeClr val="accent1"/>
+          </a:fillRef>
+          <a:effectRef idx="0">
+            <a:schemeClr val="accent1"/>
+          </a:effectRef>
+          <a:fontRef idx="minor">
+            <a:schemeClr val="lt1"/>
+          </a:fontRef>
+        </p:style>
+        <p:txBody>
+          <a:bodyPr rtlCol="0" anchor="ctr"/>
+          <a:lstStyle/>
+          <a:p>
+            <a:pPr algn="ctr"/>
+            <a:endParaRPr lang="en-US"/>
+          </a:p>
+        </p:txBody>
+      </p:sp>
+      <p:sp>
+        <p:nvSpPr>
+          <p:cNvPr id="14" name="Rectangle 13"/>
+          <p:cNvSpPr/>
+          <p:nvPr/>
+        </p:nvSpPr>
+        <p:spPr>
+          <a:xfrm>
+            <a:off x="9287328" y="2950122"/>
+            <a:ext cx="130630" cy="228260"/>
+          </a:xfrm>
+          <a:prstGeom prst="rect">
+            <a:avLst/>
+          </a:prstGeom>
+          <a:solidFill>
+            <a:srgbClr val="8E2DA9">
+              <a:alpha val="50196"/>
+            </a:srgbClr>
+          </a:solidFill>
+          <a:ln>
+            <a:solidFill>
+              <a:schemeClr val="tx1"/>
+            </a:solidFill>
+          </a:ln>
+        </p:spPr>
+        <p:style>
+          <a:lnRef idx="2">
+            <a:schemeClr val="accent1">
+              <a:shade val="50000"/>
+            </a:schemeClr>
+          </a:lnRef>
+          <a:fillRef idx="1">
+            <a:schemeClr val="accent1"/>
+          </a:fillRef>
+          <a:effectRef idx="0">
+            <a:schemeClr val="accent1"/>
+          </a:effectRef>
+          <a:fontRef idx="minor">
+            <a:schemeClr val="lt1"/>
+          </a:fontRef>
+        </p:style>
+        <p:txBody>
+          <a:bodyPr rtlCol="0" anchor="ctr"/>
+          <a:lstStyle/>
+          <a:p>
+            <a:pPr algn="ctr"/>
+            <a:endParaRPr lang="en-US"/>
+          </a:p>
+        </p:txBody>
+      </p:sp>
+      <p:sp>
+        <p:nvSpPr>
+          <p:cNvPr id="15" name="Rectangle 14"/>
+          <p:cNvSpPr/>
+          <p:nvPr/>
+        </p:nvSpPr>
+        <p:spPr>
+          <a:xfrm>
+            <a:off x="9287328" y="4262204"/>
+            <a:ext cx="130630" cy="228260"/>
+          </a:xfrm>
+          <a:prstGeom prst="rect">
+            <a:avLst/>
+          </a:prstGeom>
+          <a:solidFill>
+            <a:srgbClr val="00B050">
+              <a:alpha val="50196"/>
+            </a:srgbClr>
+          </a:solidFill>
+          <a:ln>
+            <a:solidFill>
+              <a:schemeClr val="tx1"/>
+            </a:solidFill>
+          </a:ln>
+        </p:spPr>
+        <p:style>
+          <a:lnRef idx="2">
+            <a:schemeClr val="accent1">
+              <a:shade val="50000"/>
+            </a:schemeClr>
+          </a:lnRef>
+          <a:fillRef idx="1">
+            <a:schemeClr val="accent1"/>
+          </a:fillRef>
+          <a:effectRef idx="0">
+            <a:schemeClr val="accent1"/>
+          </a:effectRef>
+          <a:fontRef idx="minor">
+            <a:schemeClr val="lt1"/>
+          </a:fontRef>
+        </p:style>
+        <p:txBody>
+          <a:bodyPr rtlCol="0" anchor="ctr"/>
+          <a:lstStyle/>
+          <a:p>
+            <a:pPr algn="ctr"/>
+            <a:endParaRPr lang="en-US"/>
+          </a:p>
+        </p:txBody>
+      </p:sp>
+    </p:spTree>
+    <p:extLst>
+      <p:ext uri="{BB962C8B-B14F-4D97-AF65-F5344CB8AC3E}">
+        <p14:creationId xmlns:p14="http://schemas.microsoft.com/office/powerpoint/2010/main" val="186769336"/>
+      </p:ext>
+    </p:extLst>
+  </p:cSld>
+  <p:clrMapOvr>
+    <a:masterClrMapping/>
+  </p:clrMapOvr>
+</p:sld>
+</file>
+
+<file path=ppt/slides/slide24.xml><?xml version="1.0" encoding="utf-8"?>
+<p:sld xmlns:a="http://schemas.openxmlformats.org/drawingml/2006/main" xmlns:r="http://schemas.openxmlformats.org/officeDocument/2006/relationships" xmlns:p="http://schemas.openxmlformats.org/presentationml/2006/main">
+  <p:cSld>
+    <p:spTree>
+      <p:nvGrpSpPr>
+        <p:cNvPr id="1" name=""/>
+        <p:cNvGrpSpPr/>
+        <p:nvPr/>
+      </p:nvGrpSpPr>
+      <p:grpSpPr>
+        <a:xfrm>
+          <a:off x="0" y="0"/>
+          <a:ext cx="0" cy="0"/>
+          <a:chOff x="0" y="0"/>
+          <a:chExt cx="0" cy="0"/>
+        </a:xfrm>
+      </p:grpSpPr>
+      <p:sp>
+        <p:nvSpPr>
+          <p:cNvPr id="2" name="Title 1">
+            <a:extLst>
+              <a:ext uri="{FF2B5EF4-FFF2-40B4-BE49-F238E27FC236}">
+                <a16:creationId xmlns:a16="http://schemas.microsoft.com/office/drawing/2014/main" id="{C0D02319-1500-409F-84FF-04DB13A15E48}"/>
+              </a:ext>
+            </a:extLst>
+          </p:cNvPr>
+          <p:cNvSpPr>
+            <a:spLocks noGrp="1"/>
+          </p:cNvSpPr>
+          <p:nvPr>
+            <p:ph type="title"/>
+          </p:nvPr>
+        </p:nvSpPr>
+        <p:spPr>
+          <a:xfrm>
+            <a:off x="643612" y="83927"/>
+            <a:ext cx="11376107" cy="909301"/>
+          </a:xfrm>
+        </p:spPr>
+        <p:txBody>
+          <a:bodyPr>
+            <a:noAutofit/>
+          </a:bodyPr>
+          <a:lstStyle/>
+          <a:p>
+            <a:pPr>
+              <a:tabLst>
+                <a:tab pos="1203325" algn="l"/>
+              </a:tabLst>
+            </a:pPr>
+            <a:r>
+              <a:rPr lang="en-US" sz="2000" dirty="0"/>
+              <a:t>Two special cases are handled.  One is where there are no points to the side of a </a:t>
+            </a:r>
+            <a:r>
+              <a:rPr lang="en-US" sz="2000" dirty="0" err="1"/>
+              <a:t>vgraph</a:t>
+            </a:r>
+            <a:r>
+              <a:rPr lang="en-US" sz="2000" dirty="0"/>
+              <a:t> edge.  This indicates the edge of the map and thus an infinite corridor width.</a:t>
+            </a:r>
+          </a:p>
+        </p:txBody>
+      </p:sp>
+      <p:sp>
+        <p:nvSpPr>
+          <p:cNvPr id="3" name="Slide Number Placeholder 2">
+            <a:extLst>
+              <a:ext uri="{FF2B5EF4-FFF2-40B4-BE49-F238E27FC236}">
+                <a16:creationId xmlns:a16="http://schemas.microsoft.com/office/drawing/2014/main" id="{72350DB6-095E-4827-8944-2F0241861ED5}"/>
+              </a:ext>
+            </a:extLst>
+          </p:cNvPr>
+          <p:cNvSpPr>
+            <a:spLocks noGrp="1"/>
+          </p:cNvSpPr>
+          <p:nvPr>
+            <p:ph type="sldNum" sz="quarter" idx="12"/>
+          </p:nvPr>
+        </p:nvSpPr>
+        <p:spPr/>
+        <p:txBody>
+          <a:bodyPr/>
+          <a:lstStyle/>
+          <a:p>
+            <a:fld id="{CB3FC469-CA8B-4EE5-AE73-966FC6A86920}" type="slidenum">
+              <a:rPr lang="en-US" smtClean="0"/>
+              <a:t>24</a:t>
+            </a:fld>
+            <a:endParaRPr lang="en-US"/>
+          </a:p>
+        </p:txBody>
+      </p:sp>
+      <p:pic>
+        <p:nvPicPr>
+          <p:cNvPr id="6" name="Picture 5">
+            <a:extLst>
+              <a:ext uri="{FF2B5EF4-FFF2-40B4-BE49-F238E27FC236}">
+                <a16:creationId xmlns:a16="http://schemas.microsoft.com/office/drawing/2014/main" id="{740A6BD2-0209-E4FE-75B0-E55985B41B61}"/>
+              </a:ext>
+            </a:extLst>
+          </p:cNvPr>
+          <p:cNvPicPr>
+            <a:picLocks noChangeAspect="1"/>
+          </p:cNvPicPr>
+          <p:nvPr/>
+        </p:nvPicPr>
+        <p:blipFill>
+          <a:blip r:embed="rId2"/>
+          <a:stretch>
+            <a:fillRect/>
+          </a:stretch>
+        </p:blipFill>
+        <p:spPr>
+          <a:xfrm>
+            <a:off x="997665" y="1748824"/>
+            <a:ext cx="5334000" cy="4000500"/>
+          </a:xfrm>
+          <a:prstGeom prst="rect">
+            <a:avLst/>
+          </a:prstGeom>
+        </p:spPr>
+      </p:pic>
+      <p:pic>
+        <p:nvPicPr>
+          <p:cNvPr id="8" name="Picture 7">
+            <a:extLst>
+              <a:ext uri="{FF2B5EF4-FFF2-40B4-BE49-F238E27FC236}">
+                <a16:creationId xmlns:a16="http://schemas.microsoft.com/office/drawing/2014/main" id="{721B0AC6-D726-8DF8-91C5-2B58BD19B2DC}"/>
+              </a:ext>
+            </a:extLst>
+          </p:cNvPr>
+          <p:cNvPicPr>
+            <a:picLocks noChangeAspect="1"/>
+          </p:cNvPicPr>
+          <p:nvPr/>
+        </p:nvPicPr>
+        <p:blipFill>
+          <a:blip r:embed="rId3"/>
+          <a:stretch>
+            <a:fillRect/>
+          </a:stretch>
+        </p:blipFill>
+        <p:spPr>
+          <a:xfrm>
+            <a:off x="6331665" y="1748824"/>
+            <a:ext cx="5334000" cy="4000500"/>
+          </a:xfrm>
+          <a:prstGeom prst="rect">
+            <a:avLst/>
+          </a:prstGeom>
+        </p:spPr>
+      </p:pic>
+      <p:sp>
+        <p:nvSpPr>
+          <p:cNvPr id="9" name="Oval 8">
+            <a:extLst>
+              <a:ext uri="{FF2B5EF4-FFF2-40B4-BE49-F238E27FC236}">
+                <a16:creationId xmlns:a16="http://schemas.microsoft.com/office/drawing/2014/main" id="{0F523596-B8DB-C17D-E8F5-E01A00AC8A12}"/>
+              </a:ext>
+            </a:extLst>
+          </p:cNvPr>
+          <p:cNvSpPr/>
+          <p:nvPr/>
+        </p:nvSpPr>
+        <p:spPr>
+          <a:xfrm>
+            <a:off x="8445671" y="2063930"/>
+            <a:ext cx="1528354" cy="692179"/>
+          </a:xfrm>
+          <a:prstGeom prst="ellipse">
+            <a:avLst/>
+          </a:prstGeom>
+          <a:noFill/>
+          <a:ln w="38100">
+            <a:solidFill>
+              <a:srgbClr val="CC0000"/>
+            </a:solidFill>
+          </a:ln>
+        </p:spPr>
+        <p:style>
+          <a:lnRef idx="2">
+            <a:schemeClr val="accent1">
+              <a:shade val="15000"/>
+            </a:schemeClr>
+          </a:lnRef>
+          <a:fillRef idx="1">
+            <a:schemeClr val="accent1"/>
+          </a:fillRef>
+          <a:effectRef idx="0">
+            <a:schemeClr val="accent1"/>
+          </a:effectRef>
+          <a:fontRef idx="minor">
+            <a:schemeClr val="lt1"/>
+          </a:fontRef>
+        </p:style>
+        <p:txBody>
+          <a:bodyPr rtlCol="0" anchor="ctr"/>
+          <a:lstStyle/>
+          <a:p>
+            <a:pPr algn="ctr"/>
+            <a:endParaRPr lang="en-US"/>
+          </a:p>
+        </p:txBody>
+      </p:sp>
+    </p:spTree>
+    <p:extLst>
+      <p:ext uri="{BB962C8B-B14F-4D97-AF65-F5344CB8AC3E}">
+        <p14:creationId xmlns:p14="http://schemas.microsoft.com/office/powerpoint/2010/main" val="3817620713"/>
+      </p:ext>
+    </p:extLst>
+  </p:cSld>
+  <p:clrMapOvr>
+    <a:masterClrMapping/>
+  </p:clrMapOvr>
+</p:sld>
+</file>
+
+<file path=ppt/slides/slide25.xml><?xml version="1.0" encoding="utf-8"?>
+<p:sld xmlns:a="http://schemas.openxmlformats.org/drawingml/2006/main" xmlns:r="http://schemas.openxmlformats.org/officeDocument/2006/relationships" xmlns:p="http://schemas.openxmlformats.org/presentationml/2006/main">
+  <p:cSld>
+    <p:spTree>
+      <p:nvGrpSpPr>
+        <p:cNvPr id="1" name=""/>
+        <p:cNvGrpSpPr/>
+        <p:nvPr/>
+      </p:nvGrpSpPr>
+      <p:grpSpPr>
+        <a:xfrm>
+          <a:off x="0" y="0"/>
+          <a:ext cx="0" cy="0"/>
+          <a:chOff x="0" y="0"/>
+          <a:chExt cx="0" cy="0"/>
+        </a:xfrm>
+      </p:grpSpPr>
+      <p:sp>
+        <p:nvSpPr>
+          <p:cNvPr id="2" name="Title 1">
+            <a:extLst>
+              <a:ext uri="{FF2B5EF4-FFF2-40B4-BE49-F238E27FC236}">
+                <a16:creationId xmlns:a16="http://schemas.microsoft.com/office/drawing/2014/main" id="{A0FF9243-98FB-D249-B5BB-8A4089746517}"/>
+              </a:ext>
+            </a:extLst>
+          </p:cNvPr>
+          <p:cNvSpPr>
+            <a:spLocks noGrp="1"/>
+          </p:cNvSpPr>
+          <p:nvPr>
+            <p:ph type="title"/>
+          </p:nvPr>
+        </p:nvSpPr>
+        <p:spPr/>
+        <p:txBody>
+          <a:bodyPr>
+            <a:normAutofit/>
+          </a:bodyPr>
+          <a:lstStyle/>
+          <a:p>
+            <a:r>
+              <a:rPr lang="en-US" dirty="0"/>
+              <a:t>The other is if the polytope is adjacent to the edge, in which case there is 0 corridor width.</a:t>
+            </a:r>
+          </a:p>
+        </p:txBody>
+      </p:sp>
+      <p:sp>
+        <p:nvSpPr>
+          <p:cNvPr id="3" name="Slide Number Placeholder 2">
+            <a:extLst>
+              <a:ext uri="{FF2B5EF4-FFF2-40B4-BE49-F238E27FC236}">
+                <a16:creationId xmlns:a16="http://schemas.microsoft.com/office/drawing/2014/main" id="{6DE68882-0F8E-74F0-F80A-EC43FAD70AEA}"/>
+              </a:ext>
+            </a:extLst>
+          </p:cNvPr>
+          <p:cNvSpPr>
+            <a:spLocks noGrp="1"/>
+          </p:cNvSpPr>
+          <p:nvPr>
+            <p:ph type="sldNum" sz="quarter" idx="12"/>
+          </p:nvPr>
+        </p:nvSpPr>
+        <p:spPr/>
+        <p:txBody>
+          <a:bodyPr/>
+          <a:lstStyle/>
+          <a:p>
+            <a:fld id="{CB3FC469-CA8B-4EE5-AE73-966FC6A86920}" type="slidenum">
+              <a:rPr lang="en-US" smtClean="0"/>
+              <a:t>25</a:t>
+            </a:fld>
+            <a:endParaRPr lang="en-US"/>
+          </a:p>
+        </p:txBody>
+      </p:sp>
+      <p:sp>
+        <p:nvSpPr>
+          <p:cNvPr id="4" name="Content Placeholder 3">
+            <a:extLst>
+              <a:ext uri="{FF2B5EF4-FFF2-40B4-BE49-F238E27FC236}">
+                <a16:creationId xmlns:a16="http://schemas.microsoft.com/office/drawing/2014/main" id="{A7C387BE-2CF5-2508-F10F-EEE990DE4370}"/>
+              </a:ext>
+            </a:extLst>
+          </p:cNvPr>
+          <p:cNvSpPr>
+            <a:spLocks noGrp="1"/>
+          </p:cNvSpPr>
+          <p:nvPr>
+            <p:ph idx="1"/>
+          </p:nvPr>
+        </p:nvSpPr>
+        <p:spPr/>
+        <p:txBody>
+          <a:bodyPr/>
+          <a:lstStyle/>
+          <a:p>
+            <a:endParaRPr lang="en-US"/>
+          </a:p>
+        </p:txBody>
+      </p:sp>
+      <p:pic>
+        <p:nvPicPr>
+          <p:cNvPr id="5" name="Picture 4">
+            <a:extLst>
+              <a:ext uri="{FF2B5EF4-FFF2-40B4-BE49-F238E27FC236}">
+                <a16:creationId xmlns:a16="http://schemas.microsoft.com/office/drawing/2014/main" id="{78FA7339-E9C2-7A75-2E2E-DD64CA5D7415}"/>
+              </a:ext>
+            </a:extLst>
+          </p:cNvPr>
+          <p:cNvPicPr>
+            <a:picLocks noChangeAspect="1"/>
+          </p:cNvPicPr>
+          <p:nvPr/>
+        </p:nvPicPr>
+        <p:blipFill>
+          <a:blip r:embed="rId2"/>
+          <a:stretch>
+            <a:fillRect/>
+          </a:stretch>
+        </p:blipFill>
+        <p:spPr>
+          <a:xfrm>
+            <a:off x="997665" y="1748824"/>
+            <a:ext cx="5334000" cy="4000500"/>
+          </a:xfrm>
+          <a:prstGeom prst="rect">
+            <a:avLst/>
+          </a:prstGeom>
+        </p:spPr>
+      </p:pic>
+      <p:pic>
+        <p:nvPicPr>
+          <p:cNvPr id="6" name="Picture 5">
+            <a:extLst>
+              <a:ext uri="{FF2B5EF4-FFF2-40B4-BE49-F238E27FC236}">
+                <a16:creationId xmlns:a16="http://schemas.microsoft.com/office/drawing/2014/main" id="{0366F7DF-5F25-D238-CC0B-C20826386C97}"/>
+              </a:ext>
+            </a:extLst>
+          </p:cNvPr>
+          <p:cNvPicPr>
+            <a:picLocks noChangeAspect="1"/>
+          </p:cNvPicPr>
+          <p:nvPr/>
+        </p:nvPicPr>
+        <p:blipFill>
+          <a:blip r:embed="rId3"/>
+          <a:stretch>
+            <a:fillRect/>
+          </a:stretch>
+        </p:blipFill>
+        <p:spPr>
+          <a:xfrm>
+            <a:off x="6331665" y="1748824"/>
+            <a:ext cx="5334000" cy="4000500"/>
+          </a:xfrm>
+          <a:prstGeom prst="rect">
+            <a:avLst/>
+          </a:prstGeom>
+        </p:spPr>
+      </p:pic>
+      <p:sp>
+        <p:nvSpPr>
+          <p:cNvPr id="7" name="Oval 6">
+            <a:extLst>
+              <a:ext uri="{FF2B5EF4-FFF2-40B4-BE49-F238E27FC236}">
+                <a16:creationId xmlns:a16="http://schemas.microsoft.com/office/drawing/2014/main" id="{563E83F0-FA14-82C5-5F34-6FF8641314D9}"/>
+              </a:ext>
+            </a:extLst>
+          </p:cNvPr>
+          <p:cNvSpPr/>
+          <p:nvPr/>
+        </p:nvSpPr>
+        <p:spPr>
+          <a:xfrm>
+            <a:off x="3011522" y="2103120"/>
+            <a:ext cx="1528354" cy="561549"/>
+          </a:xfrm>
+          <a:prstGeom prst="ellipse">
+            <a:avLst/>
+          </a:prstGeom>
+          <a:noFill/>
+          <a:ln w="38100">
+            <a:solidFill>
+              <a:srgbClr val="CC0000"/>
+            </a:solidFill>
+          </a:ln>
+        </p:spPr>
+        <p:style>
+          <a:lnRef idx="2">
+            <a:schemeClr val="accent1">
+              <a:shade val="15000"/>
+            </a:schemeClr>
+          </a:lnRef>
+          <a:fillRef idx="1">
+            <a:schemeClr val="accent1"/>
+          </a:fillRef>
+          <a:effectRef idx="0">
+            <a:schemeClr val="accent1"/>
+          </a:effectRef>
+          <a:fontRef idx="minor">
+            <a:schemeClr val="lt1"/>
+          </a:fontRef>
+        </p:style>
+        <p:txBody>
+          <a:bodyPr rtlCol="0" anchor="ctr"/>
+          <a:lstStyle/>
+          <a:p>
+            <a:pPr algn="ctr"/>
+            <a:endParaRPr lang="en-US"/>
+          </a:p>
+        </p:txBody>
+      </p:sp>
+      <p:sp>
+        <p:nvSpPr>
+          <p:cNvPr id="8" name="Oval 7">
+            <a:extLst>
+              <a:ext uri="{FF2B5EF4-FFF2-40B4-BE49-F238E27FC236}">
+                <a16:creationId xmlns:a16="http://schemas.microsoft.com/office/drawing/2014/main" id="{F6B953AA-A7E2-5D9C-E11E-519CAADBD6F4}"/>
+              </a:ext>
+            </a:extLst>
+          </p:cNvPr>
+          <p:cNvSpPr/>
+          <p:nvPr/>
+        </p:nvSpPr>
+        <p:spPr>
+          <a:xfrm>
+            <a:off x="2900488" y="4193332"/>
+            <a:ext cx="1528354" cy="561549"/>
+          </a:xfrm>
+          <a:prstGeom prst="ellipse">
+            <a:avLst/>
+          </a:prstGeom>
+          <a:noFill/>
+          <a:ln w="38100">
+            <a:solidFill>
+              <a:srgbClr val="CC0000"/>
+            </a:solidFill>
+          </a:ln>
+        </p:spPr>
+        <p:style>
+          <a:lnRef idx="2">
+            <a:schemeClr val="accent1">
+              <a:shade val="15000"/>
+            </a:schemeClr>
+          </a:lnRef>
+          <a:fillRef idx="1">
+            <a:schemeClr val="accent1"/>
+          </a:fillRef>
+          <a:effectRef idx="0">
+            <a:schemeClr val="accent1"/>
+          </a:effectRef>
+          <a:fontRef idx="minor">
+            <a:schemeClr val="lt1"/>
+          </a:fontRef>
+        </p:style>
+        <p:txBody>
+          <a:bodyPr rtlCol="0" anchor="ctr"/>
+          <a:lstStyle/>
+          <a:p>
+            <a:pPr algn="ctr"/>
+            <a:endParaRPr lang="en-US"/>
+          </a:p>
+        </p:txBody>
+      </p:sp>
+    </p:spTree>
+    <p:extLst>
+      <p:ext uri="{BB962C8B-B14F-4D97-AF65-F5344CB8AC3E}">
+        <p14:creationId xmlns:p14="http://schemas.microsoft.com/office/powerpoint/2010/main" val="4181363972"/>
+      </p:ext>
+    </p:extLst>
+  </p:cSld>
+  <p:clrMapOvr>
+    <a:masterClrMapping/>
+  </p:clrMapOvr>
+</p:sld>
+</file>
+
+<file path=ppt/slides/slide26.xml><?xml version="1.0" encoding="utf-8"?>
+<p:sld xmlns:a="http://schemas.openxmlformats.org/drawingml/2006/main" xmlns:r="http://schemas.openxmlformats.org/officeDocument/2006/relationships" xmlns:p="http://schemas.openxmlformats.org/presentationml/2006/main">
+  <p:cSld>
+    <p:spTree>
+      <p:nvGrpSpPr>
+        <p:cNvPr id="1" name=""/>
+        <p:cNvGrpSpPr/>
+        <p:nvPr/>
+      </p:nvGrpSpPr>
+      <p:grpSpPr>
+        <a:xfrm>
+          <a:off x="0" y="0"/>
+          <a:ext cx="0" cy="0"/>
+          <a:chOff x="0" y="0"/>
+          <a:chExt cx="0" cy="0"/>
+        </a:xfrm>
+      </p:grpSpPr>
+      <p:sp>
+        <p:nvSpPr>
+          <p:cNvPr id="2" name="Slide Number Placeholder 1"/>
+          <p:cNvSpPr>
+            <a:spLocks noGrp="1"/>
+          </p:cNvSpPr>
+          <p:nvPr>
+            <p:ph type="sldNum" sz="quarter" idx="12"/>
+          </p:nvPr>
+        </p:nvSpPr>
+        <p:spPr/>
+        <p:txBody>
+          <a:bodyPr/>
+          <a:lstStyle/>
+          <a:p>
+            <a:fld id="{CB3FC469-CA8B-4EE5-AE73-966FC6A86920}" type="slidenum">
+              <a:rPr lang="en-US" smtClean="0"/>
+              <a:t>26</a:t>
+            </a:fld>
+            <a:endParaRPr lang="en-US"/>
+          </a:p>
+        </p:txBody>
+      </p:sp>
+      <p:sp>
+        <p:nvSpPr>
+          <p:cNvPr id="3" name="Title 2"/>
+          <p:cNvSpPr>
+            <a:spLocks noGrp="1"/>
+          </p:cNvSpPr>
+          <p:nvPr>
+            <p:ph type="title"/>
+          </p:nvPr>
+        </p:nvSpPr>
+        <p:spPr/>
+        <p:txBody>
+          <a:bodyPr>
+            <a:normAutofit fontScale="90000"/>
+          </a:bodyPr>
+          <a:lstStyle/>
+          <a:p>
+            <a:r>
+              <a:rPr lang="en-US" dirty="0"/>
+              <a:t>The cost distance cost of each edge is added to the inverse of the max of the left and right corridor widths to incentivize wider corridors.</a:t>
+            </a:r>
+          </a:p>
+        </p:txBody>
+      </p:sp>
+      <p:pic>
+        <p:nvPicPr>
+          <p:cNvPr id="6" name="Picture 5"/>
+          <p:cNvPicPr>
+            <a:picLocks noChangeAspect="1"/>
+          </p:cNvPicPr>
+          <p:nvPr/>
+        </p:nvPicPr>
+        <p:blipFill>
+          <a:blip r:embed="rId2"/>
+          <a:stretch>
+            <a:fillRect/>
+          </a:stretch>
+        </p:blipFill>
+        <p:spPr>
+          <a:xfrm>
+            <a:off x="5421400" y="2318639"/>
+            <a:ext cx="4913901" cy="3685426"/>
+          </a:xfrm>
+          <a:prstGeom prst="rect">
+            <a:avLst/>
+          </a:prstGeom>
+          <a:solidFill>
+            <a:schemeClr val="bg1"/>
+          </a:solidFill>
+          <a:ln>
+            <a:solidFill>
+              <a:schemeClr val="tx1"/>
+            </a:solidFill>
+          </a:ln>
+        </p:spPr>
+      </p:pic>
+      <mc:AlternateContent xmlns:mc="http://schemas.openxmlformats.org/markup-compatibility/2006">
+        <mc:Choice xmlns:a14="http://schemas.microsoft.com/office/drawing/2010/main" Requires="a14">
+          <p:sp>
+            <p:nvSpPr>
+              <p:cNvPr id="4" name="TextBox 3">
+                <a:extLst>
+                  <a:ext uri="{FF2B5EF4-FFF2-40B4-BE49-F238E27FC236}">
+                    <a16:creationId xmlns:a16="http://schemas.microsoft.com/office/drawing/2014/main" id="{D94F728C-DE99-0B4E-97FB-820F7C5B5112}"/>
+                  </a:ext>
+                </a:extLst>
+              </p:cNvPr>
+              <p:cNvSpPr txBox="1"/>
+              <p:nvPr/>
+            </p:nvSpPr>
+            <p:spPr>
+              <a:xfrm>
+                <a:off x="469232" y="2460321"/>
+                <a:ext cx="4791505" cy="270652"/>
+              </a:xfrm>
+              <a:prstGeom prst="rect">
+                <a:avLst/>
+              </a:prstGeom>
+              <a:noFill/>
+            </p:spPr>
+            <p:txBody>
+              <a:bodyPr wrap="none" lIns="0" tIns="0" rIns="0" bIns="0" rtlCol="0">
+                <a:spAutoFit/>
+              </a:bodyPr>
+              <a:lstStyle/>
+              <a:p>
+                <a:pPr/>
+                <a14:m>
+                  <m:oMathPara xmlns:m="http://schemas.openxmlformats.org/officeDocument/2006/math">
+                    <m:oMathParaPr>
+                      <m:jc m:val="centerGroup"/>
+                    </m:oMathParaPr>
+                    <m:oMath xmlns:m="http://schemas.openxmlformats.org/officeDocument/2006/math">
+                      <m:r>
+                        <a:rPr lang="en-US" b="0" i="1" smtClean="0">
+                          <a:latin typeface="Cambria Math" panose="02040503050406030204" pitchFamily="18" charset="0"/>
+                        </a:rPr>
+                        <m:t>𝐶</m:t>
+                      </m:r>
+                      <m:r>
+                        <a:rPr lang="en-US" b="0" i="1" baseline="-25000" smtClean="0">
+                          <a:latin typeface="Cambria Math" panose="02040503050406030204" pitchFamily="18" charset="0"/>
+                        </a:rPr>
+                        <m:t>𝑡𝑜𝑡</m:t>
+                      </m:r>
+                      <m:r>
+                        <a:rPr lang="en-US" b="0" i="1" smtClean="0">
+                          <a:latin typeface="Cambria Math" panose="02040503050406030204" pitchFamily="18" charset="0"/>
+                        </a:rPr>
+                        <m:t>=</m:t>
+                      </m:r>
+                      <m:r>
+                        <a:rPr lang="en-US" b="0" i="1" smtClean="0">
+                          <a:latin typeface="Cambria Math" panose="02040503050406030204" pitchFamily="18" charset="0"/>
+                        </a:rPr>
+                        <m:t>𝐶𝑑𝑖𝑠𝑡</m:t>
+                      </m:r>
+                      <m:r>
+                        <a:rPr lang="en-US" b="0" i="1" smtClean="0">
+                          <a:latin typeface="Cambria Math" panose="02040503050406030204" pitchFamily="18" charset="0"/>
+                        </a:rPr>
+                        <m:t>+</m:t>
+                      </m:r>
+                      <m:d>
+                        <m:dPr>
+                          <m:ctrlPr>
+                            <a:rPr lang="en-US" b="0" i="1" smtClean="0">
+                              <a:latin typeface="Cambria Math" panose="02040503050406030204" pitchFamily="18" charset="0"/>
+                            </a:rPr>
+                          </m:ctrlPr>
+                        </m:dPr>
+                        <m:e>
+                          <m:func>
+                            <m:funcPr>
+                              <m:ctrlPr>
+                                <a:rPr lang="en-US" b="0" i="1" smtClean="0">
+                                  <a:latin typeface="Cambria Math" panose="02040503050406030204" pitchFamily="18" charset="0"/>
+                                </a:rPr>
+                              </m:ctrlPr>
+                            </m:funcPr>
+                            <m:fName>
+                              <m:r>
+                                <m:rPr>
+                                  <m:sty m:val="p"/>
+                                </m:rPr>
+                                <a:rPr lang="en-US" b="0" i="0" smtClean="0">
+                                  <a:latin typeface="Cambria Math" panose="02040503050406030204" pitchFamily="18" charset="0"/>
+                                </a:rPr>
+                                <m:t>max</m:t>
+                              </m:r>
+                            </m:fName>
+                            <m:e>
+                              <m:d>
+                                <m:dPr>
+                                  <m:begChr m:val="{"/>
+                                  <m:endChr m:val="}"/>
+                                  <m:ctrlPr>
+                                    <a:rPr lang="en-US" b="0" i="1" smtClean="0">
+                                      <a:latin typeface="Cambria Math" panose="02040503050406030204" pitchFamily="18" charset="0"/>
+                                    </a:rPr>
+                                  </m:ctrlPr>
+                                </m:dPr>
+                                <m:e>
+                                  <m:r>
+                                    <a:rPr lang="en-US" b="0" i="1" smtClean="0">
+                                      <a:latin typeface="Cambria Math" panose="02040503050406030204" pitchFamily="18" charset="0"/>
+                                    </a:rPr>
+                                    <m:t>𝑤𝑖𝑑𝑡h</m:t>
+                                  </m:r>
+                                  <m:r>
+                                    <a:rPr lang="en-US" b="0" i="1" baseline="-25000" smtClean="0">
+                                      <a:latin typeface="Cambria Math" panose="02040503050406030204" pitchFamily="18" charset="0"/>
+                                    </a:rPr>
+                                    <m:t>𝑖𝑗</m:t>
+                                  </m:r>
+                                  <m:r>
+                                    <a:rPr lang="en-US" b="0" i="1" baseline="-25000" smtClean="0">
+                                      <a:latin typeface="Cambria Math" panose="02040503050406030204" pitchFamily="18" charset="0"/>
+                                    </a:rPr>
+                                    <m:t>,</m:t>
+                                  </m:r>
+                                  <m:r>
+                                    <a:rPr lang="en-US" b="0" i="1" baseline="-25000" smtClean="0">
+                                      <a:latin typeface="Cambria Math" panose="02040503050406030204" pitchFamily="18" charset="0"/>
+                                    </a:rPr>
+                                    <m:t>𝑙𝑒𝑓𝑡</m:t>
+                                  </m:r>
+                                  <m:r>
+                                    <a:rPr lang="en-US" b="0" i="1" smtClean="0">
+                                      <a:latin typeface="Cambria Math" panose="02040503050406030204" pitchFamily="18" charset="0"/>
+                                    </a:rPr>
+                                    <m:t> , </m:t>
+                                  </m:r>
+                                  <m:r>
+                                    <a:rPr lang="en-US" b="0" i="1" smtClean="0">
+                                      <a:latin typeface="Cambria Math" panose="02040503050406030204" pitchFamily="18" charset="0"/>
+                                    </a:rPr>
+                                    <m:t>𝑤𝑖𝑑𝑡h𝑖𝑗</m:t>
+                                  </m:r>
+                                  <m:r>
+                                    <a:rPr lang="en-US" b="0" i="1" baseline="-25000" smtClean="0">
+                                      <a:latin typeface="Cambria Math" panose="02040503050406030204" pitchFamily="18" charset="0"/>
+                                    </a:rPr>
+                                    <m:t>,</m:t>
+                                  </m:r>
+                                  <m:r>
+                                    <a:rPr lang="en-US" b="0" i="1" baseline="-25000" smtClean="0">
+                                      <a:latin typeface="Cambria Math" panose="02040503050406030204" pitchFamily="18" charset="0"/>
+                                    </a:rPr>
+                                    <m:t>𝑟𝑖𝑔h𝑡</m:t>
+                                  </m:r>
+                                </m:e>
+                              </m:d>
+                            </m:e>
+                          </m:func>
+                        </m:e>
+                      </m:d>
+                      <m:r>
+                        <a:rPr lang="en-US" b="0" i="1" baseline="30000" smtClean="0">
+                          <a:latin typeface="Cambria Math" panose="02040503050406030204" pitchFamily="18" charset="0"/>
+                        </a:rPr>
+                        <m:t>−1</m:t>
+                      </m:r>
+                    </m:oMath>
+                  </m:oMathPara>
+                </a14:m>
+                <a:endParaRPr lang="en-US" baseline="30000" dirty="0"/>
+              </a:p>
+            </p:txBody>
+          </p:sp>
+        </mc:Choice>
+        <mc:Fallback>
+          <p:sp>
+            <p:nvSpPr>
+              <p:cNvPr id="4" name="TextBox 3">
+                <a:extLst>
+                  <a:ext uri="{FF2B5EF4-FFF2-40B4-BE49-F238E27FC236}">
+                    <a16:creationId xmlns:a16="http://schemas.microsoft.com/office/drawing/2014/main" id="{D94F728C-DE99-0B4E-97FB-820F7C5B5112}"/>
+                  </a:ext>
+                </a:extLst>
+              </p:cNvPr>
+              <p:cNvSpPr txBox="1">
+                <a:spLocks noRot="1" noChangeAspect="1" noMove="1" noResize="1" noEditPoints="1" noAdjustHandles="1" noChangeArrowheads="1" noChangeShapeType="1" noTextEdit="1"/>
+              </p:cNvSpPr>
+              <p:nvPr/>
+            </p:nvSpPr>
+            <p:spPr>
+              <a:xfrm>
+                <a:off x="469232" y="2460321"/>
+                <a:ext cx="4791505" cy="270652"/>
+              </a:xfrm>
+              <a:prstGeom prst="rect">
+                <a:avLst/>
+              </a:prstGeom>
+              <a:blipFill>
+                <a:blip r:embed="rId3"/>
+                <a:stretch>
+                  <a:fillRect l="-1781" t="-2273" r="-3435" b="-40909"/>
+                </a:stretch>
+              </a:blipFill>
+            </p:spPr>
+            <p:txBody>
+              <a:bodyPr/>
+              <a:lstStyle/>
+              <a:p>
+                <a:r>
+                  <a:rPr lang="en-US">
+                    <a:noFill/>
+                  </a:rPr>
+                  <a:t> </a:t>
+                </a:r>
+              </a:p>
+            </p:txBody>
+          </p:sp>
+        </mc:Fallback>
+      </mc:AlternateContent>
+    </p:spTree>
+    <p:extLst>
+      <p:ext uri="{BB962C8B-B14F-4D97-AF65-F5344CB8AC3E}">
+        <p14:creationId xmlns:p14="http://schemas.microsoft.com/office/powerpoint/2010/main" val="119321380"/>
       </p:ext>
     </p:extLst>
   </p:cSld>

</xml_diff>

<commit_message>
comment route interpolation, document vgraph modification, remove unused test fixtures
</commit_message>
<xml_diff>
--- a/Documentation/bounded_astar_documentation.pptx
+++ b/Documentation/bounded_astar_documentation.pptx
@@ -5,7 +5,7 @@
     <p:sldMasterId id="2147483648" r:id="rId1"/>
   </p:sldMasterIdLst>
   <p:notesMasterIdLst>
-    <p:notesMasterId r:id="rId28"/>
+    <p:notesMasterId r:id="rId36"/>
   </p:notesMasterIdLst>
   <p:sldIdLst>
     <p:sldId id="256" r:id="rId2"/>
@@ -34,6 +34,14 @@
     <p:sldId id="296" r:id="rId25"/>
     <p:sldId id="297" r:id="rId26"/>
     <p:sldId id="298" r:id="rId27"/>
+    <p:sldId id="271" r:id="rId28"/>
+    <p:sldId id="272" r:id="rId29"/>
+    <p:sldId id="273" r:id="rId30"/>
+    <p:sldId id="274" r:id="rId31"/>
+    <p:sldId id="275" r:id="rId32"/>
+    <p:sldId id="276" r:id="rId33"/>
+    <p:sldId id="277" r:id="rId34"/>
+    <p:sldId id="278" r:id="rId35"/>
   </p:sldIdLst>
   <p:sldSz cx="12192000" cy="6858000"/>
   <p:notesSz cx="6858000" cy="9144000"/>
@@ -169,6 +177,18 @@
             <p14:sldId id="298"/>
           </p14:sldIdLst>
         </p14:section>
+        <p14:section name="modify_vgraph" id="{F1ACF182-62C2-4329-B1D2-92184E411B74}">
+          <p14:sldIdLst>
+            <p14:sldId id="271"/>
+            <p14:sldId id="272"/>
+            <p14:sldId id="273"/>
+            <p14:sldId id="274"/>
+            <p14:sldId id="275"/>
+            <p14:sldId id="276"/>
+            <p14:sldId id="277"/>
+            <p14:sldId id="278"/>
+          </p14:sldIdLst>
+        </p14:section>
       </p14:sectionLst>
     </p:ext>
     <p:ext uri="{EFAFB233-063F-42B5-8137-9DF3F51BA10A}">
@@ -625,6 +645,426 @@
     <p:extLst>
       <p:ext uri="{BB962C8B-B14F-4D97-AF65-F5344CB8AC3E}">
         <p14:creationId xmlns:p14="http://schemas.microsoft.com/office/powerpoint/2010/main" val="4063533551"/>
+      </p:ext>
+    </p:extLst>
+  </p:cSld>
+  <p:clrMapOvr>
+    <a:masterClrMapping/>
+  </p:clrMapOvr>
+</p:notes>
+</file>
+
+<file path=ppt/notesSlides/notesSlide2.xml><?xml version="1.0" encoding="utf-8"?>
+<p:notes xmlns:a="http://schemas.openxmlformats.org/drawingml/2006/main" xmlns:r="http://schemas.openxmlformats.org/officeDocument/2006/relationships" xmlns:p="http://schemas.openxmlformats.org/presentationml/2006/main">
+  <p:cSld>
+    <p:spTree>
+      <p:nvGrpSpPr>
+        <p:cNvPr id="1" name=""/>
+        <p:cNvGrpSpPr/>
+        <p:nvPr/>
+      </p:nvGrpSpPr>
+      <p:grpSpPr>
+        <a:xfrm>
+          <a:off x="0" y="0"/>
+          <a:ext cx="0" cy="0"/>
+          <a:chOff x="0" y="0"/>
+          <a:chExt cx="0" cy="0"/>
+        </a:xfrm>
+      </p:grpSpPr>
+      <p:sp>
+        <p:nvSpPr>
+          <p:cNvPr id="2" name="Slide Image Placeholder 1"/>
+          <p:cNvSpPr>
+            <a:spLocks noGrp="1" noRot="1" noChangeAspect="1"/>
+          </p:cNvSpPr>
+          <p:nvPr>
+            <p:ph type="sldImg"/>
+          </p:nvPr>
+        </p:nvSpPr>
+        <p:spPr/>
+      </p:sp>
+      <p:sp>
+        <p:nvSpPr>
+          <p:cNvPr id="3" name="Notes Placeholder 2"/>
+          <p:cNvSpPr>
+            <a:spLocks noGrp="1"/>
+          </p:cNvSpPr>
+          <p:nvPr>
+            <p:ph type="body" idx="1"/>
+          </p:nvPr>
+        </p:nvSpPr>
+        <p:spPr/>
+        <p:txBody>
+          <a:bodyPr/>
+          <a:lstStyle/>
+          <a:p>
+            <a:endParaRPr lang="en-US" dirty="0"/>
+          </a:p>
+        </p:txBody>
+      </p:sp>
+      <p:sp>
+        <p:nvSpPr>
+          <p:cNvPr id="4" name="Slide Number Placeholder 3"/>
+          <p:cNvSpPr>
+            <a:spLocks noGrp="1"/>
+          </p:cNvSpPr>
+          <p:nvPr>
+            <p:ph type="sldNum" sz="quarter" idx="10"/>
+          </p:nvPr>
+        </p:nvSpPr>
+        <p:spPr/>
+        <p:txBody>
+          <a:bodyPr/>
+          <a:lstStyle/>
+          <a:p>
+            <a:fld id="{645FDDD2-7D0B-4F28-9387-03082E62BAE2}" type="slidenum">
+              <a:rPr lang="en-US" smtClean="0"/>
+              <a:t>27</a:t>
+            </a:fld>
+            <a:endParaRPr lang="en-US"/>
+          </a:p>
+        </p:txBody>
+      </p:sp>
+    </p:spTree>
+    <p:extLst>
+      <p:ext uri="{BB962C8B-B14F-4D97-AF65-F5344CB8AC3E}">
+        <p14:creationId xmlns:p14="http://schemas.microsoft.com/office/powerpoint/2010/main" val="57520352"/>
+      </p:ext>
+    </p:extLst>
+  </p:cSld>
+  <p:clrMapOvr>
+    <a:masterClrMapping/>
+  </p:clrMapOvr>
+</p:notes>
+</file>
+
+<file path=ppt/notesSlides/notesSlide3.xml><?xml version="1.0" encoding="utf-8"?>
+<p:notes xmlns:a="http://schemas.openxmlformats.org/drawingml/2006/main" xmlns:r="http://schemas.openxmlformats.org/officeDocument/2006/relationships" xmlns:p="http://schemas.openxmlformats.org/presentationml/2006/main">
+  <p:cSld>
+    <p:spTree>
+      <p:nvGrpSpPr>
+        <p:cNvPr id="1" name=""/>
+        <p:cNvGrpSpPr/>
+        <p:nvPr/>
+      </p:nvGrpSpPr>
+      <p:grpSpPr>
+        <a:xfrm>
+          <a:off x="0" y="0"/>
+          <a:ext cx="0" cy="0"/>
+          <a:chOff x="0" y="0"/>
+          <a:chExt cx="0" cy="0"/>
+        </a:xfrm>
+      </p:grpSpPr>
+      <p:sp>
+        <p:nvSpPr>
+          <p:cNvPr id="2" name="Slide Image Placeholder 1"/>
+          <p:cNvSpPr>
+            <a:spLocks noGrp="1" noRot="1" noChangeAspect="1"/>
+          </p:cNvSpPr>
+          <p:nvPr>
+            <p:ph type="sldImg"/>
+          </p:nvPr>
+        </p:nvSpPr>
+        <p:spPr/>
+      </p:sp>
+      <p:sp>
+        <p:nvSpPr>
+          <p:cNvPr id="3" name="Notes Placeholder 2"/>
+          <p:cNvSpPr>
+            <a:spLocks noGrp="1"/>
+          </p:cNvSpPr>
+          <p:nvPr>
+            <p:ph type="body" idx="1"/>
+          </p:nvPr>
+        </p:nvSpPr>
+        <p:spPr/>
+        <p:txBody>
+          <a:bodyPr/>
+          <a:lstStyle/>
+          <a:p>
+            <a:endParaRPr lang="en-US" dirty="0"/>
+          </a:p>
+        </p:txBody>
+      </p:sp>
+      <p:sp>
+        <p:nvSpPr>
+          <p:cNvPr id="4" name="Slide Number Placeholder 3"/>
+          <p:cNvSpPr>
+            <a:spLocks noGrp="1"/>
+          </p:cNvSpPr>
+          <p:nvPr>
+            <p:ph type="sldNum" sz="quarter" idx="10"/>
+          </p:nvPr>
+        </p:nvSpPr>
+        <p:spPr/>
+        <p:txBody>
+          <a:bodyPr/>
+          <a:lstStyle/>
+          <a:p>
+            <a:fld id="{645FDDD2-7D0B-4F28-9387-03082E62BAE2}" type="slidenum">
+              <a:rPr lang="en-US" smtClean="0"/>
+              <a:t>31</a:t>
+            </a:fld>
+            <a:endParaRPr lang="en-US"/>
+          </a:p>
+        </p:txBody>
+      </p:sp>
+    </p:spTree>
+    <p:extLst>
+      <p:ext uri="{BB962C8B-B14F-4D97-AF65-F5344CB8AC3E}">
+        <p14:creationId xmlns:p14="http://schemas.microsoft.com/office/powerpoint/2010/main" val="3366771079"/>
+      </p:ext>
+    </p:extLst>
+  </p:cSld>
+  <p:clrMapOvr>
+    <a:masterClrMapping/>
+  </p:clrMapOvr>
+</p:notes>
+</file>
+
+<file path=ppt/notesSlides/notesSlide4.xml><?xml version="1.0" encoding="utf-8"?>
+<p:notes xmlns:a="http://schemas.openxmlformats.org/drawingml/2006/main" xmlns:r="http://schemas.openxmlformats.org/officeDocument/2006/relationships" xmlns:p="http://schemas.openxmlformats.org/presentationml/2006/main">
+  <p:cSld>
+    <p:spTree>
+      <p:nvGrpSpPr>
+        <p:cNvPr id="1" name=""/>
+        <p:cNvGrpSpPr/>
+        <p:nvPr/>
+      </p:nvGrpSpPr>
+      <p:grpSpPr>
+        <a:xfrm>
+          <a:off x="0" y="0"/>
+          <a:ext cx="0" cy="0"/>
+          <a:chOff x="0" y="0"/>
+          <a:chExt cx="0" cy="0"/>
+        </a:xfrm>
+      </p:grpSpPr>
+      <p:sp>
+        <p:nvSpPr>
+          <p:cNvPr id="2" name="Slide Image Placeholder 1"/>
+          <p:cNvSpPr>
+            <a:spLocks noGrp="1" noRot="1" noChangeAspect="1"/>
+          </p:cNvSpPr>
+          <p:nvPr>
+            <p:ph type="sldImg"/>
+          </p:nvPr>
+        </p:nvSpPr>
+        <p:spPr/>
+      </p:sp>
+      <p:sp>
+        <p:nvSpPr>
+          <p:cNvPr id="3" name="Notes Placeholder 2"/>
+          <p:cNvSpPr>
+            <a:spLocks noGrp="1"/>
+          </p:cNvSpPr>
+          <p:nvPr>
+            <p:ph type="body" idx="1"/>
+          </p:nvPr>
+        </p:nvSpPr>
+        <p:spPr/>
+        <p:txBody>
+          <a:bodyPr/>
+          <a:lstStyle/>
+          <a:p>
+            <a:endParaRPr lang="en-US" dirty="0"/>
+          </a:p>
+        </p:txBody>
+      </p:sp>
+      <p:sp>
+        <p:nvSpPr>
+          <p:cNvPr id="4" name="Slide Number Placeholder 3"/>
+          <p:cNvSpPr>
+            <a:spLocks noGrp="1"/>
+          </p:cNvSpPr>
+          <p:nvPr>
+            <p:ph type="sldNum" sz="quarter" idx="10"/>
+          </p:nvPr>
+        </p:nvSpPr>
+        <p:spPr/>
+        <p:txBody>
+          <a:bodyPr/>
+          <a:lstStyle/>
+          <a:p>
+            <a:fld id="{645FDDD2-7D0B-4F28-9387-03082E62BAE2}" type="slidenum">
+              <a:rPr lang="en-US" smtClean="0"/>
+              <a:t>32</a:t>
+            </a:fld>
+            <a:endParaRPr lang="en-US"/>
+          </a:p>
+        </p:txBody>
+      </p:sp>
+    </p:spTree>
+    <p:extLst>
+      <p:ext uri="{BB962C8B-B14F-4D97-AF65-F5344CB8AC3E}">
+        <p14:creationId xmlns:p14="http://schemas.microsoft.com/office/powerpoint/2010/main" val="2501614454"/>
+      </p:ext>
+    </p:extLst>
+  </p:cSld>
+  <p:clrMapOvr>
+    <a:masterClrMapping/>
+  </p:clrMapOvr>
+</p:notes>
+</file>
+
+<file path=ppt/notesSlides/notesSlide5.xml><?xml version="1.0" encoding="utf-8"?>
+<p:notes xmlns:a="http://schemas.openxmlformats.org/drawingml/2006/main" xmlns:r="http://schemas.openxmlformats.org/officeDocument/2006/relationships" xmlns:p="http://schemas.openxmlformats.org/presentationml/2006/main">
+  <p:cSld>
+    <p:spTree>
+      <p:nvGrpSpPr>
+        <p:cNvPr id="1" name=""/>
+        <p:cNvGrpSpPr/>
+        <p:nvPr/>
+      </p:nvGrpSpPr>
+      <p:grpSpPr>
+        <a:xfrm>
+          <a:off x="0" y="0"/>
+          <a:ext cx="0" cy="0"/>
+          <a:chOff x="0" y="0"/>
+          <a:chExt cx="0" cy="0"/>
+        </a:xfrm>
+      </p:grpSpPr>
+      <p:sp>
+        <p:nvSpPr>
+          <p:cNvPr id="2" name="Slide Image Placeholder 1"/>
+          <p:cNvSpPr>
+            <a:spLocks noGrp="1" noRot="1" noChangeAspect="1"/>
+          </p:cNvSpPr>
+          <p:nvPr>
+            <p:ph type="sldImg"/>
+          </p:nvPr>
+        </p:nvSpPr>
+        <p:spPr/>
+      </p:sp>
+      <p:sp>
+        <p:nvSpPr>
+          <p:cNvPr id="3" name="Notes Placeholder 2"/>
+          <p:cNvSpPr>
+            <a:spLocks noGrp="1"/>
+          </p:cNvSpPr>
+          <p:nvPr>
+            <p:ph type="body" idx="1"/>
+          </p:nvPr>
+        </p:nvSpPr>
+        <p:spPr/>
+        <p:txBody>
+          <a:bodyPr/>
+          <a:lstStyle/>
+          <a:p>
+            <a:endParaRPr lang="en-US" dirty="0"/>
+          </a:p>
+        </p:txBody>
+      </p:sp>
+      <p:sp>
+        <p:nvSpPr>
+          <p:cNvPr id="4" name="Slide Number Placeholder 3"/>
+          <p:cNvSpPr>
+            <a:spLocks noGrp="1"/>
+          </p:cNvSpPr>
+          <p:nvPr>
+            <p:ph type="sldNum" sz="quarter" idx="10"/>
+          </p:nvPr>
+        </p:nvSpPr>
+        <p:spPr/>
+        <p:txBody>
+          <a:bodyPr/>
+          <a:lstStyle/>
+          <a:p>
+            <a:fld id="{645FDDD2-7D0B-4F28-9387-03082E62BAE2}" type="slidenum">
+              <a:rPr lang="en-US" smtClean="0"/>
+              <a:t>33</a:t>
+            </a:fld>
+            <a:endParaRPr lang="en-US"/>
+          </a:p>
+        </p:txBody>
+      </p:sp>
+    </p:spTree>
+    <p:extLst>
+      <p:ext uri="{BB962C8B-B14F-4D97-AF65-F5344CB8AC3E}">
+        <p14:creationId xmlns:p14="http://schemas.microsoft.com/office/powerpoint/2010/main" val="3337239651"/>
+      </p:ext>
+    </p:extLst>
+  </p:cSld>
+  <p:clrMapOvr>
+    <a:masterClrMapping/>
+  </p:clrMapOvr>
+</p:notes>
+</file>
+
+<file path=ppt/notesSlides/notesSlide6.xml><?xml version="1.0" encoding="utf-8"?>
+<p:notes xmlns:a="http://schemas.openxmlformats.org/drawingml/2006/main" xmlns:r="http://schemas.openxmlformats.org/officeDocument/2006/relationships" xmlns:p="http://schemas.openxmlformats.org/presentationml/2006/main">
+  <p:cSld>
+    <p:spTree>
+      <p:nvGrpSpPr>
+        <p:cNvPr id="1" name=""/>
+        <p:cNvGrpSpPr/>
+        <p:nvPr/>
+      </p:nvGrpSpPr>
+      <p:grpSpPr>
+        <a:xfrm>
+          <a:off x="0" y="0"/>
+          <a:ext cx="0" cy="0"/>
+          <a:chOff x="0" y="0"/>
+          <a:chExt cx="0" cy="0"/>
+        </a:xfrm>
+      </p:grpSpPr>
+      <p:sp>
+        <p:nvSpPr>
+          <p:cNvPr id="2" name="Slide Image Placeholder 1"/>
+          <p:cNvSpPr>
+            <a:spLocks noGrp="1" noRot="1" noChangeAspect="1"/>
+          </p:cNvSpPr>
+          <p:nvPr>
+            <p:ph type="sldImg"/>
+          </p:nvPr>
+        </p:nvSpPr>
+        <p:spPr/>
+      </p:sp>
+      <p:sp>
+        <p:nvSpPr>
+          <p:cNvPr id="3" name="Notes Placeholder 2"/>
+          <p:cNvSpPr>
+            <a:spLocks noGrp="1"/>
+          </p:cNvSpPr>
+          <p:nvPr>
+            <p:ph type="body" idx="1"/>
+          </p:nvPr>
+        </p:nvSpPr>
+        <p:spPr/>
+        <p:txBody>
+          <a:bodyPr/>
+          <a:lstStyle/>
+          <a:p>
+            <a:endParaRPr lang="en-US" dirty="0"/>
+          </a:p>
+        </p:txBody>
+      </p:sp>
+      <p:sp>
+        <p:nvSpPr>
+          <p:cNvPr id="4" name="Slide Number Placeholder 3"/>
+          <p:cNvSpPr>
+            <a:spLocks noGrp="1"/>
+          </p:cNvSpPr>
+          <p:nvPr>
+            <p:ph type="sldNum" sz="quarter" idx="10"/>
+          </p:nvPr>
+        </p:nvSpPr>
+        <p:spPr/>
+        <p:txBody>
+          <a:bodyPr/>
+          <a:lstStyle/>
+          <a:p>
+            <a:fld id="{645FDDD2-7D0B-4F28-9387-03082E62BAE2}" type="slidenum">
+              <a:rPr lang="en-US" smtClean="0"/>
+              <a:t>34</a:t>
+            </a:fld>
+            <a:endParaRPr lang="en-US"/>
+          </a:p>
+        </p:txBody>
+      </p:sp>
+    </p:spTree>
+    <p:extLst>
+      <p:ext uri="{BB962C8B-B14F-4D97-AF65-F5344CB8AC3E}">
+        <p14:creationId xmlns:p14="http://schemas.microsoft.com/office/powerpoint/2010/main" val="635321846"/>
       </p:ext>
     </p:extLst>
   </p:cSld>
@@ -7179,8 +7619,8 @@
           </a:p>
         </p:txBody>
       </p:sp>
-      <mc:AlternateContent xmlns:mc="http://schemas.openxmlformats.org/markup-compatibility/2006">
-        <mc:Choice xmlns:a14="http://schemas.microsoft.com/office/drawing/2010/main" Requires="a14">
+      <mc:AlternateContent xmlns:mc="http://schemas.openxmlformats.org/markup-compatibility/2006" xmlns:a14="http://schemas.microsoft.com/office/drawing/2010/main">
+        <mc:Choice Requires="a14">
           <p:sp>
             <p:nvSpPr>
               <p:cNvPr id="4" name="Title 3"/>
@@ -7295,7 +7735,7 @@
             </p:txBody>
           </p:sp>
         </mc:Choice>
-        <mc:Fallback>
+        <mc:Fallback xmlns="">
           <p:sp>
             <p:nvSpPr>
               <p:cNvPr id="4" name="Title 3"/>
@@ -7549,8 +7989,8 @@
           </a:p>
         </p:txBody>
       </p:sp>
-      <mc:AlternateContent xmlns:mc="http://schemas.openxmlformats.org/markup-compatibility/2006">
-        <mc:Choice xmlns:a14="http://schemas.microsoft.com/office/drawing/2010/main" Requires="a14">
+      <mc:AlternateContent xmlns:mc="http://schemas.openxmlformats.org/markup-compatibility/2006" xmlns:a14="http://schemas.microsoft.com/office/drawing/2010/main">
+        <mc:Choice Requires="a14">
           <p:sp>
             <p:nvSpPr>
               <p:cNvPr id="4" name="Title 3"/>
@@ -7757,7 +8197,7 @@
             </p:txBody>
           </p:sp>
         </mc:Choice>
-        <mc:Fallback>
+        <mc:Fallback xmlns="">
           <p:sp>
             <p:nvSpPr>
               <p:cNvPr id="4" name="Title 3"/>
@@ -9967,8 +10407,8 @@
           </a:ln>
         </p:spPr>
       </p:pic>
-      <mc:AlternateContent xmlns:mc="http://schemas.openxmlformats.org/markup-compatibility/2006">
-        <mc:Choice xmlns:a14="http://schemas.microsoft.com/office/drawing/2010/main" Requires="a14">
+      <mc:AlternateContent xmlns:mc="http://schemas.openxmlformats.org/markup-compatibility/2006" xmlns:a14="http://schemas.microsoft.com/office/drawing/2010/main">
+        <mc:Choice Requires="a14">
           <p:sp>
             <p:nvSpPr>
               <p:cNvPr id="4" name="TextBox 3">
@@ -10142,7 +10582,7 @@
             </p:txBody>
           </p:sp>
         </mc:Choice>
-        <mc:Fallback>
+        <mc:Fallback xmlns="">
           <p:sp>
             <p:nvSpPr>
               <p:cNvPr id="4" name="TextBox 3">
@@ -10200,6 +10640,1430 @@
 </p:sld>
 </file>
 
+<file path=ppt/slides/slide27.xml><?xml version="1.0" encoding="utf-8"?>
+<p:sld xmlns:a="http://schemas.openxmlformats.org/drawingml/2006/main" xmlns:r="http://schemas.openxmlformats.org/officeDocument/2006/relationships" xmlns:p="http://schemas.openxmlformats.org/presentationml/2006/main">
+  <p:cSld>
+    <p:spTree>
+      <p:nvGrpSpPr>
+        <p:cNvPr id="1" name=""/>
+        <p:cNvGrpSpPr/>
+        <p:nvPr/>
+      </p:nvGrpSpPr>
+      <p:grpSpPr>
+        <a:xfrm>
+          <a:off x="0" y="0"/>
+          <a:ext cx="0" cy="0"/>
+          <a:chOff x="0" y="0"/>
+          <a:chExt cx="0" cy="0"/>
+        </a:xfrm>
+      </p:grpSpPr>
+      <p:sp>
+        <p:nvSpPr>
+          <p:cNvPr id="2" name="Title 1"/>
+          <p:cNvSpPr>
+            <a:spLocks noGrp="1"/>
+          </p:cNvSpPr>
+          <p:nvPr>
+            <p:ph type="title"/>
+          </p:nvPr>
+        </p:nvSpPr>
+        <p:spPr/>
+        <p:txBody>
+          <a:bodyPr>
+            <a:normAutofit fontScale="90000"/>
+          </a:bodyPr>
+          <a:lstStyle/>
+          <a:p>
+            <a:r>
+              <a:rPr lang="en-US" dirty="0"/>
+              <a:t>Adding or removing an obstacle from the visibility graph could be performed without rebuilding the entire visibility graph using a two step process:</a:t>
+            </a:r>
+          </a:p>
+        </p:txBody>
+      </p:sp>
+      <p:sp>
+        <p:nvSpPr>
+          <p:cNvPr id="3" name="Slide Number Placeholder 2"/>
+          <p:cNvSpPr>
+            <a:spLocks noGrp="1"/>
+          </p:cNvSpPr>
+          <p:nvPr>
+            <p:ph type="sldNum" sz="quarter" idx="12"/>
+          </p:nvPr>
+        </p:nvSpPr>
+        <p:spPr/>
+        <p:txBody>
+          <a:bodyPr/>
+          <a:lstStyle/>
+          <a:p>
+            <a:fld id="{CB3FC469-CA8B-4EE5-AE73-966FC6A86920}" type="slidenum">
+              <a:rPr lang="en-US" smtClean="0"/>
+              <a:t>27</a:t>
+            </a:fld>
+            <a:endParaRPr lang="en-US"/>
+          </a:p>
+        </p:txBody>
+      </p:sp>
+      <p:sp>
+        <p:nvSpPr>
+          <p:cNvPr id="4" name="Content Placeholder 3"/>
+          <p:cNvSpPr>
+            <a:spLocks noGrp="1"/>
+          </p:cNvSpPr>
+          <p:nvPr>
+            <p:ph idx="1"/>
+          </p:nvPr>
+        </p:nvSpPr>
+        <p:spPr/>
+        <p:txBody>
+          <a:bodyPr/>
+          <a:lstStyle/>
+          <a:p>
+            <a:r>
+              <a:rPr lang="en-US" dirty="0"/>
+              <a:t>Modify </a:t>
+            </a:r>
+            <a:r>
+              <a:rPr lang="en-US" dirty="0">
+                <a:solidFill>
+                  <a:schemeClr val="accent2"/>
+                </a:solidFill>
+              </a:rPr>
+              <a:t>edges starting or ending on the obstacle</a:t>
+            </a:r>
+            <a:r>
+              <a:rPr lang="en-US" dirty="0"/>
+              <a:t> that was added/removed</a:t>
+            </a:r>
+          </a:p>
+          <a:p>
+            <a:r>
+              <a:rPr lang="en-US" dirty="0"/>
+              <a:t>Modify </a:t>
+            </a:r>
+            <a:r>
+              <a:rPr lang="en-US" dirty="0">
+                <a:solidFill>
+                  <a:srgbClr val="00B050"/>
+                </a:solidFill>
+              </a:rPr>
+              <a:t>edges that pass through the area occupied </a:t>
+            </a:r>
+            <a:r>
+              <a:rPr lang="en-US" dirty="0"/>
+              <a:t>by the obstacle that was added or removed</a:t>
+            </a:r>
+          </a:p>
+        </p:txBody>
+      </p:sp>
+      <p:sp>
+        <p:nvSpPr>
+          <p:cNvPr id="5" name="Regular Pentagon 4"/>
+          <p:cNvSpPr/>
+          <p:nvPr/>
+        </p:nvSpPr>
+        <p:spPr>
+          <a:xfrm rot="20269994">
+            <a:off x="5477690" y="4486273"/>
+            <a:ext cx="1459183" cy="839642"/>
+          </a:xfrm>
+          <a:prstGeom prst="pentagon">
+            <a:avLst/>
+          </a:prstGeom>
+          <a:solidFill>
+            <a:schemeClr val="accent1">
+              <a:lumMod val="60000"/>
+              <a:lumOff val="40000"/>
+            </a:schemeClr>
+          </a:solidFill>
+          <a:ln>
+            <a:solidFill>
+              <a:srgbClr val="FF0000"/>
+            </a:solidFill>
+            <a:prstDash val="sysDash"/>
+          </a:ln>
+        </p:spPr>
+        <p:style>
+          <a:lnRef idx="2">
+            <a:schemeClr val="accent1">
+              <a:shade val="50000"/>
+            </a:schemeClr>
+          </a:lnRef>
+          <a:fillRef idx="1">
+            <a:schemeClr val="accent1"/>
+          </a:fillRef>
+          <a:effectRef idx="0">
+            <a:schemeClr val="accent1"/>
+          </a:effectRef>
+          <a:fontRef idx="minor">
+            <a:schemeClr val="lt1"/>
+          </a:fontRef>
+        </p:style>
+        <p:txBody>
+          <a:bodyPr rtlCol="0" anchor="ctr"/>
+          <a:lstStyle/>
+          <a:p>
+            <a:pPr algn="ctr"/>
+            <a:endParaRPr lang="en-US"/>
+          </a:p>
+        </p:txBody>
+      </p:sp>
+      <p:cxnSp>
+        <p:nvCxnSpPr>
+          <p:cNvPr id="6" name="Straight Arrow Connector 5"/>
+          <p:cNvCxnSpPr>
+            <a:stCxn id="12" idx="2"/>
+            <a:endCxn id="5" idx="1"/>
+          </p:cNvCxnSpPr>
+          <p:nvPr/>
+        </p:nvCxnSpPr>
+        <p:spPr>
+          <a:xfrm>
+            <a:off x="3052192" y="4949649"/>
+            <a:ext cx="2442031" cy="139940"/>
+          </a:xfrm>
+          <a:prstGeom prst="straightConnector1">
+            <a:avLst/>
+          </a:prstGeom>
+          <a:ln>
+            <a:solidFill>
+              <a:schemeClr val="accent2"/>
+            </a:solidFill>
+            <a:headEnd type="triangle"/>
+            <a:tailEnd type="triangle"/>
+          </a:ln>
+        </p:spPr>
+        <p:style>
+          <a:lnRef idx="1">
+            <a:schemeClr val="accent1"/>
+          </a:lnRef>
+          <a:fillRef idx="0">
+            <a:schemeClr val="accent1"/>
+          </a:fillRef>
+          <a:effectRef idx="0">
+            <a:schemeClr val="accent1"/>
+          </a:effectRef>
+          <a:fontRef idx="minor">
+            <a:schemeClr val="tx1"/>
+          </a:fontRef>
+        </p:style>
+      </p:cxnSp>
+      <p:cxnSp>
+        <p:nvCxnSpPr>
+          <p:cNvPr id="7" name="Straight Arrow Connector 6"/>
+          <p:cNvCxnSpPr>
+            <a:stCxn id="12" idx="4"/>
+            <a:endCxn id="18" idx="1"/>
+          </p:cNvCxnSpPr>
+          <p:nvPr/>
+        </p:nvCxnSpPr>
+        <p:spPr>
+          <a:xfrm>
+            <a:off x="3887361" y="4609387"/>
+            <a:ext cx="3979457" cy="136908"/>
+          </a:xfrm>
+          <a:prstGeom prst="straightConnector1">
+            <a:avLst/>
+          </a:prstGeom>
+          <a:ln>
+            <a:solidFill>
+              <a:srgbClr val="00B050"/>
+            </a:solidFill>
+            <a:headEnd type="triangle"/>
+            <a:tailEnd type="triangle"/>
+          </a:ln>
+        </p:spPr>
+        <p:style>
+          <a:lnRef idx="1">
+            <a:schemeClr val="accent1"/>
+          </a:lnRef>
+          <a:fillRef idx="0">
+            <a:schemeClr val="accent1"/>
+          </a:fillRef>
+          <a:effectRef idx="0">
+            <a:schemeClr val="accent1"/>
+          </a:effectRef>
+          <a:fontRef idx="minor">
+            <a:schemeClr val="tx1"/>
+          </a:fontRef>
+        </p:style>
+      </p:cxnSp>
+      <p:cxnSp>
+        <p:nvCxnSpPr>
+          <p:cNvPr id="8" name="Straight Arrow Connector 7"/>
+          <p:cNvCxnSpPr>
+            <a:stCxn id="12" idx="5"/>
+            <a:endCxn id="18" idx="0"/>
+          </p:cNvCxnSpPr>
+          <p:nvPr/>
+        </p:nvCxnSpPr>
+        <p:spPr>
+          <a:xfrm flipV="1">
+            <a:off x="3949649" y="3881148"/>
+            <a:ext cx="4291215" cy="142521"/>
+          </a:xfrm>
+          <a:prstGeom prst="straightConnector1">
+            <a:avLst/>
+          </a:prstGeom>
+          <a:ln>
+            <a:solidFill>
+              <a:schemeClr val="accent4"/>
+            </a:solidFill>
+            <a:headEnd type="triangle"/>
+            <a:tailEnd type="triangle"/>
+          </a:ln>
+        </p:spPr>
+        <p:style>
+          <a:lnRef idx="1">
+            <a:schemeClr val="accent1"/>
+          </a:lnRef>
+          <a:fillRef idx="0">
+            <a:schemeClr val="accent1"/>
+          </a:fillRef>
+          <a:effectRef idx="0">
+            <a:schemeClr val="accent1"/>
+          </a:effectRef>
+          <a:fontRef idx="minor">
+            <a:schemeClr val="tx1"/>
+          </a:fontRef>
+        </p:style>
+      </p:cxnSp>
+      <p:sp>
+        <p:nvSpPr>
+          <p:cNvPr id="9" name="TextBox 8"/>
+          <p:cNvSpPr txBox="1"/>
+          <p:nvPr/>
+        </p:nvSpPr>
+        <p:spPr>
+          <a:xfrm>
+            <a:off x="7041349" y="5102764"/>
+            <a:ext cx="2616522" cy="923330"/>
+          </a:xfrm>
+          <a:prstGeom prst="rect">
+            <a:avLst/>
+          </a:prstGeom>
+          <a:noFill/>
+        </p:spPr>
+        <p:txBody>
+          <a:bodyPr wrap="square" rtlCol="0">
+            <a:spAutoFit/>
+          </a:bodyPr>
+          <a:lstStyle/>
+          <a:p>
+            <a:r>
+              <a:rPr lang="en-US" dirty="0">
+                <a:solidFill>
+                  <a:srgbClr val="00B050"/>
+                </a:solidFill>
+              </a:rPr>
+              <a:t>Edge passes through region of new obstacle and should be modified</a:t>
+            </a:r>
+          </a:p>
+        </p:txBody>
+      </p:sp>
+      <p:sp>
+        <p:nvSpPr>
+          <p:cNvPr id="10" name="TextBox 9"/>
+          <p:cNvSpPr txBox="1"/>
+          <p:nvPr/>
+        </p:nvSpPr>
+        <p:spPr>
+          <a:xfrm>
+            <a:off x="6331665" y="2816909"/>
+            <a:ext cx="3590100" cy="923330"/>
+          </a:xfrm>
+          <a:prstGeom prst="rect">
+            <a:avLst/>
+          </a:prstGeom>
+          <a:noFill/>
+        </p:spPr>
+        <p:txBody>
+          <a:bodyPr wrap="square" rtlCol="0">
+            <a:spAutoFit/>
+          </a:bodyPr>
+          <a:lstStyle/>
+          <a:p>
+            <a:r>
+              <a:rPr lang="en-US" dirty="0">
+                <a:solidFill>
+                  <a:schemeClr val="accent4"/>
+                </a:solidFill>
+              </a:rPr>
+              <a:t>Edge is neither near new obstacle nor on new obstacle and can be ignored.</a:t>
+            </a:r>
+          </a:p>
+        </p:txBody>
+      </p:sp>
+      <p:sp>
+        <p:nvSpPr>
+          <p:cNvPr id="11" name="TextBox 10"/>
+          <p:cNvSpPr txBox="1"/>
+          <p:nvPr/>
+        </p:nvSpPr>
+        <p:spPr>
+          <a:xfrm>
+            <a:off x="1730247" y="5215190"/>
+            <a:ext cx="2917953" cy="923330"/>
+          </a:xfrm>
+          <a:prstGeom prst="rect">
+            <a:avLst/>
+          </a:prstGeom>
+          <a:noFill/>
+        </p:spPr>
+        <p:txBody>
+          <a:bodyPr wrap="square" rtlCol="0">
+            <a:spAutoFit/>
+          </a:bodyPr>
+          <a:lstStyle/>
+          <a:p>
+            <a:r>
+              <a:rPr lang="en-US" dirty="0">
+                <a:solidFill>
+                  <a:schemeClr val="accent2"/>
+                </a:solidFill>
+              </a:rPr>
+              <a:t>Edge connects to new obstacle and should be modified</a:t>
+            </a:r>
+          </a:p>
+        </p:txBody>
+      </p:sp>
+      <p:sp>
+        <p:nvSpPr>
+          <p:cNvPr id="12" name="Regular Pentagon 11"/>
+          <p:cNvSpPr/>
+          <p:nvPr/>
+        </p:nvSpPr>
+        <p:spPr>
+          <a:xfrm rot="20269994">
+            <a:off x="2581786" y="3970907"/>
+            <a:ext cx="1459183" cy="839642"/>
+          </a:xfrm>
+          <a:prstGeom prst="pentagon">
+            <a:avLst/>
+          </a:prstGeom>
+          <a:solidFill>
+            <a:schemeClr val="accent1">
+              <a:lumMod val="60000"/>
+              <a:lumOff val="40000"/>
+            </a:schemeClr>
+          </a:solidFill>
+        </p:spPr>
+        <p:style>
+          <a:lnRef idx="2">
+            <a:schemeClr val="accent1">
+              <a:shade val="50000"/>
+            </a:schemeClr>
+          </a:lnRef>
+          <a:fillRef idx="1">
+            <a:schemeClr val="accent1"/>
+          </a:fillRef>
+          <a:effectRef idx="0">
+            <a:schemeClr val="accent1"/>
+          </a:effectRef>
+          <a:fontRef idx="minor">
+            <a:schemeClr val="lt1"/>
+          </a:fontRef>
+        </p:style>
+        <p:txBody>
+          <a:bodyPr rtlCol="0" anchor="ctr"/>
+          <a:lstStyle/>
+          <a:p>
+            <a:pPr algn="ctr"/>
+            <a:endParaRPr lang="en-US" dirty="0"/>
+          </a:p>
+        </p:txBody>
+      </p:sp>
+      <p:sp>
+        <p:nvSpPr>
+          <p:cNvPr id="15" name="TextBox 14"/>
+          <p:cNvSpPr txBox="1"/>
+          <p:nvPr/>
+        </p:nvSpPr>
+        <p:spPr>
+          <a:xfrm>
+            <a:off x="5006849" y="5404186"/>
+            <a:ext cx="3590100" cy="369332"/>
+          </a:xfrm>
+          <a:prstGeom prst="rect">
+            <a:avLst/>
+          </a:prstGeom>
+          <a:noFill/>
+        </p:spPr>
+        <p:txBody>
+          <a:bodyPr wrap="square" rtlCol="0">
+            <a:spAutoFit/>
+          </a:bodyPr>
+          <a:lstStyle/>
+          <a:p>
+            <a:r>
+              <a:rPr lang="en-US" dirty="0">
+                <a:solidFill>
+                  <a:srgbClr val="FF0000"/>
+                </a:solidFill>
+              </a:rPr>
+              <a:t>New obstacle</a:t>
+            </a:r>
+          </a:p>
+        </p:txBody>
+      </p:sp>
+      <p:sp>
+        <p:nvSpPr>
+          <p:cNvPr id="18" name="Regular Pentagon 17"/>
+          <p:cNvSpPr/>
+          <p:nvPr/>
+        </p:nvSpPr>
+        <p:spPr>
+          <a:xfrm rot="19353801">
+            <a:off x="7783647" y="3757237"/>
+            <a:ext cx="1645825" cy="1203177"/>
+          </a:xfrm>
+          <a:prstGeom prst="pentagon">
+            <a:avLst/>
+          </a:prstGeom>
+          <a:solidFill>
+            <a:schemeClr val="accent1">
+              <a:lumMod val="60000"/>
+              <a:lumOff val="40000"/>
+            </a:schemeClr>
+          </a:solidFill>
+        </p:spPr>
+        <p:style>
+          <a:lnRef idx="2">
+            <a:schemeClr val="accent1">
+              <a:shade val="50000"/>
+            </a:schemeClr>
+          </a:lnRef>
+          <a:fillRef idx="1">
+            <a:schemeClr val="accent1"/>
+          </a:fillRef>
+          <a:effectRef idx="0">
+            <a:schemeClr val="accent1"/>
+          </a:effectRef>
+          <a:fontRef idx="minor">
+            <a:schemeClr val="lt1"/>
+          </a:fontRef>
+        </p:style>
+        <p:txBody>
+          <a:bodyPr rtlCol="0" anchor="ctr"/>
+          <a:lstStyle/>
+          <a:p>
+            <a:pPr algn="ctr"/>
+            <a:endParaRPr lang="en-US" dirty="0"/>
+          </a:p>
+        </p:txBody>
+      </p:sp>
+    </p:spTree>
+    <p:extLst>
+      <p:ext uri="{BB962C8B-B14F-4D97-AF65-F5344CB8AC3E}">
+        <p14:creationId xmlns:p14="http://schemas.microsoft.com/office/powerpoint/2010/main" val="2718451653"/>
+      </p:ext>
+    </p:extLst>
+  </p:cSld>
+  <p:clrMapOvr>
+    <a:masterClrMapping/>
+  </p:clrMapOvr>
+</p:sld>
+</file>
+
+<file path=ppt/slides/slide28.xml><?xml version="1.0" encoding="utf-8"?>
+<p:sld xmlns:a="http://schemas.openxmlformats.org/drawingml/2006/main" xmlns:r="http://schemas.openxmlformats.org/officeDocument/2006/relationships" xmlns:p="http://schemas.openxmlformats.org/presentationml/2006/main">
+  <p:cSld>
+    <p:spTree>
+      <p:nvGrpSpPr>
+        <p:cNvPr id="1" name=""/>
+        <p:cNvGrpSpPr/>
+        <p:nvPr/>
+      </p:nvGrpSpPr>
+      <p:grpSpPr>
+        <a:xfrm>
+          <a:off x="0" y="0"/>
+          <a:ext cx="0" cy="0"/>
+          <a:chOff x="0" y="0"/>
+          <a:chExt cx="0" cy="0"/>
+        </a:xfrm>
+      </p:grpSpPr>
+      <p:sp>
+        <p:nvSpPr>
+          <p:cNvPr id="18" name="Rectangle 17"/>
+          <p:cNvSpPr/>
+          <p:nvPr/>
+        </p:nvSpPr>
+        <p:spPr>
+          <a:xfrm>
+            <a:off x="5412827" y="3739402"/>
+            <a:ext cx="1366345" cy="948213"/>
+          </a:xfrm>
+          <a:prstGeom prst="rect">
+            <a:avLst/>
+          </a:prstGeom>
+          <a:solidFill>
+            <a:srgbClr val="DEEBF7">
+              <a:alpha val="49804"/>
+            </a:srgbClr>
+          </a:solidFill>
+          <a:ln>
+            <a:solidFill>
+              <a:schemeClr val="accent1"/>
+            </a:solidFill>
+          </a:ln>
+        </p:spPr>
+        <p:style>
+          <a:lnRef idx="2">
+            <a:schemeClr val="accent1">
+              <a:shade val="50000"/>
+            </a:schemeClr>
+          </a:lnRef>
+          <a:fillRef idx="1">
+            <a:schemeClr val="accent1"/>
+          </a:fillRef>
+          <a:effectRef idx="0">
+            <a:schemeClr val="accent1"/>
+          </a:effectRef>
+          <a:fontRef idx="minor">
+            <a:schemeClr val="lt1"/>
+          </a:fontRef>
+        </p:style>
+        <p:txBody>
+          <a:bodyPr rtlCol="0" anchor="ctr"/>
+          <a:lstStyle/>
+          <a:p>
+            <a:pPr algn="ctr"/>
+            <a:endParaRPr lang="en-US"/>
+          </a:p>
+        </p:txBody>
+      </p:sp>
+      <p:sp>
+        <p:nvSpPr>
+          <p:cNvPr id="5" name="Regular Pentagon 4"/>
+          <p:cNvSpPr/>
+          <p:nvPr/>
+        </p:nvSpPr>
+        <p:spPr>
+          <a:xfrm rot="20269994">
+            <a:off x="5395606" y="3705223"/>
+            <a:ext cx="1459183" cy="839642"/>
+          </a:xfrm>
+          <a:prstGeom prst="pentagon">
+            <a:avLst/>
+          </a:prstGeom>
+        </p:spPr>
+        <p:style>
+          <a:lnRef idx="2">
+            <a:schemeClr val="accent1">
+              <a:shade val="50000"/>
+            </a:schemeClr>
+          </a:lnRef>
+          <a:fillRef idx="1">
+            <a:schemeClr val="accent1"/>
+          </a:fillRef>
+          <a:effectRef idx="0">
+            <a:schemeClr val="accent1"/>
+          </a:effectRef>
+          <a:fontRef idx="minor">
+            <a:schemeClr val="lt1"/>
+          </a:fontRef>
+        </p:style>
+        <p:txBody>
+          <a:bodyPr rtlCol="0" anchor="ctr"/>
+          <a:lstStyle/>
+          <a:p>
+            <a:pPr algn="ctr"/>
+            <a:endParaRPr lang="en-US"/>
+          </a:p>
+        </p:txBody>
+      </p:sp>
+      <p:sp>
+        <p:nvSpPr>
+          <p:cNvPr id="27" name="Rectangle 26"/>
+          <p:cNvSpPr/>
+          <p:nvPr/>
+        </p:nvSpPr>
+        <p:spPr>
+          <a:xfrm>
+            <a:off x="6210746" y="3460974"/>
+            <a:ext cx="1787626" cy="848267"/>
+          </a:xfrm>
+          <a:prstGeom prst="rect">
+            <a:avLst/>
+          </a:prstGeom>
+          <a:solidFill>
+            <a:srgbClr val="FFF2CC">
+              <a:alpha val="50196"/>
+            </a:srgbClr>
+          </a:solidFill>
+          <a:ln>
+            <a:solidFill>
+              <a:schemeClr val="accent4"/>
+            </a:solidFill>
+          </a:ln>
+        </p:spPr>
+        <p:style>
+          <a:lnRef idx="2">
+            <a:schemeClr val="accent1">
+              <a:shade val="50000"/>
+            </a:schemeClr>
+          </a:lnRef>
+          <a:fillRef idx="1">
+            <a:schemeClr val="accent1"/>
+          </a:fillRef>
+          <a:effectRef idx="0">
+            <a:schemeClr val="accent1"/>
+          </a:effectRef>
+          <a:fontRef idx="minor">
+            <a:schemeClr val="lt1"/>
+          </a:fontRef>
+        </p:style>
+        <p:txBody>
+          <a:bodyPr rtlCol="0" anchor="ctr"/>
+          <a:lstStyle/>
+          <a:p>
+            <a:pPr algn="ctr"/>
+            <a:endParaRPr lang="en-US"/>
+          </a:p>
+        </p:txBody>
+      </p:sp>
+      <p:sp>
+        <p:nvSpPr>
+          <p:cNvPr id="17" name="Rectangle 16"/>
+          <p:cNvSpPr/>
+          <p:nvPr/>
+        </p:nvSpPr>
+        <p:spPr>
+          <a:xfrm>
+            <a:off x="5411957" y="2278599"/>
+            <a:ext cx="1786758" cy="808235"/>
+          </a:xfrm>
+          <a:prstGeom prst="rect">
+            <a:avLst/>
+          </a:prstGeom>
+          <a:solidFill>
+            <a:schemeClr val="accent6">
+              <a:lumMod val="20000"/>
+              <a:lumOff val="80000"/>
+            </a:schemeClr>
+          </a:solidFill>
+          <a:ln>
+            <a:solidFill>
+              <a:schemeClr val="accent6"/>
+            </a:solidFill>
+          </a:ln>
+        </p:spPr>
+        <p:style>
+          <a:lnRef idx="2">
+            <a:schemeClr val="accent1">
+              <a:shade val="50000"/>
+            </a:schemeClr>
+          </a:lnRef>
+          <a:fillRef idx="1">
+            <a:schemeClr val="accent1"/>
+          </a:fillRef>
+          <a:effectRef idx="0">
+            <a:schemeClr val="accent1"/>
+          </a:effectRef>
+          <a:fontRef idx="minor">
+            <a:schemeClr val="lt1"/>
+          </a:fontRef>
+        </p:style>
+        <p:txBody>
+          <a:bodyPr rtlCol="0" anchor="ctr"/>
+          <a:lstStyle/>
+          <a:p>
+            <a:pPr algn="ctr"/>
+            <a:endParaRPr lang="en-US"/>
+          </a:p>
+        </p:txBody>
+      </p:sp>
+      <p:sp>
+        <p:nvSpPr>
+          <p:cNvPr id="19" name="Rectangle 18"/>
+          <p:cNvSpPr/>
+          <p:nvPr/>
+        </p:nvSpPr>
+        <p:spPr>
+          <a:xfrm>
+            <a:off x="3867807" y="3196071"/>
+            <a:ext cx="1786758" cy="808235"/>
+          </a:xfrm>
+          <a:prstGeom prst="rect">
+            <a:avLst/>
+          </a:prstGeom>
+          <a:solidFill>
+            <a:srgbClr val="FBE5D6">
+              <a:alpha val="50196"/>
+            </a:srgbClr>
+          </a:solidFill>
+          <a:ln>
+            <a:solidFill>
+              <a:schemeClr val="accent2"/>
+            </a:solidFill>
+          </a:ln>
+        </p:spPr>
+        <p:style>
+          <a:lnRef idx="2">
+            <a:schemeClr val="accent1">
+              <a:shade val="50000"/>
+            </a:schemeClr>
+          </a:lnRef>
+          <a:fillRef idx="1">
+            <a:schemeClr val="accent1"/>
+          </a:fillRef>
+          <a:effectRef idx="0">
+            <a:schemeClr val="accent1"/>
+          </a:effectRef>
+          <a:fontRef idx="minor">
+            <a:schemeClr val="lt1"/>
+          </a:fontRef>
+        </p:style>
+        <p:txBody>
+          <a:bodyPr rtlCol="0" anchor="ctr"/>
+          <a:lstStyle/>
+          <a:p>
+            <a:pPr algn="ctr"/>
+            <a:endParaRPr lang="en-US"/>
+          </a:p>
+        </p:txBody>
+      </p:sp>
+      <p:sp>
+        <p:nvSpPr>
+          <p:cNvPr id="2" name="Title 1"/>
+          <p:cNvSpPr>
+            <a:spLocks noGrp="1"/>
+          </p:cNvSpPr>
+          <p:nvPr>
+            <p:ph type="title"/>
+          </p:nvPr>
+        </p:nvSpPr>
+        <p:spPr>
+          <a:xfrm>
+            <a:off x="643612" y="83927"/>
+            <a:ext cx="11376107" cy="925066"/>
+          </a:xfrm>
+        </p:spPr>
+        <p:txBody>
+          <a:bodyPr>
+            <a:normAutofit fontScale="90000"/>
+          </a:bodyPr>
+          <a:lstStyle/>
+          <a:p>
+            <a:r>
+              <a:rPr lang="en-US" dirty="0"/>
+              <a:t>Determining which edges pass near an obstacle can be accomplished with an axis-aligned bounding box (AABB) check.  This makes sense when only adding or modifying a single obstacle as many edges won’t be near the obstacle of interest.</a:t>
+            </a:r>
+          </a:p>
+        </p:txBody>
+      </p:sp>
+      <p:sp>
+        <p:nvSpPr>
+          <p:cNvPr id="3" name="Slide Number Placeholder 2"/>
+          <p:cNvSpPr>
+            <a:spLocks noGrp="1"/>
+          </p:cNvSpPr>
+          <p:nvPr>
+            <p:ph type="sldNum" sz="quarter" idx="12"/>
+          </p:nvPr>
+        </p:nvSpPr>
+        <p:spPr/>
+        <p:txBody>
+          <a:bodyPr/>
+          <a:lstStyle/>
+          <a:p>
+            <a:fld id="{CB3FC469-CA8B-4EE5-AE73-966FC6A86920}" type="slidenum">
+              <a:rPr lang="en-US" smtClean="0"/>
+              <a:t>28</a:t>
+            </a:fld>
+            <a:endParaRPr lang="en-US"/>
+          </a:p>
+        </p:txBody>
+      </p:sp>
+      <p:cxnSp>
+        <p:nvCxnSpPr>
+          <p:cNvPr id="7" name="Straight Arrow Connector 6"/>
+          <p:cNvCxnSpPr/>
+          <p:nvPr/>
+        </p:nvCxnSpPr>
+        <p:spPr>
+          <a:xfrm flipV="1">
+            <a:off x="3678621" y="2932386"/>
+            <a:ext cx="0" cy="2228193"/>
+          </a:xfrm>
+          <a:prstGeom prst="straightConnector1">
+            <a:avLst/>
+          </a:prstGeom>
+          <a:ln w="19050">
+            <a:solidFill>
+              <a:schemeClr val="tx1"/>
+            </a:solidFill>
+            <a:tailEnd type="triangle"/>
+          </a:ln>
+        </p:spPr>
+        <p:style>
+          <a:lnRef idx="1">
+            <a:schemeClr val="accent1"/>
+          </a:lnRef>
+          <a:fillRef idx="0">
+            <a:schemeClr val="accent1"/>
+          </a:fillRef>
+          <a:effectRef idx="0">
+            <a:schemeClr val="accent1"/>
+          </a:effectRef>
+          <a:fontRef idx="minor">
+            <a:schemeClr val="tx1"/>
+          </a:fontRef>
+        </p:style>
+      </p:cxnSp>
+      <p:cxnSp>
+        <p:nvCxnSpPr>
+          <p:cNvPr id="8" name="Straight Arrow Connector 7"/>
+          <p:cNvCxnSpPr/>
+          <p:nvPr/>
+        </p:nvCxnSpPr>
+        <p:spPr>
+          <a:xfrm>
+            <a:off x="3678621" y="5160579"/>
+            <a:ext cx="4540469" cy="0"/>
+          </a:xfrm>
+          <a:prstGeom prst="straightConnector1">
+            <a:avLst/>
+          </a:prstGeom>
+          <a:ln w="19050">
+            <a:solidFill>
+              <a:schemeClr val="tx1"/>
+            </a:solidFill>
+            <a:tailEnd type="triangle"/>
+          </a:ln>
+        </p:spPr>
+        <p:style>
+          <a:lnRef idx="1">
+            <a:schemeClr val="accent1"/>
+          </a:lnRef>
+          <a:fillRef idx="0">
+            <a:schemeClr val="accent1"/>
+          </a:fillRef>
+          <a:effectRef idx="0">
+            <a:schemeClr val="accent1"/>
+          </a:effectRef>
+          <a:fontRef idx="minor">
+            <a:schemeClr val="tx1"/>
+          </a:fontRef>
+        </p:style>
+      </p:cxnSp>
+      <p:cxnSp>
+        <p:nvCxnSpPr>
+          <p:cNvPr id="12" name="Straight Arrow Connector 11"/>
+          <p:cNvCxnSpPr/>
+          <p:nvPr/>
+        </p:nvCxnSpPr>
+        <p:spPr>
+          <a:xfrm>
+            <a:off x="3867807" y="3228332"/>
+            <a:ext cx="1786758" cy="762690"/>
+          </a:xfrm>
+          <a:prstGeom prst="straightConnector1">
+            <a:avLst/>
+          </a:prstGeom>
+          <a:ln>
+            <a:solidFill>
+              <a:schemeClr val="accent2"/>
+            </a:solidFill>
+            <a:headEnd type="triangle"/>
+            <a:tailEnd type="triangle"/>
+          </a:ln>
+        </p:spPr>
+        <p:style>
+          <a:lnRef idx="1">
+            <a:schemeClr val="accent1"/>
+          </a:lnRef>
+          <a:fillRef idx="0">
+            <a:schemeClr val="accent1"/>
+          </a:fillRef>
+          <a:effectRef idx="0">
+            <a:schemeClr val="accent1"/>
+          </a:effectRef>
+          <a:fontRef idx="minor">
+            <a:schemeClr val="tx1"/>
+          </a:fontRef>
+        </p:style>
+      </p:cxnSp>
+      <p:cxnSp>
+        <p:nvCxnSpPr>
+          <p:cNvPr id="14" name="Straight Arrow Connector 13"/>
+          <p:cNvCxnSpPr/>
+          <p:nvPr/>
+        </p:nvCxnSpPr>
+        <p:spPr>
+          <a:xfrm flipV="1">
+            <a:off x="5411957" y="2278599"/>
+            <a:ext cx="1786758" cy="808235"/>
+          </a:xfrm>
+          <a:prstGeom prst="straightConnector1">
+            <a:avLst/>
+          </a:prstGeom>
+          <a:ln>
+            <a:solidFill>
+              <a:srgbClr val="00B050"/>
+            </a:solidFill>
+            <a:headEnd type="triangle"/>
+            <a:tailEnd type="triangle"/>
+          </a:ln>
+        </p:spPr>
+        <p:style>
+          <a:lnRef idx="1">
+            <a:schemeClr val="accent1"/>
+          </a:lnRef>
+          <a:fillRef idx="0">
+            <a:schemeClr val="accent1"/>
+          </a:fillRef>
+          <a:effectRef idx="0">
+            <a:schemeClr val="accent1"/>
+          </a:effectRef>
+          <a:fontRef idx="minor">
+            <a:schemeClr val="tx1"/>
+          </a:fontRef>
+        </p:style>
+      </p:cxnSp>
+      <p:cxnSp>
+        <p:nvCxnSpPr>
+          <p:cNvPr id="29" name="Straight Arrow Connector 28"/>
+          <p:cNvCxnSpPr/>
+          <p:nvPr/>
+        </p:nvCxnSpPr>
+        <p:spPr>
+          <a:xfrm flipV="1">
+            <a:off x="6210746" y="3460974"/>
+            <a:ext cx="1787626" cy="848267"/>
+          </a:xfrm>
+          <a:prstGeom prst="straightConnector1">
+            <a:avLst/>
+          </a:prstGeom>
+          <a:ln>
+            <a:solidFill>
+              <a:schemeClr val="accent4"/>
+            </a:solidFill>
+            <a:headEnd type="triangle"/>
+            <a:tailEnd type="triangle"/>
+          </a:ln>
+        </p:spPr>
+        <p:style>
+          <a:lnRef idx="1">
+            <a:schemeClr val="accent1"/>
+          </a:lnRef>
+          <a:fillRef idx="0">
+            <a:schemeClr val="accent1"/>
+          </a:fillRef>
+          <a:effectRef idx="0">
+            <a:schemeClr val="accent1"/>
+          </a:effectRef>
+          <a:fontRef idx="minor">
+            <a:schemeClr val="tx1"/>
+          </a:fontRef>
+        </p:style>
+      </p:cxnSp>
+      <p:sp>
+        <p:nvSpPr>
+          <p:cNvPr id="31" name="TextBox 30"/>
+          <p:cNvSpPr txBox="1"/>
+          <p:nvPr/>
+        </p:nvSpPr>
+        <p:spPr>
+          <a:xfrm>
+            <a:off x="5517931" y="5256312"/>
+            <a:ext cx="861848" cy="369332"/>
+          </a:xfrm>
+          <a:prstGeom prst="rect">
+            <a:avLst/>
+          </a:prstGeom>
+          <a:noFill/>
+        </p:spPr>
+        <p:txBody>
+          <a:bodyPr wrap="square" rtlCol="0">
+            <a:spAutoFit/>
+          </a:bodyPr>
+          <a:lstStyle/>
+          <a:p>
+            <a:r>
+              <a:rPr lang="en-US" dirty="0"/>
+              <a:t>X-axis</a:t>
+            </a:r>
+          </a:p>
+        </p:txBody>
+      </p:sp>
+      <p:sp>
+        <p:nvSpPr>
+          <p:cNvPr id="32" name="TextBox 31"/>
+          <p:cNvSpPr txBox="1"/>
+          <p:nvPr/>
+        </p:nvSpPr>
+        <p:spPr>
+          <a:xfrm rot="16200000">
+            <a:off x="2882938" y="3846390"/>
+            <a:ext cx="861848" cy="369332"/>
+          </a:xfrm>
+          <a:prstGeom prst="rect">
+            <a:avLst/>
+          </a:prstGeom>
+          <a:noFill/>
+        </p:spPr>
+        <p:txBody>
+          <a:bodyPr wrap="square" rtlCol="0">
+            <a:spAutoFit/>
+          </a:bodyPr>
+          <a:lstStyle/>
+          <a:p>
+            <a:r>
+              <a:rPr lang="en-US" dirty="0"/>
+              <a:t>Y-axis</a:t>
+            </a:r>
+          </a:p>
+        </p:txBody>
+      </p:sp>
+      <p:sp>
+        <p:nvSpPr>
+          <p:cNvPr id="33" name="TextBox 32"/>
+          <p:cNvSpPr txBox="1"/>
+          <p:nvPr/>
+        </p:nvSpPr>
+        <p:spPr>
+          <a:xfrm>
+            <a:off x="5810480" y="1391265"/>
+            <a:ext cx="3590100" cy="923330"/>
+          </a:xfrm>
+          <a:prstGeom prst="rect">
+            <a:avLst/>
+          </a:prstGeom>
+          <a:noFill/>
+        </p:spPr>
+        <p:txBody>
+          <a:bodyPr wrap="square" rtlCol="0">
+            <a:spAutoFit/>
+          </a:bodyPr>
+          <a:lstStyle/>
+          <a:p>
+            <a:r>
+              <a:rPr lang="en-US" dirty="0">
+                <a:solidFill>
+                  <a:srgbClr val="00B050"/>
+                </a:solidFill>
+              </a:rPr>
+              <a:t>Edge AABB does not collide with obstacle AABB – no check required</a:t>
+            </a:r>
+          </a:p>
+        </p:txBody>
+      </p:sp>
+      <p:sp>
+        <p:nvSpPr>
+          <p:cNvPr id="34" name="TextBox 33"/>
+          <p:cNvSpPr txBox="1"/>
+          <p:nvPr/>
+        </p:nvSpPr>
+        <p:spPr>
+          <a:xfrm>
+            <a:off x="8096483" y="3443245"/>
+            <a:ext cx="3590100" cy="923330"/>
+          </a:xfrm>
+          <a:prstGeom prst="rect">
+            <a:avLst/>
+          </a:prstGeom>
+          <a:noFill/>
+        </p:spPr>
+        <p:txBody>
+          <a:bodyPr wrap="square" rtlCol="0">
+            <a:spAutoFit/>
+          </a:bodyPr>
+          <a:lstStyle/>
+          <a:p>
+            <a:r>
+              <a:rPr lang="en-US" dirty="0">
+                <a:solidFill>
+                  <a:schemeClr val="accent4"/>
+                </a:solidFill>
+              </a:rPr>
+              <a:t>Edge AABB does collide with obstacle AABB – fine checking would reveal collision</a:t>
+            </a:r>
+          </a:p>
+        </p:txBody>
+      </p:sp>
+      <p:sp>
+        <p:nvSpPr>
+          <p:cNvPr id="35" name="TextBox 34"/>
+          <p:cNvSpPr txBox="1"/>
+          <p:nvPr/>
+        </p:nvSpPr>
+        <p:spPr>
+          <a:xfrm>
+            <a:off x="1034452" y="2177009"/>
+            <a:ext cx="3590100" cy="923330"/>
+          </a:xfrm>
+          <a:prstGeom prst="rect">
+            <a:avLst/>
+          </a:prstGeom>
+          <a:noFill/>
+        </p:spPr>
+        <p:txBody>
+          <a:bodyPr wrap="square" rtlCol="0">
+            <a:spAutoFit/>
+          </a:bodyPr>
+          <a:lstStyle/>
+          <a:p>
+            <a:r>
+              <a:rPr lang="en-US" dirty="0">
+                <a:solidFill>
+                  <a:schemeClr val="accent2"/>
+                </a:solidFill>
+              </a:rPr>
+              <a:t>Edge AABB does collide with obstacle AABB – fine checking would reveal no collision</a:t>
+            </a:r>
+          </a:p>
+        </p:txBody>
+      </p:sp>
+    </p:spTree>
+    <p:extLst>
+      <p:ext uri="{BB962C8B-B14F-4D97-AF65-F5344CB8AC3E}">
+        <p14:creationId xmlns:p14="http://schemas.microsoft.com/office/powerpoint/2010/main" val="1033864985"/>
+      </p:ext>
+    </p:extLst>
+  </p:cSld>
+  <p:clrMapOvr>
+    <a:masterClrMapping/>
+  </p:clrMapOvr>
+</p:sld>
+</file>
+
+<file path=ppt/slides/slide29.xml><?xml version="1.0" encoding="utf-8"?>
+<p:sld xmlns:a="http://schemas.openxmlformats.org/drawingml/2006/main" xmlns:r="http://schemas.openxmlformats.org/officeDocument/2006/relationships" xmlns:p="http://schemas.openxmlformats.org/presentationml/2006/main">
+  <p:cSld>
+    <p:spTree>
+      <p:nvGrpSpPr>
+        <p:cNvPr id="1" name=""/>
+        <p:cNvGrpSpPr/>
+        <p:nvPr/>
+      </p:nvGrpSpPr>
+      <p:grpSpPr>
+        <a:xfrm>
+          <a:off x="0" y="0"/>
+          <a:ext cx="0" cy="0"/>
+          <a:chOff x="0" y="0"/>
+          <a:chExt cx="0" cy="0"/>
+        </a:xfrm>
+      </p:grpSpPr>
+      <p:sp>
+        <p:nvSpPr>
+          <p:cNvPr id="2" name="Title 1">
+            <a:extLst>
+              <a:ext uri="{FF2B5EF4-FFF2-40B4-BE49-F238E27FC236}">
+                <a16:creationId xmlns:a16="http://schemas.microsoft.com/office/drawing/2014/main" id="{7CFA8E7E-4C99-6031-870B-C65E9FB9EE88}"/>
+              </a:ext>
+            </a:extLst>
+          </p:cNvPr>
+          <p:cNvSpPr>
+            <a:spLocks noGrp="1"/>
+          </p:cNvSpPr>
+          <p:nvPr>
+            <p:ph type="title"/>
+          </p:nvPr>
+        </p:nvSpPr>
+        <p:spPr/>
+        <p:txBody>
+          <a:bodyPr>
+            <a:normAutofit fontScale="90000"/>
+          </a:bodyPr>
+          <a:lstStyle/>
+          <a:p>
+            <a:r>
+              <a:rPr lang="en-US" dirty="0"/>
+              <a:t>Combining this AABB check and a visibility check, obstacles can be removed from the </a:t>
+            </a:r>
+            <a:r>
+              <a:rPr lang="en-US" dirty="0" err="1"/>
+              <a:t>vgraph</a:t>
+            </a:r>
+            <a:r>
+              <a:rPr lang="en-US" dirty="0"/>
+              <a:t> without recalculating the entire visibility graph.</a:t>
+            </a:r>
+          </a:p>
+        </p:txBody>
+      </p:sp>
+      <p:sp>
+        <p:nvSpPr>
+          <p:cNvPr id="3" name="Slide Number Placeholder 2">
+            <a:extLst>
+              <a:ext uri="{FF2B5EF4-FFF2-40B4-BE49-F238E27FC236}">
+                <a16:creationId xmlns:a16="http://schemas.microsoft.com/office/drawing/2014/main" id="{9D5CC244-8B8F-8048-CB09-32BE985150E5}"/>
+              </a:ext>
+            </a:extLst>
+          </p:cNvPr>
+          <p:cNvSpPr>
+            <a:spLocks noGrp="1"/>
+          </p:cNvSpPr>
+          <p:nvPr>
+            <p:ph type="sldNum" sz="quarter" idx="12"/>
+          </p:nvPr>
+        </p:nvSpPr>
+        <p:spPr/>
+        <p:txBody>
+          <a:bodyPr/>
+          <a:lstStyle/>
+          <a:p>
+            <a:fld id="{CB3FC469-CA8B-4EE5-AE73-966FC6A86920}" type="slidenum">
+              <a:rPr lang="en-US" smtClean="0"/>
+              <a:t>29</a:t>
+            </a:fld>
+            <a:endParaRPr lang="en-US"/>
+          </a:p>
+        </p:txBody>
+      </p:sp>
+      <p:sp>
+        <p:nvSpPr>
+          <p:cNvPr id="4" name="Content Placeholder 3">
+            <a:extLst>
+              <a:ext uri="{FF2B5EF4-FFF2-40B4-BE49-F238E27FC236}">
+                <a16:creationId xmlns:a16="http://schemas.microsoft.com/office/drawing/2014/main" id="{8B882563-E27A-BCD6-C4F4-747F9CC442F0}"/>
+              </a:ext>
+            </a:extLst>
+          </p:cNvPr>
+          <p:cNvSpPr>
+            <a:spLocks noGrp="1"/>
+          </p:cNvSpPr>
+          <p:nvPr>
+            <p:ph idx="1"/>
+          </p:nvPr>
+        </p:nvSpPr>
+        <p:spPr>
+          <a:xfrm>
+            <a:off x="7703507" y="1095513"/>
+            <a:ext cx="4065160" cy="5081450"/>
+          </a:xfrm>
+        </p:spPr>
+        <p:txBody>
+          <a:bodyPr/>
+          <a:lstStyle/>
+          <a:p>
+            <a:r>
+              <a:rPr lang="en-US" dirty="0"/>
+              <a:t>This requires about half as many edge intersection checks (from ~3000 down to ~1500)</a:t>
+            </a:r>
+          </a:p>
+        </p:txBody>
+      </p:sp>
+      <p:sp>
+        <p:nvSpPr>
+          <p:cNvPr id="15" name="Arrow: Right 14">
+            <a:extLst>
+              <a:ext uri="{FF2B5EF4-FFF2-40B4-BE49-F238E27FC236}">
+                <a16:creationId xmlns:a16="http://schemas.microsoft.com/office/drawing/2014/main" id="{A06DD0DD-B824-8BD7-D9B1-E9337E9365E7}"/>
+              </a:ext>
+            </a:extLst>
+          </p:cNvPr>
+          <p:cNvSpPr/>
+          <p:nvPr/>
+        </p:nvSpPr>
+        <p:spPr>
+          <a:xfrm>
+            <a:off x="5675586" y="3263462"/>
+            <a:ext cx="1135117" cy="2286000"/>
+          </a:xfrm>
+          <a:prstGeom prst="rightArrow">
+            <a:avLst/>
+          </a:prstGeom>
+        </p:spPr>
+        <p:style>
+          <a:lnRef idx="2">
+            <a:schemeClr val="accent1">
+              <a:shade val="15000"/>
+            </a:schemeClr>
+          </a:lnRef>
+          <a:fillRef idx="1">
+            <a:schemeClr val="accent1"/>
+          </a:fillRef>
+          <a:effectRef idx="0">
+            <a:schemeClr val="accent1"/>
+          </a:effectRef>
+          <a:fontRef idx="minor">
+            <a:schemeClr val="lt1"/>
+          </a:fontRef>
+        </p:style>
+        <p:txBody>
+          <a:bodyPr rtlCol="0" anchor="ctr"/>
+          <a:lstStyle/>
+          <a:p>
+            <a:pPr algn="ctr"/>
+            <a:endParaRPr lang="en-US"/>
+          </a:p>
+        </p:txBody>
+      </p:sp>
+      <p:pic>
+        <p:nvPicPr>
+          <p:cNvPr id="6" name="Picture 5">
+            <a:extLst>
+              <a:ext uri="{FF2B5EF4-FFF2-40B4-BE49-F238E27FC236}">
+                <a16:creationId xmlns:a16="http://schemas.microsoft.com/office/drawing/2014/main" id="{3F94F325-34FC-DD8F-06ED-E3EBE945A5BF}"/>
+              </a:ext>
+            </a:extLst>
+          </p:cNvPr>
+          <p:cNvPicPr>
+            <a:picLocks noChangeAspect="1"/>
+          </p:cNvPicPr>
+          <p:nvPr/>
+        </p:nvPicPr>
+        <p:blipFill>
+          <a:blip r:embed="rId2"/>
+          <a:stretch>
+            <a:fillRect/>
+          </a:stretch>
+        </p:blipFill>
+        <p:spPr>
+          <a:xfrm>
+            <a:off x="762000" y="2080103"/>
+            <a:ext cx="5334000" cy="4000500"/>
+          </a:xfrm>
+          <a:prstGeom prst="rect">
+            <a:avLst/>
+          </a:prstGeom>
+        </p:spPr>
+      </p:pic>
+      <p:pic>
+        <p:nvPicPr>
+          <p:cNvPr id="9" name="Picture 8">
+            <a:extLst>
+              <a:ext uri="{FF2B5EF4-FFF2-40B4-BE49-F238E27FC236}">
+                <a16:creationId xmlns:a16="http://schemas.microsoft.com/office/drawing/2014/main" id="{957592B1-C9F0-4DC4-6DDE-F0FBC6886D09}"/>
+              </a:ext>
+            </a:extLst>
+          </p:cNvPr>
+          <p:cNvPicPr>
+            <a:picLocks noChangeAspect="1"/>
+          </p:cNvPicPr>
+          <p:nvPr/>
+        </p:nvPicPr>
+        <p:blipFill>
+          <a:blip r:embed="rId3"/>
+          <a:stretch>
+            <a:fillRect/>
+          </a:stretch>
+        </p:blipFill>
+        <p:spPr>
+          <a:xfrm>
+            <a:off x="6772406" y="2080103"/>
+            <a:ext cx="5334000" cy="4000500"/>
+          </a:xfrm>
+          <a:prstGeom prst="rect">
+            <a:avLst/>
+          </a:prstGeom>
+        </p:spPr>
+      </p:pic>
+    </p:spTree>
+    <p:extLst>
+      <p:ext uri="{BB962C8B-B14F-4D97-AF65-F5344CB8AC3E}">
+        <p14:creationId xmlns:p14="http://schemas.microsoft.com/office/powerpoint/2010/main" val="4275599367"/>
+      </p:ext>
+    </p:extLst>
+  </p:cSld>
+  <p:clrMapOvr>
+    <a:masterClrMapping/>
+  </p:clrMapOvr>
+</p:sld>
+</file>
+
 <file path=ppt/slides/slide3.xml><?xml version="1.0" encoding="utf-8"?>
 <p:sld xmlns:a="http://schemas.openxmlformats.org/drawingml/2006/main" xmlns:r="http://schemas.openxmlformats.org/officeDocument/2006/relationships" xmlns:p="http://schemas.openxmlformats.org/presentationml/2006/main">
   <p:cSld>
@@ -10380,6 +12244,1734 @@
     <p:extLst>
       <p:ext uri="{BB962C8B-B14F-4D97-AF65-F5344CB8AC3E}">
         <p14:creationId xmlns:p14="http://schemas.microsoft.com/office/powerpoint/2010/main" val="2959359197"/>
+      </p:ext>
+    </p:extLst>
+  </p:cSld>
+  <p:clrMapOvr>
+    <a:masterClrMapping/>
+  </p:clrMapOvr>
+</p:sld>
+</file>
+
+<file path=ppt/slides/slide30.xml><?xml version="1.0" encoding="utf-8"?>
+<p:sld xmlns:a="http://schemas.openxmlformats.org/drawingml/2006/main" xmlns:r="http://schemas.openxmlformats.org/officeDocument/2006/relationships" xmlns:p="http://schemas.openxmlformats.org/presentationml/2006/main">
+  <p:cSld>
+    <p:spTree>
+      <p:nvGrpSpPr>
+        <p:cNvPr id="1" name=""/>
+        <p:cNvGrpSpPr/>
+        <p:nvPr/>
+      </p:nvGrpSpPr>
+      <p:grpSpPr>
+        <a:xfrm>
+          <a:off x="0" y="0"/>
+          <a:ext cx="0" cy="0"/>
+          <a:chOff x="0" y="0"/>
+          <a:chExt cx="0" cy="0"/>
+        </a:xfrm>
+      </p:grpSpPr>
+      <p:sp>
+        <p:nvSpPr>
+          <p:cNvPr id="2" name="Title 1">
+            <a:extLst>
+              <a:ext uri="{FF2B5EF4-FFF2-40B4-BE49-F238E27FC236}">
+                <a16:creationId xmlns:a16="http://schemas.microsoft.com/office/drawing/2014/main" id="{7CFA8E7E-4C99-6031-870B-C65E9FB9EE88}"/>
+              </a:ext>
+            </a:extLst>
+          </p:cNvPr>
+          <p:cNvSpPr>
+            <a:spLocks noGrp="1"/>
+          </p:cNvSpPr>
+          <p:nvPr>
+            <p:ph type="title"/>
+          </p:nvPr>
+        </p:nvSpPr>
+        <p:spPr/>
+        <p:txBody>
+          <a:bodyPr>
+            <a:normAutofit fontScale="90000"/>
+          </a:bodyPr>
+          <a:lstStyle/>
+          <a:p>
+            <a:r>
+              <a:rPr lang="en-US" dirty="0"/>
+              <a:t>Combining this AABB check and a visibility check, obstacles can be removed from the </a:t>
+            </a:r>
+            <a:r>
+              <a:rPr lang="en-US" dirty="0" err="1"/>
+              <a:t>vgraph</a:t>
+            </a:r>
+            <a:r>
+              <a:rPr lang="en-US" dirty="0"/>
+              <a:t> without recalculating the entire visibility graph.</a:t>
+            </a:r>
+          </a:p>
+        </p:txBody>
+      </p:sp>
+      <p:sp>
+        <p:nvSpPr>
+          <p:cNvPr id="3" name="Slide Number Placeholder 2">
+            <a:extLst>
+              <a:ext uri="{FF2B5EF4-FFF2-40B4-BE49-F238E27FC236}">
+                <a16:creationId xmlns:a16="http://schemas.microsoft.com/office/drawing/2014/main" id="{9D5CC244-8B8F-8048-CB09-32BE985150E5}"/>
+              </a:ext>
+            </a:extLst>
+          </p:cNvPr>
+          <p:cNvSpPr>
+            <a:spLocks noGrp="1"/>
+          </p:cNvSpPr>
+          <p:nvPr>
+            <p:ph type="sldNum" sz="quarter" idx="12"/>
+          </p:nvPr>
+        </p:nvSpPr>
+        <p:spPr/>
+        <p:txBody>
+          <a:bodyPr/>
+          <a:lstStyle/>
+          <a:p>
+            <a:fld id="{CB3FC469-CA8B-4EE5-AE73-966FC6A86920}" type="slidenum">
+              <a:rPr lang="en-US" smtClean="0"/>
+              <a:t>30</a:t>
+            </a:fld>
+            <a:endParaRPr lang="en-US"/>
+          </a:p>
+        </p:txBody>
+      </p:sp>
+      <p:sp>
+        <p:nvSpPr>
+          <p:cNvPr id="4" name="Content Placeholder 3">
+            <a:extLst>
+              <a:ext uri="{FF2B5EF4-FFF2-40B4-BE49-F238E27FC236}">
+                <a16:creationId xmlns:a16="http://schemas.microsoft.com/office/drawing/2014/main" id="{8B882563-E27A-BCD6-C4F4-747F9CC442F0}"/>
+              </a:ext>
+            </a:extLst>
+          </p:cNvPr>
+          <p:cNvSpPr>
+            <a:spLocks noGrp="1"/>
+          </p:cNvSpPr>
+          <p:nvPr>
+            <p:ph idx="1"/>
+          </p:nvPr>
+        </p:nvSpPr>
+        <p:spPr>
+          <a:xfrm>
+            <a:off x="7703507" y="1095513"/>
+            <a:ext cx="4065160" cy="5081450"/>
+          </a:xfrm>
+        </p:spPr>
+        <p:txBody>
+          <a:bodyPr/>
+          <a:lstStyle/>
+          <a:p>
+            <a:r>
+              <a:rPr lang="en-US" dirty="0"/>
+              <a:t>This requires about half as many edge intersection checks (from ~270k down to ~93k)</a:t>
+            </a:r>
+          </a:p>
+        </p:txBody>
+      </p:sp>
+      <p:pic>
+        <p:nvPicPr>
+          <p:cNvPr id="8" name="Picture 7">
+            <a:extLst>
+              <a:ext uri="{FF2B5EF4-FFF2-40B4-BE49-F238E27FC236}">
+                <a16:creationId xmlns:a16="http://schemas.microsoft.com/office/drawing/2014/main" id="{95CC8BEC-4AB8-5076-18D3-76B406CB962A}"/>
+              </a:ext>
+            </a:extLst>
+          </p:cNvPr>
+          <p:cNvPicPr>
+            <a:picLocks noChangeAspect="1"/>
+          </p:cNvPicPr>
+          <p:nvPr/>
+        </p:nvPicPr>
+        <p:blipFill>
+          <a:blip r:embed="rId2"/>
+          <a:stretch>
+            <a:fillRect/>
+          </a:stretch>
+        </p:blipFill>
+        <p:spPr>
+          <a:xfrm>
+            <a:off x="796169" y="2233929"/>
+            <a:ext cx="5334000" cy="4000500"/>
+          </a:xfrm>
+          <a:prstGeom prst="rect">
+            <a:avLst/>
+          </a:prstGeom>
+        </p:spPr>
+      </p:pic>
+      <p:pic>
+        <p:nvPicPr>
+          <p:cNvPr id="14" name="Picture 13">
+            <a:extLst>
+              <a:ext uri="{FF2B5EF4-FFF2-40B4-BE49-F238E27FC236}">
+                <a16:creationId xmlns:a16="http://schemas.microsoft.com/office/drawing/2014/main" id="{CA5BF8A1-EC39-F0DD-581A-3E54404DC7D1}"/>
+              </a:ext>
+            </a:extLst>
+          </p:cNvPr>
+          <p:cNvPicPr>
+            <a:picLocks noChangeAspect="1"/>
+          </p:cNvPicPr>
+          <p:nvPr/>
+        </p:nvPicPr>
+        <p:blipFill>
+          <a:blip r:embed="rId3"/>
+          <a:stretch>
+            <a:fillRect/>
+          </a:stretch>
+        </p:blipFill>
+        <p:spPr>
+          <a:xfrm>
+            <a:off x="6654615" y="2233929"/>
+            <a:ext cx="5334000" cy="4000500"/>
+          </a:xfrm>
+          <a:prstGeom prst="rect">
+            <a:avLst/>
+          </a:prstGeom>
+        </p:spPr>
+      </p:pic>
+      <p:sp>
+        <p:nvSpPr>
+          <p:cNvPr id="15" name="Arrow: Right 14">
+            <a:extLst>
+              <a:ext uri="{FF2B5EF4-FFF2-40B4-BE49-F238E27FC236}">
+                <a16:creationId xmlns:a16="http://schemas.microsoft.com/office/drawing/2014/main" id="{A06DD0DD-B824-8BD7-D9B1-E9337E9365E7}"/>
+              </a:ext>
+            </a:extLst>
+          </p:cNvPr>
+          <p:cNvSpPr/>
+          <p:nvPr/>
+        </p:nvSpPr>
+        <p:spPr>
+          <a:xfrm>
+            <a:off x="5675586" y="3263462"/>
+            <a:ext cx="1135117" cy="2286000"/>
+          </a:xfrm>
+          <a:prstGeom prst="rightArrow">
+            <a:avLst/>
+          </a:prstGeom>
+        </p:spPr>
+        <p:style>
+          <a:lnRef idx="2">
+            <a:schemeClr val="accent1">
+              <a:shade val="15000"/>
+            </a:schemeClr>
+          </a:lnRef>
+          <a:fillRef idx="1">
+            <a:schemeClr val="accent1"/>
+          </a:fillRef>
+          <a:effectRef idx="0">
+            <a:schemeClr val="accent1"/>
+          </a:effectRef>
+          <a:fontRef idx="minor">
+            <a:schemeClr val="lt1"/>
+          </a:fontRef>
+        </p:style>
+        <p:txBody>
+          <a:bodyPr rtlCol="0" anchor="ctr"/>
+          <a:lstStyle/>
+          <a:p>
+            <a:pPr algn="ctr"/>
+            <a:endParaRPr lang="en-US"/>
+          </a:p>
+        </p:txBody>
+      </p:sp>
+    </p:spTree>
+    <p:extLst>
+      <p:ext uri="{BB962C8B-B14F-4D97-AF65-F5344CB8AC3E}">
+        <p14:creationId xmlns:p14="http://schemas.microsoft.com/office/powerpoint/2010/main" val="2300752058"/>
+      </p:ext>
+    </p:extLst>
+  </p:cSld>
+  <p:clrMapOvr>
+    <a:masterClrMapping/>
+  </p:clrMapOvr>
+</p:sld>
+</file>
+
+<file path=ppt/slides/slide31.xml><?xml version="1.0" encoding="utf-8"?>
+<p:sld xmlns:a="http://schemas.openxmlformats.org/drawingml/2006/main" xmlns:r="http://schemas.openxmlformats.org/officeDocument/2006/relationships" xmlns:p="http://schemas.openxmlformats.org/presentationml/2006/main" show="0">
+  <p:cSld>
+    <p:spTree>
+      <p:nvGrpSpPr>
+        <p:cNvPr id="1" name=""/>
+        <p:cNvGrpSpPr/>
+        <p:nvPr/>
+      </p:nvGrpSpPr>
+      <p:grpSpPr>
+        <a:xfrm>
+          <a:off x="0" y="0"/>
+          <a:ext cx="0" cy="0"/>
+          <a:chOff x="0" y="0"/>
+          <a:chExt cx="0" cy="0"/>
+        </a:xfrm>
+      </p:grpSpPr>
+      <p:pic>
+        <p:nvPicPr>
+          <p:cNvPr id="8" name="Picture 7"/>
+          <p:cNvPicPr>
+            <a:picLocks noChangeAspect="1"/>
+          </p:cNvPicPr>
+          <p:nvPr/>
+        </p:nvPicPr>
+        <p:blipFill>
+          <a:blip r:embed="rId3"/>
+          <a:stretch>
+            <a:fillRect/>
+          </a:stretch>
+        </p:blipFill>
+        <p:spPr>
+          <a:xfrm>
+            <a:off x="6186258" y="1059193"/>
+            <a:ext cx="7104438" cy="5328329"/>
+          </a:xfrm>
+          <a:prstGeom prst="rect">
+            <a:avLst/>
+          </a:prstGeom>
+        </p:spPr>
+      </p:pic>
+      <p:sp>
+        <p:nvSpPr>
+          <p:cNvPr id="3" name="Slide Number Placeholder 2"/>
+          <p:cNvSpPr>
+            <a:spLocks noGrp="1"/>
+          </p:cNvSpPr>
+          <p:nvPr>
+            <p:ph type="sldNum" sz="quarter" idx="12"/>
+          </p:nvPr>
+        </p:nvSpPr>
+        <p:spPr/>
+        <p:txBody>
+          <a:bodyPr/>
+          <a:lstStyle/>
+          <a:p>
+            <a:fld id="{CB3FC469-CA8B-4EE5-AE73-966FC6A86920}" type="slidenum">
+              <a:rPr lang="en-US" smtClean="0"/>
+              <a:t>31</a:t>
+            </a:fld>
+            <a:endParaRPr lang="en-US"/>
+          </a:p>
+        </p:txBody>
+      </p:sp>
+      <p:sp>
+        <p:nvSpPr>
+          <p:cNvPr id="2" name="Title 1"/>
+          <p:cNvSpPr>
+            <a:spLocks noGrp="1"/>
+          </p:cNvSpPr>
+          <p:nvPr>
+            <p:ph type="title"/>
+          </p:nvPr>
+        </p:nvSpPr>
+        <p:spPr/>
+        <p:txBody>
+          <a:bodyPr/>
+          <a:lstStyle/>
+          <a:p>
+            <a:r>
+              <a:rPr lang="en-US" dirty="0"/>
+              <a:t>A similar method can be applied </a:t>
+            </a:r>
+            <a:r>
+              <a:rPr lang="en-US"/>
+              <a:t>to add obstacles </a:t>
+            </a:r>
+            <a:r>
+              <a:rPr lang="en-US" dirty="0"/>
+              <a:t>from the visibility graph.</a:t>
+            </a:r>
+          </a:p>
+        </p:txBody>
+      </p:sp>
+      <p:sp>
+        <p:nvSpPr>
+          <p:cNvPr id="5" name="Content Placeholder 3">
+            <a:extLst>
+              <a:ext uri="{FF2B5EF4-FFF2-40B4-BE49-F238E27FC236}">
+                <a16:creationId xmlns:a16="http://schemas.microsoft.com/office/drawing/2014/main" id="{8B882563-E27A-BCD6-C4F4-747F9CC442F0}"/>
+              </a:ext>
+            </a:extLst>
+          </p:cNvPr>
+          <p:cNvSpPr txBox="1">
+            <a:spLocks/>
+          </p:cNvSpPr>
+          <p:nvPr/>
+        </p:nvSpPr>
+        <p:spPr>
+          <a:xfrm>
+            <a:off x="7840615" y="1635988"/>
+            <a:ext cx="4065160" cy="5081450"/>
+          </a:xfrm>
+          <a:prstGeom prst="rect">
+            <a:avLst/>
+          </a:prstGeom>
+        </p:spPr>
+        <p:txBody>
+          <a:bodyPr vert="horz" lIns="91440" tIns="45720" rIns="91440" bIns="45720" rtlCol="0">
+            <a:normAutofit/>
+          </a:bodyPr>
+          <a:lstStyle>
+            <a:lvl1pPr marL="228600" indent="-228600" algn="l" defTabSz="914400" rtl="0" eaLnBrk="1" latinLnBrk="0" hangingPunct="1">
+              <a:lnSpc>
+                <a:spcPct val="100000"/>
+              </a:lnSpc>
+              <a:spcBef>
+                <a:spcPts val="1000"/>
+              </a:spcBef>
+              <a:buFont typeface="Arial" panose="020B0604020202020204" pitchFamily="34" charset="0"/>
+              <a:buChar char="•"/>
+              <a:defRPr sz="2000" b="1" i="0" kern="1200" cap="none" baseline="0">
+                <a:solidFill>
+                  <a:schemeClr val="tx1"/>
+                </a:solidFill>
+                <a:latin typeface="Franklin Gothic Book" panose="020B0503020102020204" pitchFamily="34" charset="0"/>
+                <a:ea typeface="+mn-ea"/>
+                <a:cs typeface="+mn-cs"/>
+              </a:defRPr>
+            </a:lvl1pPr>
+            <a:lvl2pPr marL="685800" indent="-228600" algn="l" defTabSz="914400" rtl="0" eaLnBrk="1" latinLnBrk="0" hangingPunct="1">
+              <a:lnSpc>
+                <a:spcPct val="100000"/>
+              </a:lnSpc>
+              <a:spcBef>
+                <a:spcPts val="500"/>
+              </a:spcBef>
+              <a:buFont typeface="Arial" panose="020B0604020202020204" pitchFamily="34" charset="0"/>
+              <a:buChar char="•"/>
+              <a:defRPr sz="2000" kern="1200">
+                <a:solidFill>
+                  <a:schemeClr val="tx1"/>
+                </a:solidFill>
+                <a:latin typeface="Franklin Gothic Book" panose="020B0503020102020204" pitchFamily="34" charset="0"/>
+                <a:ea typeface="+mn-ea"/>
+                <a:cs typeface="+mn-cs"/>
+              </a:defRPr>
+            </a:lvl2pPr>
+            <a:lvl3pPr marL="1143000" indent="-228600" algn="l" defTabSz="914400" rtl="0" eaLnBrk="1" latinLnBrk="0" hangingPunct="1">
+              <a:lnSpc>
+                <a:spcPct val="100000"/>
+              </a:lnSpc>
+              <a:spcBef>
+                <a:spcPts val="500"/>
+              </a:spcBef>
+              <a:buFont typeface="Arial" panose="020B0604020202020204" pitchFamily="34" charset="0"/>
+              <a:buChar char="•"/>
+              <a:defRPr sz="1800" kern="1200">
+                <a:solidFill>
+                  <a:schemeClr val="tx1"/>
+                </a:solidFill>
+                <a:latin typeface="Franklin Gothic Book" panose="020B0503020102020204" pitchFamily="34" charset="0"/>
+                <a:ea typeface="+mn-ea"/>
+                <a:cs typeface="+mn-cs"/>
+              </a:defRPr>
+            </a:lvl3pPr>
+            <a:lvl4pPr marL="1600200" indent="-228600" algn="l" defTabSz="914400" rtl="0" eaLnBrk="1" latinLnBrk="0" hangingPunct="1">
+              <a:lnSpc>
+                <a:spcPct val="100000"/>
+              </a:lnSpc>
+              <a:spcBef>
+                <a:spcPts val="500"/>
+              </a:spcBef>
+              <a:buFont typeface="Arial" panose="020B0604020202020204" pitchFamily="34" charset="0"/>
+              <a:buChar char="•"/>
+              <a:defRPr sz="1600" kern="1200">
+                <a:solidFill>
+                  <a:schemeClr val="tx1"/>
+                </a:solidFill>
+                <a:latin typeface="Franklin Gothic Book" panose="020B0503020102020204" pitchFamily="34" charset="0"/>
+                <a:ea typeface="+mn-ea"/>
+                <a:cs typeface="+mn-cs"/>
+              </a:defRPr>
+            </a:lvl4pPr>
+            <a:lvl5pPr marL="2057400" indent="-228600" algn="l" defTabSz="914400" rtl="0" eaLnBrk="1" latinLnBrk="0" hangingPunct="1">
+              <a:lnSpc>
+                <a:spcPct val="100000"/>
+              </a:lnSpc>
+              <a:spcBef>
+                <a:spcPts val="500"/>
+              </a:spcBef>
+              <a:buFont typeface="Arial" panose="020B0604020202020204" pitchFamily="34" charset="0"/>
+              <a:buChar char="•"/>
+              <a:defRPr sz="1600" kern="1200">
+                <a:solidFill>
+                  <a:schemeClr val="tx1"/>
+                </a:solidFill>
+                <a:latin typeface="Franklin Gothic Book" panose="020B0503020102020204" pitchFamily="34" charset="0"/>
+                <a:ea typeface="+mn-ea"/>
+                <a:cs typeface="+mn-cs"/>
+              </a:defRPr>
+            </a:lvl5pPr>
+            <a:lvl6pPr marL="2514600" indent="-228600" algn="l" defTabSz="914400" rtl="0" eaLnBrk="1" latinLnBrk="0" hangingPunct="1">
+              <a:lnSpc>
+                <a:spcPct val="90000"/>
+              </a:lnSpc>
+              <a:spcBef>
+                <a:spcPts val="500"/>
+              </a:spcBef>
+              <a:buFont typeface="Arial" panose="020B0604020202020204" pitchFamily="34" charset="0"/>
+              <a:buChar char="•"/>
+              <a:defRPr sz="1800" kern="1200">
+                <a:solidFill>
+                  <a:schemeClr val="tx1"/>
+                </a:solidFill>
+                <a:latin typeface="+mn-lt"/>
+                <a:ea typeface="+mn-ea"/>
+                <a:cs typeface="+mn-cs"/>
+              </a:defRPr>
+            </a:lvl6pPr>
+            <a:lvl7pPr marL="2971800" indent="-228600" algn="l" defTabSz="914400" rtl="0" eaLnBrk="1" latinLnBrk="0" hangingPunct="1">
+              <a:lnSpc>
+                <a:spcPct val="90000"/>
+              </a:lnSpc>
+              <a:spcBef>
+                <a:spcPts val="500"/>
+              </a:spcBef>
+              <a:buFont typeface="Arial" panose="020B0604020202020204" pitchFamily="34" charset="0"/>
+              <a:buChar char="•"/>
+              <a:defRPr sz="1800" kern="1200">
+                <a:solidFill>
+                  <a:schemeClr val="tx1"/>
+                </a:solidFill>
+                <a:latin typeface="+mn-lt"/>
+                <a:ea typeface="+mn-ea"/>
+                <a:cs typeface="+mn-cs"/>
+              </a:defRPr>
+            </a:lvl7pPr>
+            <a:lvl8pPr marL="3429000" indent="-228600" algn="l" defTabSz="914400" rtl="0" eaLnBrk="1" latinLnBrk="0" hangingPunct="1">
+              <a:lnSpc>
+                <a:spcPct val="90000"/>
+              </a:lnSpc>
+              <a:spcBef>
+                <a:spcPts val="500"/>
+              </a:spcBef>
+              <a:buFont typeface="Arial" panose="020B0604020202020204" pitchFamily="34" charset="0"/>
+              <a:buChar char="•"/>
+              <a:defRPr sz="1800" kern="1200">
+                <a:solidFill>
+                  <a:schemeClr val="tx1"/>
+                </a:solidFill>
+                <a:latin typeface="+mn-lt"/>
+                <a:ea typeface="+mn-ea"/>
+                <a:cs typeface="+mn-cs"/>
+              </a:defRPr>
+            </a:lvl8pPr>
+            <a:lvl9pPr marL="3886200" indent="-228600" algn="l" defTabSz="914400" rtl="0" eaLnBrk="1" latinLnBrk="0" hangingPunct="1">
+              <a:lnSpc>
+                <a:spcPct val="90000"/>
+              </a:lnSpc>
+              <a:spcBef>
+                <a:spcPts val="500"/>
+              </a:spcBef>
+              <a:buFont typeface="Arial" panose="020B0604020202020204" pitchFamily="34" charset="0"/>
+              <a:buChar char="•"/>
+              <a:defRPr sz="1800" kern="1200">
+                <a:solidFill>
+                  <a:schemeClr val="tx1"/>
+                </a:solidFill>
+                <a:latin typeface="+mn-lt"/>
+                <a:ea typeface="+mn-ea"/>
+                <a:cs typeface="+mn-cs"/>
+              </a:defRPr>
+            </a:lvl9pPr>
+          </a:lstStyle>
+          <a:p>
+            <a:r>
+              <a:rPr lang="en-US" dirty="0"/>
+              <a:t>This requires approximately 10% of edges to be checked (down from ~3000 down to ~300)</a:t>
+            </a:r>
+          </a:p>
+        </p:txBody>
+      </p:sp>
+      <p:sp>
+        <p:nvSpPr>
+          <p:cNvPr id="6" name="Arrow: Right 14">
+            <a:extLst>
+              <a:ext uri="{FF2B5EF4-FFF2-40B4-BE49-F238E27FC236}">
+                <a16:creationId xmlns:a16="http://schemas.microsoft.com/office/drawing/2014/main" id="{A06DD0DD-B824-8BD7-D9B1-E9337E9365E7}"/>
+              </a:ext>
+            </a:extLst>
+          </p:cNvPr>
+          <p:cNvSpPr/>
+          <p:nvPr/>
+        </p:nvSpPr>
+        <p:spPr>
+          <a:xfrm>
+            <a:off x="5675586" y="3263462"/>
+            <a:ext cx="1135117" cy="2286000"/>
+          </a:xfrm>
+          <a:prstGeom prst="rightArrow">
+            <a:avLst/>
+          </a:prstGeom>
+        </p:spPr>
+        <p:style>
+          <a:lnRef idx="2">
+            <a:schemeClr val="accent1">
+              <a:shade val="15000"/>
+            </a:schemeClr>
+          </a:lnRef>
+          <a:fillRef idx="1">
+            <a:schemeClr val="accent1"/>
+          </a:fillRef>
+          <a:effectRef idx="0">
+            <a:schemeClr val="accent1"/>
+          </a:effectRef>
+          <a:fontRef idx="minor">
+            <a:schemeClr val="lt1"/>
+          </a:fontRef>
+        </p:style>
+        <p:txBody>
+          <a:bodyPr rtlCol="0" anchor="ctr"/>
+          <a:lstStyle/>
+          <a:p>
+            <a:pPr algn="ctr"/>
+            <a:endParaRPr lang="en-US"/>
+          </a:p>
+        </p:txBody>
+      </p:sp>
+      <p:pic>
+        <p:nvPicPr>
+          <p:cNvPr id="7" name="Picture 6">
+            <a:extLst>
+              <a:ext uri="{FF2B5EF4-FFF2-40B4-BE49-F238E27FC236}">
+                <a16:creationId xmlns:a16="http://schemas.microsoft.com/office/drawing/2014/main" id="{957592B1-C9F0-4DC4-6DDE-F0FBC6886D09}"/>
+              </a:ext>
+            </a:extLst>
+          </p:cNvPr>
+          <p:cNvPicPr>
+            <a:picLocks noChangeAspect="1"/>
+          </p:cNvPicPr>
+          <p:nvPr/>
+        </p:nvPicPr>
+        <p:blipFill>
+          <a:blip r:embed="rId4"/>
+          <a:stretch>
+            <a:fillRect/>
+          </a:stretch>
+        </p:blipFill>
+        <p:spPr>
+          <a:xfrm>
+            <a:off x="0" y="2176463"/>
+            <a:ext cx="5334000" cy="4000500"/>
+          </a:xfrm>
+          <a:prstGeom prst="rect">
+            <a:avLst/>
+          </a:prstGeom>
+        </p:spPr>
+      </p:pic>
+    </p:spTree>
+    <p:extLst>
+      <p:ext uri="{BB962C8B-B14F-4D97-AF65-F5344CB8AC3E}">
+        <p14:creationId xmlns:p14="http://schemas.microsoft.com/office/powerpoint/2010/main" val="198106359"/>
+      </p:ext>
+    </p:extLst>
+  </p:cSld>
+  <p:clrMapOvr>
+    <a:masterClrMapping/>
+  </p:clrMapOvr>
+</p:sld>
+</file>
+
+<file path=ppt/slides/slide32.xml><?xml version="1.0" encoding="utf-8"?>
+<p:sld xmlns:a="http://schemas.openxmlformats.org/drawingml/2006/main" xmlns:r="http://schemas.openxmlformats.org/officeDocument/2006/relationships" xmlns:p="http://schemas.openxmlformats.org/presentationml/2006/main">
+  <p:cSld>
+    <p:spTree>
+      <p:nvGrpSpPr>
+        <p:cNvPr id="1" name=""/>
+        <p:cNvGrpSpPr/>
+        <p:nvPr/>
+      </p:nvGrpSpPr>
+      <p:grpSpPr>
+        <a:xfrm>
+          <a:off x="0" y="0"/>
+          <a:ext cx="0" cy="0"/>
+          <a:chOff x="0" y="0"/>
+          <a:chExt cx="0" cy="0"/>
+        </a:xfrm>
+      </p:grpSpPr>
+      <p:pic>
+        <p:nvPicPr>
+          <p:cNvPr id="9" name="Picture 8"/>
+          <p:cNvPicPr>
+            <a:picLocks noChangeAspect="1"/>
+          </p:cNvPicPr>
+          <p:nvPr/>
+        </p:nvPicPr>
+        <p:blipFill>
+          <a:blip r:embed="rId3"/>
+          <a:stretch>
+            <a:fillRect/>
+          </a:stretch>
+        </p:blipFill>
+        <p:spPr>
+          <a:xfrm>
+            <a:off x="6243144" y="1141617"/>
+            <a:ext cx="6848677" cy="5136508"/>
+          </a:xfrm>
+          <a:prstGeom prst="rect">
+            <a:avLst/>
+          </a:prstGeom>
+        </p:spPr>
+      </p:pic>
+      <p:sp>
+        <p:nvSpPr>
+          <p:cNvPr id="3" name="Slide Number Placeholder 2"/>
+          <p:cNvSpPr>
+            <a:spLocks noGrp="1"/>
+          </p:cNvSpPr>
+          <p:nvPr>
+            <p:ph type="sldNum" sz="quarter" idx="12"/>
+          </p:nvPr>
+        </p:nvSpPr>
+        <p:spPr/>
+        <p:txBody>
+          <a:bodyPr/>
+          <a:lstStyle/>
+          <a:p>
+            <a:fld id="{CB3FC469-CA8B-4EE5-AE73-966FC6A86920}" type="slidenum">
+              <a:rPr lang="en-US" smtClean="0"/>
+              <a:t>32</a:t>
+            </a:fld>
+            <a:endParaRPr lang="en-US"/>
+          </a:p>
+        </p:txBody>
+      </p:sp>
+      <p:sp>
+        <p:nvSpPr>
+          <p:cNvPr id="2" name="Title 1"/>
+          <p:cNvSpPr>
+            <a:spLocks noGrp="1"/>
+          </p:cNvSpPr>
+          <p:nvPr>
+            <p:ph type="title"/>
+          </p:nvPr>
+        </p:nvSpPr>
+        <p:spPr/>
+        <p:txBody>
+          <a:bodyPr/>
+          <a:lstStyle/>
+          <a:p>
+            <a:r>
+              <a:rPr lang="en-US" dirty="0"/>
+              <a:t>A similar method can be applied to add obstacles from the visibility graph.</a:t>
+            </a:r>
+          </a:p>
+        </p:txBody>
+      </p:sp>
+      <p:sp>
+        <p:nvSpPr>
+          <p:cNvPr id="5" name="Content Placeholder 3">
+            <a:extLst>
+              <a:ext uri="{FF2B5EF4-FFF2-40B4-BE49-F238E27FC236}">
+                <a16:creationId xmlns:a16="http://schemas.microsoft.com/office/drawing/2014/main" id="{8B882563-E27A-BCD6-C4F4-747F9CC442F0}"/>
+              </a:ext>
+            </a:extLst>
+          </p:cNvPr>
+          <p:cNvSpPr txBox="1">
+            <a:spLocks/>
+          </p:cNvSpPr>
+          <p:nvPr/>
+        </p:nvSpPr>
+        <p:spPr>
+          <a:xfrm>
+            <a:off x="7840615" y="1635988"/>
+            <a:ext cx="4065160" cy="5081450"/>
+          </a:xfrm>
+          <a:prstGeom prst="rect">
+            <a:avLst/>
+          </a:prstGeom>
+        </p:spPr>
+        <p:txBody>
+          <a:bodyPr vert="horz" lIns="91440" tIns="45720" rIns="91440" bIns="45720" rtlCol="0">
+            <a:normAutofit/>
+          </a:bodyPr>
+          <a:lstStyle>
+            <a:lvl1pPr marL="228600" indent="-228600" algn="l" defTabSz="914400" rtl="0" eaLnBrk="1" latinLnBrk="0" hangingPunct="1">
+              <a:lnSpc>
+                <a:spcPct val="100000"/>
+              </a:lnSpc>
+              <a:spcBef>
+                <a:spcPts val="1000"/>
+              </a:spcBef>
+              <a:buFont typeface="Arial" panose="020B0604020202020204" pitchFamily="34" charset="0"/>
+              <a:buChar char="•"/>
+              <a:defRPr sz="2000" b="1" i="0" kern="1200" cap="none" baseline="0">
+                <a:solidFill>
+                  <a:schemeClr val="tx1"/>
+                </a:solidFill>
+                <a:latin typeface="Franklin Gothic Book" panose="020B0503020102020204" pitchFamily="34" charset="0"/>
+                <a:ea typeface="+mn-ea"/>
+                <a:cs typeface="+mn-cs"/>
+              </a:defRPr>
+            </a:lvl1pPr>
+            <a:lvl2pPr marL="685800" indent="-228600" algn="l" defTabSz="914400" rtl="0" eaLnBrk="1" latinLnBrk="0" hangingPunct="1">
+              <a:lnSpc>
+                <a:spcPct val="100000"/>
+              </a:lnSpc>
+              <a:spcBef>
+                <a:spcPts val="500"/>
+              </a:spcBef>
+              <a:buFont typeface="Arial" panose="020B0604020202020204" pitchFamily="34" charset="0"/>
+              <a:buChar char="•"/>
+              <a:defRPr sz="2000" kern="1200">
+                <a:solidFill>
+                  <a:schemeClr val="tx1"/>
+                </a:solidFill>
+                <a:latin typeface="Franklin Gothic Book" panose="020B0503020102020204" pitchFamily="34" charset="0"/>
+                <a:ea typeface="+mn-ea"/>
+                <a:cs typeface="+mn-cs"/>
+              </a:defRPr>
+            </a:lvl2pPr>
+            <a:lvl3pPr marL="1143000" indent="-228600" algn="l" defTabSz="914400" rtl="0" eaLnBrk="1" latinLnBrk="0" hangingPunct="1">
+              <a:lnSpc>
+                <a:spcPct val="100000"/>
+              </a:lnSpc>
+              <a:spcBef>
+                <a:spcPts val="500"/>
+              </a:spcBef>
+              <a:buFont typeface="Arial" panose="020B0604020202020204" pitchFamily="34" charset="0"/>
+              <a:buChar char="•"/>
+              <a:defRPr sz="1800" kern="1200">
+                <a:solidFill>
+                  <a:schemeClr val="tx1"/>
+                </a:solidFill>
+                <a:latin typeface="Franklin Gothic Book" panose="020B0503020102020204" pitchFamily="34" charset="0"/>
+                <a:ea typeface="+mn-ea"/>
+                <a:cs typeface="+mn-cs"/>
+              </a:defRPr>
+            </a:lvl3pPr>
+            <a:lvl4pPr marL="1600200" indent="-228600" algn="l" defTabSz="914400" rtl="0" eaLnBrk="1" latinLnBrk="0" hangingPunct="1">
+              <a:lnSpc>
+                <a:spcPct val="100000"/>
+              </a:lnSpc>
+              <a:spcBef>
+                <a:spcPts val="500"/>
+              </a:spcBef>
+              <a:buFont typeface="Arial" panose="020B0604020202020204" pitchFamily="34" charset="0"/>
+              <a:buChar char="•"/>
+              <a:defRPr sz="1600" kern="1200">
+                <a:solidFill>
+                  <a:schemeClr val="tx1"/>
+                </a:solidFill>
+                <a:latin typeface="Franklin Gothic Book" panose="020B0503020102020204" pitchFamily="34" charset="0"/>
+                <a:ea typeface="+mn-ea"/>
+                <a:cs typeface="+mn-cs"/>
+              </a:defRPr>
+            </a:lvl4pPr>
+            <a:lvl5pPr marL="2057400" indent="-228600" algn="l" defTabSz="914400" rtl="0" eaLnBrk="1" latinLnBrk="0" hangingPunct="1">
+              <a:lnSpc>
+                <a:spcPct val="100000"/>
+              </a:lnSpc>
+              <a:spcBef>
+                <a:spcPts val="500"/>
+              </a:spcBef>
+              <a:buFont typeface="Arial" panose="020B0604020202020204" pitchFamily="34" charset="0"/>
+              <a:buChar char="•"/>
+              <a:defRPr sz="1600" kern="1200">
+                <a:solidFill>
+                  <a:schemeClr val="tx1"/>
+                </a:solidFill>
+                <a:latin typeface="Franklin Gothic Book" panose="020B0503020102020204" pitchFamily="34" charset="0"/>
+                <a:ea typeface="+mn-ea"/>
+                <a:cs typeface="+mn-cs"/>
+              </a:defRPr>
+            </a:lvl5pPr>
+            <a:lvl6pPr marL="2514600" indent="-228600" algn="l" defTabSz="914400" rtl="0" eaLnBrk="1" latinLnBrk="0" hangingPunct="1">
+              <a:lnSpc>
+                <a:spcPct val="90000"/>
+              </a:lnSpc>
+              <a:spcBef>
+                <a:spcPts val="500"/>
+              </a:spcBef>
+              <a:buFont typeface="Arial" panose="020B0604020202020204" pitchFamily="34" charset="0"/>
+              <a:buChar char="•"/>
+              <a:defRPr sz="1800" kern="1200">
+                <a:solidFill>
+                  <a:schemeClr val="tx1"/>
+                </a:solidFill>
+                <a:latin typeface="+mn-lt"/>
+                <a:ea typeface="+mn-ea"/>
+                <a:cs typeface="+mn-cs"/>
+              </a:defRPr>
+            </a:lvl6pPr>
+            <a:lvl7pPr marL="2971800" indent="-228600" algn="l" defTabSz="914400" rtl="0" eaLnBrk="1" latinLnBrk="0" hangingPunct="1">
+              <a:lnSpc>
+                <a:spcPct val="90000"/>
+              </a:lnSpc>
+              <a:spcBef>
+                <a:spcPts val="500"/>
+              </a:spcBef>
+              <a:buFont typeface="Arial" panose="020B0604020202020204" pitchFamily="34" charset="0"/>
+              <a:buChar char="•"/>
+              <a:defRPr sz="1800" kern="1200">
+                <a:solidFill>
+                  <a:schemeClr val="tx1"/>
+                </a:solidFill>
+                <a:latin typeface="+mn-lt"/>
+                <a:ea typeface="+mn-ea"/>
+                <a:cs typeface="+mn-cs"/>
+              </a:defRPr>
+            </a:lvl7pPr>
+            <a:lvl8pPr marL="3429000" indent="-228600" algn="l" defTabSz="914400" rtl="0" eaLnBrk="1" latinLnBrk="0" hangingPunct="1">
+              <a:lnSpc>
+                <a:spcPct val="90000"/>
+              </a:lnSpc>
+              <a:spcBef>
+                <a:spcPts val="500"/>
+              </a:spcBef>
+              <a:buFont typeface="Arial" panose="020B0604020202020204" pitchFamily="34" charset="0"/>
+              <a:buChar char="•"/>
+              <a:defRPr sz="1800" kern="1200">
+                <a:solidFill>
+                  <a:schemeClr val="tx1"/>
+                </a:solidFill>
+                <a:latin typeface="+mn-lt"/>
+                <a:ea typeface="+mn-ea"/>
+                <a:cs typeface="+mn-cs"/>
+              </a:defRPr>
+            </a:lvl8pPr>
+            <a:lvl9pPr marL="3886200" indent="-228600" algn="l" defTabSz="914400" rtl="0" eaLnBrk="1" latinLnBrk="0" hangingPunct="1">
+              <a:lnSpc>
+                <a:spcPct val="90000"/>
+              </a:lnSpc>
+              <a:spcBef>
+                <a:spcPts val="500"/>
+              </a:spcBef>
+              <a:buFont typeface="Arial" panose="020B0604020202020204" pitchFamily="34" charset="0"/>
+              <a:buChar char="•"/>
+              <a:defRPr sz="1800" kern="1200">
+                <a:solidFill>
+                  <a:schemeClr val="tx1"/>
+                </a:solidFill>
+                <a:latin typeface="+mn-lt"/>
+                <a:ea typeface="+mn-ea"/>
+                <a:cs typeface="+mn-cs"/>
+              </a:defRPr>
+            </a:lvl9pPr>
+          </a:lstStyle>
+          <a:p>
+            <a:r>
+              <a:rPr lang="en-US" dirty="0"/>
+              <a:t>This requires approximately 10% of edges to be checked (down from ~3000 down to ~300)</a:t>
+            </a:r>
+          </a:p>
+        </p:txBody>
+      </p:sp>
+      <p:sp>
+        <p:nvSpPr>
+          <p:cNvPr id="6" name="Arrow: Right 14">
+            <a:extLst>
+              <a:ext uri="{FF2B5EF4-FFF2-40B4-BE49-F238E27FC236}">
+                <a16:creationId xmlns:a16="http://schemas.microsoft.com/office/drawing/2014/main" id="{A06DD0DD-B824-8BD7-D9B1-E9337E9365E7}"/>
+              </a:ext>
+            </a:extLst>
+          </p:cNvPr>
+          <p:cNvSpPr/>
+          <p:nvPr/>
+        </p:nvSpPr>
+        <p:spPr>
+          <a:xfrm>
+            <a:off x="5675586" y="3263462"/>
+            <a:ext cx="1135117" cy="2286000"/>
+          </a:xfrm>
+          <a:prstGeom prst="rightArrow">
+            <a:avLst/>
+          </a:prstGeom>
+        </p:spPr>
+        <p:style>
+          <a:lnRef idx="2">
+            <a:schemeClr val="accent1">
+              <a:shade val="15000"/>
+            </a:schemeClr>
+          </a:lnRef>
+          <a:fillRef idx="1">
+            <a:schemeClr val="accent1"/>
+          </a:fillRef>
+          <a:effectRef idx="0">
+            <a:schemeClr val="accent1"/>
+          </a:effectRef>
+          <a:fontRef idx="minor">
+            <a:schemeClr val="lt1"/>
+          </a:fontRef>
+        </p:style>
+        <p:txBody>
+          <a:bodyPr rtlCol="0" anchor="ctr"/>
+          <a:lstStyle/>
+          <a:p>
+            <a:pPr algn="ctr"/>
+            <a:endParaRPr lang="en-US"/>
+          </a:p>
+        </p:txBody>
+      </p:sp>
+      <p:pic>
+        <p:nvPicPr>
+          <p:cNvPr id="7" name="Picture 6">
+            <a:extLst>
+              <a:ext uri="{FF2B5EF4-FFF2-40B4-BE49-F238E27FC236}">
+                <a16:creationId xmlns:a16="http://schemas.microsoft.com/office/drawing/2014/main" id="{957592B1-C9F0-4DC4-6DDE-F0FBC6886D09}"/>
+              </a:ext>
+            </a:extLst>
+          </p:cNvPr>
+          <p:cNvPicPr>
+            <a:picLocks noChangeAspect="1"/>
+          </p:cNvPicPr>
+          <p:nvPr/>
+        </p:nvPicPr>
+        <p:blipFill>
+          <a:blip r:embed="rId4"/>
+          <a:stretch>
+            <a:fillRect/>
+          </a:stretch>
+        </p:blipFill>
+        <p:spPr>
+          <a:xfrm>
+            <a:off x="341586" y="1871663"/>
+            <a:ext cx="5334000" cy="4000500"/>
+          </a:xfrm>
+          <a:prstGeom prst="rect">
+            <a:avLst/>
+          </a:prstGeom>
+        </p:spPr>
+      </p:pic>
+    </p:spTree>
+    <p:extLst>
+      <p:ext uri="{BB962C8B-B14F-4D97-AF65-F5344CB8AC3E}">
+        <p14:creationId xmlns:p14="http://schemas.microsoft.com/office/powerpoint/2010/main" val="1832942819"/>
+      </p:ext>
+    </p:extLst>
+  </p:cSld>
+  <p:clrMapOvr>
+    <a:masterClrMapping/>
+  </p:clrMapOvr>
+</p:sld>
+</file>
+
+<file path=ppt/slides/slide33.xml><?xml version="1.0" encoding="utf-8"?>
+<p:sld xmlns:a="http://schemas.openxmlformats.org/drawingml/2006/main" xmlns:r="http://schemas.openxmlformats.org/officeDocument/2006/relationships" xmlns:p="http://schemas.openxmlformats.org/presentationml/2006/main" show="0">
+  <p:cSld>
+    <p:spTree>
+      <p:nvGrpSpPr>
+        <p:cNvPr id="1" name=""/>
+        <p:cNvGrpSpPr/>
+        <p:nvPr/>
+      </p:nvGrpSpPr>
+      <p:grpSpPr>
+        <a:xfrm>
+          <a:off x="0" y="0"/>
+          <a:ext cx="0" cy="0"/>
+          <a:chOff x="0" y="0"/>
+          <a:chExt cx="0" cy="0"/>
+        </a:xfrm>
+      </p:grpSpPr>
+      <p:pic>
+        <p:nvPicPr>
+          <p:cNvPr id="9" name="Picture 8"/>
+          <p:cNvPicPr>
+            <a:picLocks noChangeAspect="1"/>
+          </p:cNvPicPr>
+          <p:nvPr/>
+        </p:nvPicPr>
+        <p:blipFill>
+          <a:blip r:embed="rId3"/>
+          <a:stretch>
+            <a:fillRect/>
+          </a:stretch>
+        </p:blipFill>
+        <p:spPr>
+          <a:xfrm>
+            <a:off x="6243144" y="1227321"/>
+            <a:ext cx="6990983" cy="5243237"/>
+          </a:xfrm>
+          <a:prstGeom prst="rect">
+            <a:avLst/>
+          </a:prstGeom>
+        </p:spPr>
+      </p:pic>
+      <p:pic>
+        <p:nvPicPr>
+          <p:cNvPr id="8" name="Picture 7"/>
+          <p:cNvPicPr>
+            <a:picLocks noChangeAspect="1"/>
+          </p:cNvPicPr>
+          <p:nvPr/>
+        </p:nvPicPr>
+        <p:blipFill>
+          <a:blip r:embed="rId4"/>
+          <a:stretch>
+            <a:fillRect/>
+          </a:stretch>
+        </p:blipFill>
+        <p:spPr>
+          <a:xfrm>
+            <a:off x="-412145" y="1118871"/>
+            <a:ext cx="7104438" cy="5328329"/>
+          </a:xfrm>
+          <a:prstGeom prst="rect">
+            <a:avLst/>
+          </a:prstGeom>
+        </p:spPr>
+      </p:pic>
+      <p:sp>
+        <p:nvSpPr>
+          <p:cNvPr id="3" name="Slide Number Placeholder 2"/>
+          <p:cNvSpPr>
+            <a:spLocks noGrp="1"/>
+          </p:cNvSpPr>
+          <p:nvPr>
+            <p:ph type="sldNum" sz="quarter" idx="12"/>
+          </p:nvPr>
+        </p:nvSpPr>
+        <p:spPr/>
+        <p:txBody>
+          <a:bodyPr/>
+          <a:lstStyle/>
+          <a:p>
+            <a:fld id="{CB3FC469-CA8B-4EE5-AE73-966FC6A86920}" type="slidenum">
+              <a:rPr lang="en-US" smtClean="0"/>
+              <a:t>33</a:t>
+            </a:fld>
+            <a:endParaRPr lang="en-US"/>
+          </a:p>
+        </p:txBody>
+      </p:sp>
+      <p:sp>
+        <p:nvSpPr>
+          <p:cNvPr id="2" name="Title 1"/>
+          <p:cNvSpPr>
+            <a:spLocks noGrp="1"/>
+          </p:cNvSpPr>
+          <p:nvPr>
+            <p:ph type="title"/>
+          </p:nvPr>
+        </p:nvSpPr>
+        <p:spPr/>
+        <p:txBody>
+          <a:bodyPr/>
+          <a:lstStyle/>
+          <a:p>
+            <a:r>
+              <a:rPr lang="en-US" dirty="0"/>
+              <a:t>A similar method can be applied to add obstacles from the visibility graph.</a:t>
+            </a:r>
+          </a:p>
+        </p:txBody>
+      </p:sp>
+      <p:sp>
+        <p:nvSpPr>
+          <p:cNvPr id="5" name="Content Placeholder 3">
+            <a:extLst>
+              <a:ext uri="{FF2B5EF4-FFF2-40B4-BE49-F238E27FC236}">
+                <a16:creationId xmlns:a16="http://schemas.microsoft.com/office/drawing/2014/main" id="{8B882563-E27A-BCD6-C4F4-747F9CC442F0}"/>
+              </a:ext>
+            </a:extLst>
+          </p:cNvPr>
+          <p:cNvSpPr txBox="1">
+            <a:spLocks/>
+          </p:cNvSpPr>
+          <p:nvPr/>
+        </p:nvSpPr>
+        <p:spPr>
+          <a:xfrm>
+            <a:off x="7840615" y="1635988"/>
+            <a:ext cx="4065160" cy="5081450"/>
+          </a:xfrm>
+          <a:prstGeom prst="rect">
+            <a:avLst/>
+          </a:prstGeom>
+        </p:spPr>
+        <p:txBody>
+          <a:bodyPr vert="horz" lIns="91440" tIns="45720" rIns="91440" bIns="45720" rtlCol="0">
+            <a:normAutofit/>
+          </a:bodyPr>
+          <a:lstStyle>
+            <a:lvl1pPr marL="228600" indent="-228600" algn="l" defTabSz="914400" rtl="0" eaLnBrk="1" latinLnBrk="0" hangingPunct="1">
+              <a:lnSpc>
+                <a:spcPct val="100000"/>
+              </a:lnSpc>
+              <a:spcBef>
+                <a:spcPts val="1000"/>
+              </a:spcBef>
+              <a:buFont typeface="Arial" panose="020B0604020202020204" pitchFamily="34" charset="0"/>
+              <a:buChar char="•"/>
+              <a:defRPr sz="2000" b="1" i="0" kern="1200" cap="none" baseline="0">
+                <a:solidFill>
+                  <a:schemeClr val="tx1"/>
+                </a:solidFill>
+                <a:latin typeface="Franklin Gothic Book" panose="020B0503020102020204" pitchFamily="34" charset="0"/>
+                <a:ea typeface="+mn-ea"/>
+                <a:cs typeface="+mn-cs"/>
+              </a:defRPr>
+            </a:lvl1pPr>
+            <a:lvl2pPr marL="685800" indent="-228600" algn="l" defTabSz="914400" rtl="0" eaLnBrk="1" latinLnBrk="0" hangingPunct="1">
+              <a:lnSpc>
+                <a:spcPct val="100000"/>
+              </a:lnSpc>
+              <a:spcBef>
+                <a:spcPts val="500"/>
+              </a:spcBef>
+              <a:buFont typeface="Arial" panose="020B0604020202020204" pitchFamily="34" charset="0"/>
+              <a:buChar char="•"/>
+              <a:defRPr sz="2000" kern="1200">
+                <a:solidFill>
+                  <a:schemeClr val="tx1"/>
+                </a:solidFill>
+                <a:latin typeface="Franklin Gothic Book" panose="020B0503020102020204" pitchFamily="34" charset="0"/>
+                <a:ea typeface="+mn-ea"/>
+                <a:cs typeface="+mn-cs"/>
+              </a:defRPr>
+            </a:lvl2pPr>
+            <a:lvl3pPr marL="1143000" indent="-228600" algn="l" defTabSz="914400" rtl="0" eaLnBrk="1" latinLnBrk="0" hangingPunct="1">
+              <a:lnSpc>
+                <a:spcPct val="100000"/>
+              </a:lnSpc>
+              <a:spcBef>
+                <a:spcPts val="500"/>
+              </a:spcBef>
+              <a:buFont typeface="Arial" panose="020B0604020202020204" pitchFamily="34" charset="0"/>
+              <a:buChar char="•"/>
+              <a:defRPr sz="1800" kern="1200">
+                <a:solidFill>
+                  <a:schemeClr val="tx1"/>
+                </a:solidFill>
+                <a:latin typeface="Franklin Gothic Book" panose="020B0503020102020204" pitchFamily="34" charset="0"/>
+                <a:ea typeface="+mn-ea"/>
+                <a:cs typeface="+mn-cs"/>
+              </a:defRPr>
+            </a:lvl3pPr>
+            <a:lvl4pPr marL="1600200" indent="-228600" algn="l" defTabSz="914400" rtl="0" eaLnBrk="1" latinLnBrk="0" hangingPunct="1">
+              <a:lnSpc>
+                <a:spcPct val="100000"/>
+              </a:lnSpc>
+              <a:spcBef>
+                <a:spcPts val="500"/>
+              </a:spcBef>
+              <a:buFont typeface="Arial" panose="020B0604020202020204" pitchFamily="34" charset="0"/>
+              <a:buChar char="•"/>
+              <a:defRPr sz="1600" kern="1200">
+                <a:solidFill>
+                  <a:schemeClr val="tx1"/>
+                </a:solidFill>
+                <a:latin typeface="Franklin Gothic Book" panose="020B0503020102020204" pitchFamily="34" charset="0"/>
+                <a:ea typeface="+mn-ea"/>
+                <a:cs typeface="+mn-cs"/>
+              </a:defRPr>
+            </a:lvl4pPr>
+            <a:lvl5pPr marL="2057400" indent="-228600" algn="l" defTabSz="914400" rtl="0" eaLnBrk="1" latinLnBrk="0" hangingPunct="1">
+              <a:lnSpc>
+                <a:spcPct val="100000"/>
+              </a:lnSpc>
+              <a:spcBef>
+                <a:spcPts val="500"/>
+              </a:spcBef>
+              <a:buFont typeface="Arial" panose="020B0604020202020204" pitchFamily="34" charset="0"/>
+              <a:buChar char="•"/>
+              <a:defRPr sz="1600" kern="1200">
+                <a:solidFill>
+                  <a:schemeClr val="tx1"/>
+                </a:solidFill>
+                <a:latin typeface="Franklin Gothic Book" panose="020B0503020102020204" pitchFamily="34" charset="0"/>
+                <a:ea typeface="+mn-ea"/>
+                <a:cs typeface="+mn-cs"/>
+              </a:defRPr>
+            </a:lvl5pPr>
+            <a:lvl6pPr marL="2514600" indent="-228600" algn="l" defTabSz="914400" rtl="0" eaLnBrk="1" latinLnBrk="0" hangingPunct="1">
+              <a:lnSpc>
+                <a:spcPct val="90000"/>
+              </a:lnSpc>
+              <a:spcBef>
+                <a:spcPts val="500"/>
+              </a:spcBef>
+              <a:buFont typeface="Arial" panose="020B0604020202020204" pitchFamily="34" charset="0"/>
+              <a:buChar char="•"/>
+              <a:defRPr sz="1800" kern="1200">
+                <a:solidFill>
+                  <a:schemeClr val="tx1"/>
+                </a:solidFill>
+                <a:latin typeface="+mn-lt"/>
+                <a:ea typeface="+mn-ea"/>
+                <a:cs typeface="+mn-cs"/>
+              </a:defRPr>
+            </a:lvl6pPr>
+            <a:lvl7pPr marL="2971800" indent="-228600" algn="l" defTabSz="914400" rtl="0" eaLnBrk="1" latinLnBrk="0" hangingPunct="1">
+              <a:lnSpc>
+                <a:spcPct val="90000"/>
+              </a:lnSpc>
+              <a:spcBef>
+                <a:spcPts val="500"/>
+              </a:spcBef>
+              <a:buFont typeface="Arial" panose="020B0604020202020204" pitchFamily="34" charset="0"/>
+              <a:buChar char="•"/>
+              <a:defRPr sz="1800" kern="1200">
+                <a:solidFill>
+                  <a:schemeClr val="tx1"/>
+                </a:solidFill>
+                <a:latin typeface="+mn-lt"/>
+                <a:ea typeface="+mn-ea"/>
+                <a:cs typeface="+mn-cs"/>
+              </a:defRPr>
+            </a:lvl7pPr>
+            <a:lvl8pPr marL="3429000" indent="-228600" algn="l" defTabSz="914400" rtl="0" eaLnBrk="1" latinLnBrk="0" hangingPunct="1">
+              <a:lnSpc>
+                <a:spcPct val="90000"/>
+              </a:lnSpc>
+              <a:spcBef>
+                <a:spcPts val="500"/>
+              </a:spcBef>
+              <a:buFont typeface="Arial" panose="020B0604020202020204" pitchFamily="34" charset="0"/>
+              <a:buChar char="•"/>
+              <a:defRPr sz="1800" kern="1200">
+                <a:solidFill>
+                  <a:schemeClr val="tx1"/>
+                </a:solidFill>
+                <a:latin typeface="+mn-lt"/>
+                <a:ea typeface="+mn-ea"/>
+                <a:cs typeface="+mn-cs"/>
+              </a:defRPr>
+            </a:lvl8pPr>
+            <a:lvl9pPr marL="3886200" indent="-228600" algn="l" defTabSz="914400" rtl="0" eaLnBrk="1" latinLnBrk="0" hangingPunct="1">
+              <a:lnSpc>
+                <a:spcPct val="90000"/>
+              </a:lnSpc>
+              <a:spcBef>
+                <a:spcPts val="500"/>
+              </a:spcBef>
+              <a:buFont typeface="Arial" panose="020B0604020202020204" pitchFamily="34" charset="0"/>
+              <a:buChar char="•"/>
+              <a:defRPr sz="1800" kern="1200">
+                <a:solidFill>
+                  <a:schemeClr val="tx1"/>
+                </a:solidFill>
+                <a:latin typeface="+mn-lt"/>
+                <a:ea typeface="+mn-ea"/>
+                <a:cs typeface="+mn-cs"/>
+              </a:defRPr>
+            </a:lvl9pPr>
+          </a:lstStyle>
+          <a:p>
+            <a:r>
+              <a:rPr lang="en-US" dirty="0"/>
+              <a:t>This requires less than10% of edges to be checked (down from ~3000 down to ~200)</a:t>
+            </a:r>
+          </a:p>
+        </p:txBody>
+      </p:sp>
+      <p:sp>
+        <p:nvSpPr>
+          <p:cNvPr id="6" name="Arrow: Right 14">
+            <a:extLst>
+              <a:ext uri="{FF2B5EF4-FFF2-40B4-BE49-F238E27FC236}">
+                <a16:creationId xmlns:a16="http://schemas.microsoft.com/office/drawing/2014/main" id="{A06DD0DD-B824-8BD7-D9B1-E9337E9365E7}"/>
+              </a:ext>
+            </a:extLst>
+          </p:cNvPr>
+          <p:cNvSpPr/>
+          <p:nvPr/>
+        </p:nvSpPr>
+        <p:spPr>
+          <a:xfrm>
+            <a:off x="5675586" y="3263462"/>
+            <a:ext cx="1135117" cy="2286000"/>
+          </a:xfrm>
+          <a:prstGeom prst="rightArrow">
+            <a:avLst/>
+          </a:prstGeom>
+        </p:spPr>
+        <p:style>
+          <a:lnRef idx="2">
+            <a:schemeClr val="accent1">
+              <a:shade val="15000"/>
+            </a:schemeClr>
+          </a:lnRef>
+          <a:fillRef idx="1">
+            <a:schemeClr val="accent1"/>
+          </a:fillRef>
+          <a:effectRef idx="0">
+            <a:schemeClr val="accent1"/>
+          </a:effectRef>
+          <a:fontRef idx="minor">
+            <a:schemeClr val="lt1"/>
+          </a:fontRef>
+        </p:style>
+        <p:txBody>
+          <a:bodyPr rtlCol="0" anchor="ctr"/>
+          <a:lstStyle/>
+          <a:p>
+            <a:pPr algn="ctr"/>
+            <a:endParaRPr lang="en-US"/>
+          </a:p>
+        </p:txBody>
+      </p:sp>
+    </p:spTree>
+    <p:extLst>
+      <p:ext uri="{BB962C8B-B14F-4D97-AF65-F5344CB8AC3E}">
+        <p14:creationId xmlns:p14="http://schemas.microsoft.com/office/powerpoint/2010/main" val="2613108183"/>
+      </p:ext>
+    </p:extLst>
+  </p:cSld>
+  <p:clrMapOvr>
+    <a:masterClrMapping/>
+  </p:clrMapOvr>
+</p:sld>
+</file>
+
+<file path=ppt/slides/slide34.xml><?xml version="1.0" encoding="utf-8"?>
+<p:sld xmlns:a="http://schemas.openxmlformats.org/drawingml/2006/main" xmlns:r="http://schemas.openxmlformats.org/officeDocument/2006/relationships" xmlns:p="http://schemas.openxmlformats.org/presentationml/2006/main">
+  <p:cSld>
+    <p:spTree>
+      <p:nvGrpSpPr>
+        <p:cNvPr id="1" name=""/>
+        <p:cNvGrpSpPr/>
+        <p:nvPr/>
+      </p:nvGrpSpPr>
+      <p:grpSpPr>
+        <a:xfrm>
+          <a:off x="0" y="0"/>
+          <a:ext cx="0" cy="0"/>
+          <a:chOff x="0" y="0"/>
+          <a:chExt cx="0" cy="0"/>
+        </a:xfrm>
+      </p:grpSpPr>
+      <p:pic>
+        <p:nvPicPr>
+          <p:cNvPr id="7" name="Picture 6"/>
+          <p:cNvPicPr>
+            <a:picLocks noChangeAspect="1"/>
+          </p:cNvPicPr>
+          <p:nvPr/>
+        </p:nvPicPr>
+        <p:blipFill>
+          <a:blip r:embed="rId3"/>
+          <a:stretch>
+            <a:fillRect/>
+          </a:stretch>
+        </p:blipFill>
+        <p:spPr>
+          <a:xfrm>
+            <a:off x="6243144" y="1118870"/>
+            <a:ext cx="7104439" cy="5328329"/>
+          </a:xfrm>
+          <a:prstGeom prst="rect">
+            <a:avLst/>
+          </a:prstGeom>
+        </p:spPr>
+      </p:pic>
+      <p:pic>
+        <p:nvPicPr>
+          <p:cNvPr id="8" name="Picture 7"/>
+          <p:cNvPicPr>
+            <a:picLocks noChangeAspect="1"/>
+          </p:cNvPicPr>
+          <p:nvPr/>
+        </p:nvPicPr>
+        <p:blipFill>
+          <a:blip r:embed="rId4"/>
+          <a:stretch>
+            <a:fillRect/>
+          </a:stretch>
+        </p:blipFill>
+        <p:spPr>
+          <a:xfrm>
+            <a:off x="-412145" y="1118871"/>
+            <a:ext cx="7104438" cy="5328329"/>
+          </a:xfrm>
+          <a:prstGeom prst="rect">
+            <a:avLst/>
+          </a:prstGeom>
+        </p:spPr>
+      </p:pic>
+      <p:sp>
+        <p:nvSpPr>
+          <p:cNvPr id="3" name="Slide Number Placeholder 2"/>
+          <p:cNvSpPr>
+            <a:spLocks noGrp="1"/>
+          </p:cNvSpPr>
+          <p:nvPr>
+            <p:ph type="sldNum" sz="quarter" idx="12"/>
+          </p:nvPr>
+        </p:nvSpPr>
+        <p:spPr/>
+        <p:txBody>
+          <a:bodyPr/>
+          <a:lstStyle/>
+          <a:p>
+            <a:fld id="{CB3FC469-CA8B-4EE5-AE73-966FC6A86920}" type="slidenum">
+              <a:rPr lang="en-US" smtClean="0"/>
+              <a:t>34</a:t>
+            </a:fld>
+            <a:endParaRPr lang="en-US"/>
+          </a:p>
+        </p:txBody>
+      </p:sp>
+      <p:sp>
+        <p:nvSpPr>
+          <p:cNvPr id="2" name="Title 1"/>
+          <p:cNvSpPr>
+            <a:spLocks noGrp="1"/>
+          </p:cNvSpPr>
+          <p:nvPr>
+            <p:ph type="title"/>
+          </p:nvPr>
+        </p:nvSpPr>
+        <p:spPr/>
+        <p:txBody>
+          <a:bodyPr/>
+          <a:lstStyle/>
+          <a:p>
+            <a:r>
+              <a:rPr lang="en-US" dirty="0"/>
+              <a:t>A similar method can be applied to add obstacles from the visibility graph.</a:t>
+            </a:r>
+          </a:p>
+        </p:txBody>
+      </p:sp>
+      <p:sp>
+        <p:nvSpPr>
+          <p:cNvPr id="5" name="Content Placeholder 3">
+            <a:extLst>
+              <a:ext uri="{FF2B5EF4-FFF2-40B4-BE49-F238E27FC236}">
+                <a16:creationId xmlns:a16="http://schemas.microsoft.com/office/drawing/2014/main" id="{8B882563-E27A-BCD6-C4F4-747F9CC442F0}"/>
+              </a:ext>
+            </a:extLst>
+          </p:cNvPr>
+          <p:cNvSpPr txBox="1">
+            <a:spLocks/>
+          </p:cNvSpPr>
+          <p:nvPr/>
+        </p:nvSpPr>
+        <p:spPr>
+          <a:xfrm>
+            <a:off x="7840615" y="1635988"/>
+            <a:ext cx="4065160" cy="5081450"/>
+          </a:xfrm>
+          <a:prstGeom prst="rect">
+            <a:avLst/>
+          </a:prstGeom>
+        </p:spPr>
+        <p:txBody>
+          <a:bodyPr vert="horz" lIns="91440" tIns="45720" rIns="91440" bIns="45720" rtlCol="0">
+            <a:normAutofit/>
+          </a:bodyPr>
+          <a:lstStyle>
+            <a:lvl1pPr marL="228600" indent="-228600" algn="l" defTabSz="914400" rtl="0" eaLnBrk="1" latinLnBrk="0" hangingPunct="1">
+              <a:lnSpc>
+                <a:spcPct val="100000"/>
+              </a:lnSpc>
+              <a:spcBef>
+                <a:spcPts val="1000"/>
+              </a:spcBef>
+              <a:buFont typeface="Arial" panose="020B0604020202020204" pitchFamily="34" charset="0"/>
+              <a:buChar char="•"/>
+              <a:defRPr sz="2000" b="1" i="0" kern="1200" cap="none" baseline="0">
+                <a:solidFill>
+                  <a:schemeClr val="tx1"/>
+                </a:solidFill>
+                <a:latin typeface="Franklin Gothic Book" panose="020B0503020102020204" pitchFamily="34" charset="0"/>
+                <a:ea typeface="+mn-ea"/>
+                <a:cs typeface="+mn-cs"/>
+              </a:defRPr>
+            </a:lvl1pPr>
+            <a:lvl2pPr marL="685800" indent="-228600" algn="l" defTabSz="914400" rtl="0" eaLnBrk="1" latinLnBrk="0" hangingPunct="1">
+              <a:lnSpc>
+                <a:spcPct val="100000"/>
+              </a:lnSpc>
+              <a:spcBef>
+                <a:spcPts val="500"/>
+              </a:spcBef>
+              <a:buFont typeface="Arial" panose="020B0604020202020204" pitchFamily="34" charset="0"/>
+              <a:buChar char="•"/>
+              <a:defRPr sz="2000" kern="1200">
+                <a:solidFill>
+                  <a:schemeClr val="tx1"/>
+                </a:solidFill>
+                <a:latin typeface="Franklin Gothic Book" panose="020B0503020102020204" pitchFamily="34" charset="0"/>
+                <a:ea typeface="+mn-ea"/>
+                <a:cs typeface="+mn-cs"/>
+              </a:defRPr>
+            </a:lvl2pPr>
+            <a:lvl3pPr marL="1143000" indent="-228600" algn="l" defTabSz="914400" rtl="0" eaLnBrk="1" latinLnBrk="0" hangingPunct="1">
+              <a:lnSpc>
+                <a:spcPct val="100000"/>
+              </a:lnSpc>
+              <a:spcBef>
+                <a:spcPts val="500"/>
+              </a:spcBef>
+              <a:buFont typeface="Arial" panose="020B0604020202020204" pitchFamily="34" charset="0"/>
+              <a:buChar char="•"/>
+              <a:defRPr sz="1800" kern="1200">
+                <a:solidFill>
+                  <a:schemeClr val="tx1"/>
+                </a:solidFill>
+                <a:latin typeface="Franklin Gothic Book" panose="020B0503020102020204" pitchFamily="34" charset="0"/>
+                <a:ea typeface="+mn-ea"/>
+                <a:cs typeface="+mn-cs"/>
+              </a:defRPr>
+            </a:lvl3pPr>
+            <a:lvl4pPr marL="1600200" indent="-228600" algn="l" defTabSz="914400" rtl="0" eaLnBrk="1" latinLnBrk="0" hangingPunct="1">
+              <a:lnSpc>
+                <a:spcPct val="100000"/>
+              </a:lnSpc>
+              <a:spcBef>
+                <a:spcPts val="500"/>
+              </a:spcBef>
+              <a:buFont typeface="Arial" panose="020B0604020202020204" pitchFamily="34" charset="0"/>
+              <a:buChar char="•"/>
+              <a:defRPr sz="1600" kern="1200">
+                <a:solidFill>
+                  <a:schemeClr val="tx1"/>
+                </a:solidFill>
+                <a:latin typeface="Franklin Gothic Book" panose="020B0503020102020204" pitchFamily="34" charset="0"/>
+                <a:ea typeface="+mn-ea"/>
+                <a:cs typeface="+mn-cs"/>
+              </a:defRPr>
+            </a:lvl4pPr>
+            <a:lvl5pPr marL="2057400" indent="-228600" algn="l" defTabSz="914400" rtl="0" eaLnBrk="1" latinLnBrk="0" hangingPunct="1">
+              <a:lnSpc>
+                <a:spcPct val="100000"/>
+              </a:lnSpc>
+              <a:spcBef>
+                <a:spcPts val="500"/>
+              </a:spcBef>
+              <a:buFont typeface="Arial" panose="020B0604020202020204" pitchFamily="34" charset="0"/>
+              <a:buChar char="•"/>
+              <a:defRPr sz="1600" kern="1200">
+                <a:solidFill>
+                  <a:schemeClr val="tx1"/>
+                </a:solidFill>
+                <a:latin typeface="Franklin Gothic Book" panose="020B0503020102020204" pitchFamily="34" charset="0"/>
+                <a:ea typeface="+mn-ea"/>
+                <a:cs typeface="+mn-cs"/>
+              </a:defRPr>
+            </a:lvl5pPr>
+            <a:lvl6pPr marL="2514600" indent="-228600" algn="l" defTabSz="914400" rtl="0" eaLnBrk="1" latinLnBrk="0" hangingPunct="1">
+              <a:lnSpc>
+                <a:spcPct val="90000"/>
+              </a:lnSpc>
+              <a:spcBef>
+                <a:spcPts val="500"/>
+              </a:spcBef>
+              <a:buFont typeface="Arial" panose="020B0604020202020204" pitchFamily="34" charset="0"/>
+              <a:buChar char="•"/>
+              <a:defRPr sz="1800" kern="1200">
+                <a:solidFill>
+                  <a:schemeClr val="tx1"/>
+                </a:solidFill>
+                <a:latin typeface="+mn-lt"/>
+                <a:ea typeface="+mn-ea"/>
+                <a:cs typeface="+mn-cs"/>
+              </a:defRPr>
+            </a:lvl6pPr>
+            <a:lvl7pPr marL="2971800" indent="-228600" algn="l" defTabSz="914400" rtl="0" eaLnBrk="1" latinLnBrk="0" hangingPunct="1">
+              <a:lnSpc>
+                <a:spcPct val="90000"/>
+              </a:lnSpc>
+              <a:spcBef>
+                <a:spcPts val="500"/>
+              </a:spcBef>
+              <a:buFont typeface="Arial" panose="020B0604020202020204" pitchFamily="34" charset="0"/>
+              <a:buChar char="•"/>
+              <a:defRPr sz="1800" kern="1200">
+                <a:solidFill>
+                  <a:schemeClr val="tx1"/>
+                </a:solidFill>
+                <a:latin typeface="+mn-lt"/>
+                <a:ea typeface="+mn-ea"/>
+                <a:cs typeface="+mn-cs"/>
+              </a:defRPr>
+            </a:lvl7pPr>
+            <a:lvl8pPr marL="3429000" indent="-228600" algn="l" defTabSz="914400" rtl="0" eaLnBrk="1" latinLnBrk="0" hangingPunct="1">
+              <a:lnSpc>
+                <a:spcPct val="90000"/>
+              </a:lnSpc>
+              <a:spcBef>
+                <a:spcPts val="500"/>
+              </a:spcBef>
+              <a:buFont typeface="Arial" panose="020B0604020202020204" pitchFamily="34" charset="0"/>
+              <a:buChar char="•"/>
+              <a:defRPr sz="1800" kern="1200">
+                <a:solidFill>
+                  <a:schemeClr val="tx1"/>
+                </a:solidFill>
+                <a:latin typeface="+mn-lt"/>
+                <a:ea typeface="+mn-ea"/>
+                <a:cs typeface="+mn-cs"/>
+              </a:defRPr>
+            </a:lvl8pPr>
+            <a:lvl9pPr marL="3886200" indent="-228600" algn="l" defTabSz="914400" rtl="0" eaLnBrk="1" latinLnBrk="0" hangingPunct="1">
+              <a:lnSpc>
+                <a:spcPct val="90000"/>
+              </a:lnSpc>
+              <a:spcBef>
+                <a:spcPts val="500"/>
+              </a:spcBef>
+              <a:buFont typeface="Arial" panose="020B0604020202020204" pitchFamily="34" charset="0"/>
+              <a:buChar char="•"/>
+              <a:defRPr sz="1800" kern="1200">
+                <a:solidFill>
+                  <a:schemeClr val="tx1"/>
+                </a:solidFill>
+                <a:latin typeface="+mn-lt"/>
+                <a:ea typeface="+mn-ea"/>
+                <a:cs typeface="+mn-cs"/>
+              </a:defRPr>
+            </a:lvl9pPr>
+          </a:lstStyle>
+          <a:p>
+            <a:r>
+              <a:rPr lang="en-US" dirty="0"/>
+              <a:t>This requires less than10% of edges to be checked (down from ~3000 down to ~200)</a:t>
+            </a:r>
+          </a:p>
+        </p:txBody>
+      </p:sp>
+      <p:sp>
+        <p:nvSpPr>
+          <p:cNvPr id="6" name="Arrow: Right 14">
+            <a:extLst>
+              <a:ext uri="{FF2B5EF4-FFF2-40B4-BE49-F238E27FC236}">
+                <a16:creationId xmlns:a16="http://schemas.microsoft.com/office/drawing/2014/main" id="{A06DD0DD-B824-8BD7-D9B1-E9337E9365E7}"/>
+              </a:ext>
+            </a:extLst>
+          </p:cNvPr>
+          <p:cNvSpPr/>
+          <p:nvPr/>
+        </p:nvSpPr>
+        <p:spPr>
+          <a:xfrm>
+            <a:off x="5675586" y="3263462"/>
+            <a:ext cx="1135117" cy="2286000"/>
+          </a:xfrm>
+          <a:prstGeom prst="rightArrow">
+            <a:avLst/>
+          </a:prstGeom>
+        </p:spPr>
+        <p:style>
+          <a:lnRef idx="2">
+            <a:schemeClr val="accent1">
+              <a:shade val="15000"/>
+            </a:schemeClr>
+          </a:lnRef>
+          <a:fillRef idx="1">
+            <a:schemeClr val="accent1"/>
+          </a:fillRef>
+          <a:effectRef idx="0">
+            <a:schemeClr val="accent1"/>
+          </a:effectRef>
+          <a:fontRef idx="minor">
+            <a:schemeClr val="lt1"/>
+          </a:fontRef>
+        </p:style>
+        <p:txBody>
+          <a:bodyPr rtlCol="0" anchor="ctr"/>
+          <a:lstStyle/>
+          <a:p>
+            <a:pPr algn="ctr"/>
+            <a:endParaRPr lang="en-US"/>
+          </a:p>
+        </p:txBody>
+      </p:sp>
+    </p:spTree>
+    <p:extLst>
+      <p:ext uri="{BB962C8B-B14F-4D97-AF65-F5344CB8AC3E}">
+        <p14:creationId xmlns:p14="http://schemas.microsoft.com/office/powerpoint/2010/main" val="1082970580"/>
       </p:ext>
     </p:extLst>
   </p:cSld>

</xml_diff>